<commit_message>
more fixes for list controls
</commit_message>
<xml_diff>
--- a/architecture/styling-lists-in-powerpoint.pptx
+++ b/architecture/styling-lists-in-powerpoint.pptx
@@ -6,7 +6,7 @@
     <p:sldMasterId id="2147483653" r:id="rId2"/>
   </p:sldMasterIdLst>
   <p:notesMasterIdLst>
-    <p:notesMasterId r:id="rId27"/>
+    <p:notesMasterId r:id="rId29"/>
   </p:notesMasterIdLst>
   <p:sldIdLst>
     <p:sldId id="256" r:id="rId3"/>
@@ -19,20 +19,22 @@
     <p:sldId id="263" r:id="rId10"/>
     <p:sldId id="265" r:id="rId11"/>
     <p:sldId id="278" r:id="rId12"/>
-    <p:sldId id="279" r:id="rId13"/>
-    <p:sldId id="262" r:id="rId14"/>
-    <p:sldId id="273" r:id="rId15"/>
-    <p:sldId id="264" r:id="rId16"/>
-    <p:sldId id="274" r:id="rId17"/>
-    <p:sldId id="271" r:id="rId18"/>
-    <p:sldId id="267" r:id="rId19"/>
-    <p:sldId id="268" r:id="rId20"/>
-    <p:sldId id="258" r:id="rId21"/>
-    <p:sldId id="257" r:id="rId22"/>
-    <p:sldId id="259" r:id="rId23"/>
-    <p:sldId id="261" r:id="rId24"/>
-    <p:sldId id="277" r:id="rId25"/>
-    <p:sldId id="270" r:id="rId26"/>
+    <p:sldId id="280" r:id="rId13"/>
+    <p:sldId id="279" r:id="rId14"/>
+    <p:sldId id="262" r:id="rId15"/>
+    <p:sldId id="273" r:id="rId16"/>
+    <p:sldId id="264" r:id="rId17"/>
+    <p:sldId id="274" r:id="rId18"/>
+    <p:sldId id="271" r:id="rId19"/>
+    <p:sldId id="267" r:id="rId20"/>
+    <p:sldId id="268" r:id="rId21"/>
+    <p:sldId id="258" r:id="rId22"/>
+    <p:sldId id="257" r:id="rId23"/>
+    <p:sldId id="259" r:id="rId24"/>
+    <p:sldId id="261" r:id="rId25"/>
+    <p:sldId id="281" r:id="rId26"/>
+    <p:sldId id="277" r:id="rId27"/>
+    <p:sldId id="270" r:id="rId28"/>
   </p:sldIdLst>
   <p:sldSz cx="12192000" cy="6858000"/>
   <p:notesSz cx="6858000" cy="9144000"/>
@@ -221,7 +223,7 @@
           <a:p>
             <a:fld id="{F3CE3BA1-E673-430F-9BEF-6A3E586025DD}" type="datetimeFigureOut">
               <a:rPr lang="en-US" smtClean="0"/>
-              <a:t>6/17/2025</a:t>
+              <a:t>6/20/2025</a:t>
             </a:fld>
             <a:endParaRPr lang="en-US"/>
           </a:p>
@@ -732,7 +734,7 @@
           <a:p>
             <a:fld id="{92DEE609-3400-4656-8A40-C095688308D1}" type="datetime1">
               <a:rPr lang="en-US" smtClean="0"/>
-              <a:t>6/17/2025</a:t>
+              <a:t>6/20/2025</a:t>
             </a:fld>
             <a:endParaRPr lang="en-US"/>
           </a:p>
@@ -1149,7 +1151,7 @@
           <a:p>
             <a:fld id="{7A7BE77D-7712-418A-A4C4-2C50F5200880}" type="datetime1">
               <a:rPr lang="en-US" smtClean="0"/>
-              <a:t>6/17/2025</a:t>
+              <a:t>6/20/2025</a:t>
             </a:fld>
             <a:endParaRPr lang="en-US"/>
           </a:p>
@@ -1471,7 +1473,7 @@
           <a:p>
             <a:fld id="{EAEF7DD5-05CF-4070-A37B-F3D86CA7436A}" type="datetime1">
               <a:rPr lang="en-US" smtClean="0"/>
-              <a:t>6/17/2025</a:t>
+              <a:t>6/20/2025</a:t>
             </a:fld>
             <a:endParaRPr lang="en-US"/>
           </a:p>
@@ -1545,6 +1547,271 @@
 </file>
 
 <file path=ppt/slideLayouts/slideLayout4.xml><?xml version="1.0" encoding="utf-8"?>
+<p:sldLayout xmlns:a="http://schemas.openxmlformats.org/drawingml/2006/main" xmlns:r="http://schemas.openxmlformats.org/officeDocument/2006/relationships" xmlns:p="http://schemas.openxmlformats.org/presentationml/2006/main" type="obj" preserve="1">
+  <p:cSld name="Test Std Content Page">
+    <p:spTree>
+      <p:nvGrpSpPr>
+        <p:cNvPr id="1" name=""/>
+        <p:cNvGrpSpPr/>
+        <p:nvPr/>
+      </p:nvGrpSpPr>
+      <p:grpSpPr>
+        <a:xfrm>
+          <a:off x="0" y="0"/>
+          <a:ext cx="0" cy="0"/>
+          <a:chOff x="0" y="0"/>
+          <a:chExt cx="0" cy="0"/>
+        </a:xfrm>
+      </p:grpSpPr>
+      <p:sp>
+        <p:nvSpPr>
+          <p:cNvPr id="2" name="Title 1">
+            <a:extLst>
+              <a:ext uri="{FF2B5EF4-FFF2-40B4-BE49-F238E27FC236}">
+                <a16:creationId xmlns:a16="http://schemas.microsoft.com/office/drawing/2014/main" id="{A5037873-A5AE-02D6-AA41-36ED7EEEBBB9}"/>
+              </a:ext>
+            </a:extLst>
+          </p:cNvPr>
+          <p:cNvSpPr>
+            <a:spLocks noGrp="1"/>
+          </p:cNvSpPr>
+          <p:nvPr>
+            <p:ph type="title" hasCustomPrompt="1"/>
+          </p:nvPr>
+        </p:nvSpPr>
+        <p:spPr/>
+        <p:txBody>
+          <a:bodyPr/>
+          <a:lstStyle>
+            <a:lvl1pPr>
+              <a:defRPr/>
+            </a:lvl1pPr>
+          </a:lstStyle>
+          <a:p>
+            <a:r>
+              <a:rPr lang="en-US" dirty="0"/>
+              <a:t>Test Std Content Page: Style</a:t>
+            </a:r>
+          </a:p>
+        </p:txBody>
+      </p:sp>
+      <p:sp>
+        <p:nvSpPr>
+          <p:cNvPr id="3" name="Content Placeholder 2">
+            <a:extLst>
+              <a:ext uri="{FF2B5EF4-FFF2-40B4-BE49-F238E27FC236}">
+                <a16:creationId xmlns:a16="http://schemas.microsoft.com/office/drawing/2014/main" id="{B98329A5-B326-353C-4A88-532DB75DC423}"/>
+              </a:ext>
+            </a:extLst>
+          </p:cNvPr>
+          <p:cNvSpPr>
+            <a:spLocks noGrp="1"/>
+          </p:cNvSpPr>
+          <p:nvPr>
+            <p:ph idx="1" hasCustomPrompt="1"/>
+          </p:nvPr>
+        </p:nvSpPr>
+        <p:spPr>
+          <a:xfrm>
+            <a:off x="838200" y="1026635"/>
+            <a:ext cx="10515600" cy="4351338"/>
+          </a:xfrm>
+          <a:prstGeom prst="rect">
+            <a:avLst/>
+          </a:prstGeom>
+          <a:ln>
+            <a:solidFill>
+              <a:schemeClr val="accent2"/>
+            </a:solidFill>
+          </a:ln>
+        </p:spPr>
+        <p:txBody>
+          <a:bodyPr lIns="0">
+            <a:noAutofit/>
+          </a:bodyPr>
+          <a:lstStyle>
+            <a:lvl1pPr marL="0" indent="0">
+              <a:buFont typeface="+mj-lt"/>
+              <a:buAutoNum type="arabicPeriod"/>
+              <a:tabLst>
+                <a:tab pos="91440" algn="l"/>
+              </a:tabLst>
+              <a:defRPr sz="1600">
+                <a:solidFill>
+                  <a:schemeClr val="tx1"/>
+                </a:solidFill>
+              </a:defRPr>
+            </a:lvl1pPr>
+            <a:lvl2pPr marL="395288" indent="-168275">
+              <a:buFont typeface="+mj-lt"/>
+              <a:buAutoNum type="arabicPeriod"/>
+              <a:tabLst>
+                <a:tab pos="91440" algn="l"/>
+              </a:tabLst>
+              <a:defRPr sz="1600">
+                <a:solidFill>
+                  <a:schemeClr val="tx1"/>
+                </a:solidFill>
+              </a:defRPr>
+            </a:lvl2pPr>
+            <a:lvl3pPr marL="574675" indent="-179388">
+              <a:buFont typeface="+mj-lt"/>
+              <a:buAutoNum type="arabicPeriod"/>
+              <a:tabLst>
+                <a:tab pos="91440" algn="l"/>
+                <a:tab pos="822960" algn="l"/>
+              </a:tabLst>
+              <a:defRPr sz="1600">
+                <a:solidFill>
+                  <a:schemeClr val="tx1"/>
+                </a:solidFill>
+              </a:defRPr>
+            </a:lvl3pPr>
+            <a:lvl4pPr marL="1714500" indent="-274320">
+              <a:buFont typeface="+mj-lt"/>
+              <a:buAutoNum type="arabicPeriod"/>
+              <a:tabLst>
+                <a:tab pos="91440" algn="l"/>
+              </a:tabLst>
+              <a:defRPr sz="1600">
+                <a:solidFill>
+                  <a:schemeClr val="tx1"/>
+                </a:solidFill>
+              </a:defRPr>
+            </a:lvl4pPr>
+            <a:lvl5pPr marL="2171700" indent="-274320">
+              <a:buFont typeface="+mj-lt"/>
+              <a:buAutoNum type="arabicPeriod"/>
+              <a:tabLst>
+                <a:tab pos="91440" algn="l"/>
+              </a:tabLst>
+              <a:defRPr sz="1600">
+                <a:solidFill>
+                  <a:schemeClr val="tx1"/>
+                </a:solidFill>
+              </a:defRPr>
+            </a:lvl5pPr>
+          </a:lstStyle>
+          <a:p>
+            <a:pPr lvl="0"/>
+            <a:r>
+              <a:rPr lang="en-US" dirty="0"/>
+              <a:t>Click to edit Master text styles Heading 1</a:t>
+            </a:r>
+          </a:p>
+          <a:p>
+            <a:pPr lvl="1"/>
+            <a:r>
+              <a:rPr lang="en-US" dirty="0"/>
+              <a:t>Level 2</a:t>
+            </a:r>
+          </a:p>
+          <a:p>
+            <a:pPr lvl="2"/>
+            <a:r>
+              <a:rPr lang="en-US" dirty="0"/>
+              <a:t>Level 3</a:t>
+            </a:r>
+          </a:p>
+        </p:txBody>
+      </p:sp>
+      <p:sp>
+        <p:nvSpPr>
+          <p:cNvPr id="4" name="Date Placeholder 3">
+            <a:extLst>
+              <a:ext uri="{FF2B5EF4-FFF2-40B4-BE49-F238E27FC236}">
+                <a16:creationId xmlns:a16="http://schemas.microsoft.com/office/drawing/2014/main" id="{B2C681C8-9CD2-F083-C02A-763DD45AF39C}"/>
+              </a:ext>
+            </a:extLst>
+          </p:cNvPr>
+          <p:cNvSpPr>
+            <a:spLocks noGrp="1"/>
+          </p:cNvSpPr>
+          <p:nvPr>
+            <p:ph type="dt" sz="half" idx="10"/>
+          </p:nvPr>
+        </p:nvSpPr>
+        <p:spPr/>
+        <p:txBody>
+          <a:bodyPr/>
+          <a:lstStyle/>
+          <a:p>
+            <a:fld id="{EAEF7DD5-05CF-4070-A37B-F3D86CA7436A}" type="datetime1">
+              <a:rPr lang="en-US" smtClean="0"/>
+              <a:t>6/20/2025</a:t>
+            </a:fld>
+            <a:endParaRPr lang="en-US"/>
+          </a:p>
+        </p:txBody>
+      </p:sp>
+      <p:sp>
+        <p:nvSpPr>
+          <p:cNvPr id="5" name="Footer Placeholder 4">
+            <a:extLst>
+              <a:ext uri="{FF2B5EF4-FFF2-40B4-BE49-F238E27FC236}">
+                <a16:creationId xmlns:a16="http://schemas.microsoft.com/office/drawing/2014/main" id="{C1497368-8E3E-ACB9-C5C7-3C39DC4A5D5E}"/>
+              </a:ext>
+            </a:extLst>
+          </p:cNvPr>
+          <p:cNvSpPr>
+            <a:spLocks noGrp="1"/>
+          </p:cNvSpPr>
+          <p:nvPr>
+            <p:ph type="ftr" sz="quarter" idx="11"/>
+          </p:nvPr>
+        </p:nvSpPr>
+        <p:spPr/>
+        <p:txBody>
+          <a:bodyPr/>
+          <a:lstStyle/>
+          <a:p>
+            <a:endParaRPr lang="en-US"/>
+          </a:p>
+        </p:txBody>
+      </p:sp>
+      <p:sp>
+        <p:nvSpPr>
+          <p:cNvPr id="6" name="Slide Number Placeholder 5">
+            <a:extLst>
+              <a:ext uri="{FF2B5EF4-FFF2-40B4-BE49-F238E27FC236}">
+                <a16:creationId xmlns:a16="http://schemas.microsoft.com/office/drawing/2014/main" id="{7FE1FCBB-B5DD-1940-D701-F06C092C09EF}"/>
+              </a:ext>
+            </a:extLst>
+          </p:cNvPr>
+          <p:cNvSpPr>
+            <a:spLocks noGrp="1"/>
+          </p:cNvSpPr>
+          <p:nvPr>
+            <p:ph type="sldNum" sz="quarter" idx="12"/>
+          </p:nvPr>
+        </p:nvSpPr>
+        <p:spPr/>
+        <p:txBody>
+          <a:bodyPr/>
+          <a:lstStyle/>
+          <a:p>
+            <a:fld id="{80473052-BA07-4FC5-9696-A0F7625044DE}" type="slidenum">
+              <a:rPr lang="en-US" smtClean="0"/>
+              <a:t>‹#›</a:t>
+            </a:fld>
+            <a:endParaRPr lang="en-US"/>
+          </a:p>
+        </p:txBody>
+      </p:sp>
+    </p:spTree>
+    <p:extLst>
+      <p:ext uri="{BB962C8B-B14F-4D97-AF65-F5344CB8AC3E}">
+        <p14:creationId xmlns:p14="http://schemas.microsoft.com/office/powerpoint/2010/main" val="321312976"/>
+      </p:ext>
+    </p:extLst>
+  </p:cSld>
+  <p:clrMapOvr>
+    <a:masterClrMapping/>
+  </p:clrMapOvr>
+</p:sldLayout>
+</file>
+
+<file path=ppt/slideLayouts/slideLayout5.xml><?xml version="1.0" encoding="utf-8"?>
 <p:sldLayout xmlns:a="http://schemas.openxmlformats.org/drawingml/2006/main" xmlns:r="http://schemas.openxmlformats.org/officeDocument/2006/relationships" xmlns:p="http://schemas.openxmlformats.org/presentationml/2006/main" preserve="1" userDrawn="1">
   <p:cSld name="empty page">
     <p:spTree>
@@ -1612,7 +1879,7 @@
           <a:p>
             <a:fld id="{8D07980B-565F-4C1B-86E2-9DD7F71A6AB0}" type="datetime1">
               <a:rPr lang="en-US" smtClean="0"/>
-              <a:t>6/17/2025</a:t>
+              <a:t>6/20/2025</a:t>
             </a:fld>
             <a:endParaRPr lang="en-US"/>
           </a:p>
@@ -1685,7 +1952,7 @@
 </p:sldLayout>
 </file>
 
-<file path=ppt/slideLayouts/slideLayout5.xml><?xml version="1.0" encoding="utf-8"?>
+<file path=ppt/slideLayouts/slideLayout6.xml><?xml version="1.0" encoding="utf-8"?>
 <p:sldLayout xmlns:a="http://schemas.openxmlformats.org/drawingml/2006/main" xmlns:r="http://schemas.openxmlformats.org/officeDocument/2006/relationships" xmlns:p="http://schemas.openxmlformats.org/presentationml/2006/main" type="title" preserve="1">
   <p:cSld name="Title Slide">
     <p:spTree>
@@ -1835,7 +2102,7 @@
           <a:p>
             <a:fld id="{75959440-8438-4EDA-9196-A17F81AACF8F}" type="datetime1">
               <a:rPr lang="en-US" smtClean="0"/>
-              <a:t>6/17/2025</a:t>
+              <a:t>6/20/2025</a:t>
             </a:fld>
             <a:endParaRPr lang="en-US"/>
           </a:p>
@@ -1908,7 +2175,7 @@
 </p:sldLayout>
 </file>
 
-<file path=ppt/slideLayouts/slideLayout6.xml><?xml version="1.0" encoding="utf-8"?>
+<file path=ppt/slideLayouts/slideLayout7.xml><?xml version="1.0" encoding="utf-8"?>
 <p:sldLayout xmlns:a="http://schemas.openxmlformats.org/drawingml/2006/main" xmlns:r="http://schemas.openxmlformats.org/officeDocument/2006/relationships" xmlns:p="http://schemas.openxmlformats.org/presentationml/2006/main" preserve="1" userDrawn="1">
   <p:cSld name="separator">
     <p:spTree>
@@ -1985,7 +2252,7 @@
           <a:p>
             <a:fld id="{8560C548-7D6B-4ED8-8D7A-50BD43960FA7}" type="datetime1">
               <a:rPr lang="en-US" smtClean="0"/>
-              <a:t>6/17/2025</a:t>
+              <a:t>6/20/2025</a:t>
             </a:fld>
             <a:endParaRPr lang="en-US"/>
           </a:p>
@@ -2159,7 +2426,7 @@
           <a:p>
             <a:fld id="{79DDC6F4-6430-4F64-890C-465BC48B69C9}" type="datetime1">
               <a:rPr lang="en-US" smtClean="0"/>
-              <a:t>6/17/2025</a:t>
+              <a:t>6/20/2025</a:t>
             </a:fld>
             <a:endParaRPr lang="en-US"/>
           </a:p>
@@ -2370,7 +2637,8 @@
     <p:sldLayoutId id="2147483650" r:id="rId1"/>
     <p:sldLayoutId id="2147483651" r:id="rId2"/>
     <p:sldLayoutId id="2147483656" r:id="rId3"/>
-    <p:sldLayoutId id="2147483652" r:id="rId4"/>
+    <p:sldLayoutId id="2147483657" r:id="rId4"/>
+    <p:sldLayoutId id="2147483652" r:id="rId5"/>
   </p:sldLayoutIdLst>
   <p:hf hdr="0" ftr="0" dt="0"/>
   <p:txStyles>
@@ -2757,7 +3025,7 @@
           <a:p>
             <a:fld id="{4DD03BCF-C762-49F0-9F81-92EC2B9DD1DA}" type="datetime1">
               <a:rPr lang="en-US" smtClean="0"/>
-              <a:t>6/17/2025</a:t>
+              <a:t>6/20/2025</a:t>
             </a:fld>
             <a:endParaRPr lang="en-US"/>
           </a:p>
@@ -3572,7 +3840,27 @@
           <a:p>
             <a:r>
               <a:rPr lang="en-US" dirty="0"/>
-              <a:t>Paragraph Controls: The spacing options</a:t>
+              <a:t>Paragraph Controls: The left side </a:t>
+            </a:r>
+            <a:r>
+              <a:rPr lang="en-US"/>
+              <a:t>Indent: </a:t>
+            </a:r>
+            <a:r>
+              <a:rPr lang="en-US">
+                <a:solidFill>
+                  <a:srgbClr val="FF0000"/>
+                </a:solidFill>
+              </a:rPr>
+              <a:t>Enter </a:t>
+            </a:r>
+            <a:r>
+              <a:rPr lang="en-US" dirty="0">
+                <a:solidFill>
+                  <a:srgbClr val="FF0000"/>
+                </a:solidFill>
+              </a:rPr>
+              <a:t>and Tab nudge</a:t>
             </a:r>
           </a:p>
         </p:txBody>
@@ -3595,7 +3883,7 @@
         </p:nvSpPr>
         <p:spPr>
           <a:xfrm>
-            <a:off x="822959" y="1026634"/>
+            <a:off x="838200" y="824035"/>
             <a:ext cx="10515599" cy="5329715"/>
           </a:xfrm>
         </p:spPr>
@@ -3605,93 +3893,120 @@
           <a:p>
             <a:pPr marL="274320" indent="0"/>
             <a:r>
-              <a:rPr lang="en-US" sz="1800" dirty="0"/>
-              <a:t>They apply to each line (that is a paragraph) in the bulleted list</a:t>
+              <a:rPr lang="en-US" dirty="0"/>
+              <a:t>Problem</a:t>
+            </a:r>
+          </a:p>
+          <a:p>
+            <a:pPr marL="674370" lvl="1" indent="0"/>
+            <a:r>
+              <a:rPr lang="en-US" dirty="0"/>
+              <a:t>Changing the left indent on the whole list will move child levels also to the same indent as the parent</a:t>
+            </a:r>
+          </a:p>
+          <a:p>
+            <a:pPr marL="674370" lvl="1" indent="0"/>
+            <a:r>
+              <a:rPr lang="en-US" dirty="0"/>
+              <a:t>You don’t want that</a:t>
             </a:r>
           </a:p>
           <a:p>
             <a:pPr marL="274320" indent="0"/>
             <a:r>
-              <a:rPr lang="en-US" sz="1800" dirty="0"/>
-              <a:t>Not between the bullets!!</a:t>
+              <a:rPr lang="en-US" dirty="0"/>
+              <a:t>How to</a:t>
+            </a:r>
+          </a:p>
+          <a:p>
+            <a:pPr marL="674370" lvl="1" indent="0"/>
+            <a:r>
+              <a:rPr lang="en-US" dirty="0"/>
+              <a:t>Start with 1 level in the layout list</a:t>
+            </a:r>
+          </a:p>
+          <a:p>
+            <a:pPr marL="674370" lvl="1" indent="0"/>
+            <a:r>
+              <a:rPr lang="en-US" dirty="0"/>
+              <a:t>Adjust spaces for line 1</a:t>
+            </a:r>
+          </a:p>
+          <a:p>
+            <a:pPr marL="1131570" lvl="2" indent="0"/>
+            <a:r>
+              <a:rPr lang="en-US" dirty="0"/>
+              <a:t>Fix its “shape” left padding</a:t>
+            </a:r>
+          </a:p>
+          <a:p>
+            <a:pPr marL="1131570" lvl="2" indent="0"/>
+            <a:r>
+              <a:rPr lang="en-US" dirty="0"/>
+              <a:t>Fix its left paragraph indent</a:t>
+            </a:r>
+          </a:p>
+          <a:p>
+            <a:pPr marL="1131570" lvl="2" indent="0"/>
+            <a:r>
+              <a:rPr lang="en-US" dirty="0"/>
+              <a:t>Adjust the ruler as needed</a:t>
+            </a:r>
+          </a:p>
+          <a:p>
+            <a:pPr marL="1131570" lvl="2" indent="0"/>
+            <a:r>
+              <a:rPr lang="en-US" dirty="0"/>
+              <a:t>Then enter and tab from the first line to create the second level and so on</a:t>
+            </a:r>
+          </a:p>
+          <a:p>
+            <a:pPr marL="674370" lvl="1" indent="0"/>
+            <a:r>
+              <a:rPr lang="en-US" dirty="0"/>
+              <a:t>Second level space adjustments</a:t>
+            </a:r>
+          </a:p>
+          <a:p>
+            <a:pPr marL="1131570" lvl="2" indent="0"/>
+            <a:r>
+              <a:rPr lang="en-US" dirty="0"/>
+              <a:t>Shape left, and paragraph left are preserved</a:t>
+            </a:r>
+          </a:p>
+          <a:p>
+            <a:pPr marL="1131570" lvl="2" indent="0"/>
+            <a:r>
+              <a:rPr lang="en-US" dirty="0"/>
+              <a:t>Adjust the ruler for level 2</a:t>
+            </a:r>
+          </a:p>
+          <a:p>
+            <a:pPr marL="1131570" lvl="2" indent="0"/>
+            <a:r>
+              <a:rPr lang="en-US" dirty="0"/>
+              <a:t>Enter and tab for level 3</a:t>
+            </a:r>
+          </a:p>
+          <a:p>
+            <a:pPr marL="674370" lvl="1" indent="0"/>
+            <a:r>
+              <a:rPr lang="en-US" dirty="0"/>
+              <a:t>Repeat this for all levels</a:t>
+            </a:r>
+          </a:p>
+          <a:p>
+            <a:pPr marL="1131570" lvl="2" indent="0"/>
+            <a:r>
+              <a:rPr lang="en-US" dirty="0"/>
+              <a:t>Mainly the Ruler, rest are honored</a:t>
             </a:r>
           </a:p>
           <a:p>
             <a:pPr marL="274320" indent="0"/>
             <a:r>
-              <a:rPr lang="en-US" sz="1800" dirty="0"/>
-              <a:t>Very tricky!!</a:t>
-            </a:r>
-          </a:p>
-          <a:p>
-            <a:pPr marL="274320" indent="0"/>
-            <a:r>
-              <a:rPr lang="en-US" sz="1800" dirty="0"/>
-              <a:t>Before and after refers to each line inside ONE bullet</a:t>
-            </a:r>
-          </a:p>
-          <a:p>
-            <a:pPr marL="274320" indent="0"/>
-            <a:r>
-              <a:rPr lang="en-US" sz="1800" dirty="0"/>
-              <a:t>Line spacing (single, double, </a:t>
-            </a:r>
-            <a:r>
-              <a:rPr lang="en-US" sz="1800" dirty="0" err="1"/>
-              <a:t>etc</a:t>
-            </a:r>
-            <a:r>
-              <a:rPr lang="en-US" sz="1800" dirty="0"/>
-              <a:t>) is for lines inside a paragraph</a:t>
-            </a:r>
-          </a:p>
-          <a:p>
-            <a:pPr marL="274320" indent="0"/>
-            <a:r>
-              <a:rPr lang="en-US" sz="1800" dirty="0"/>
-              <a:t>Before and after is outside the paragraph</a:t>
-            </a:r>
-          </a:p>
-          <a:p>
-            <a:pPr marL="274320" indent="0"/>
-            <a:r>
-              <a:rPr lang="en-US" sz="1800" dirty="0"/>
-              <a:t>So, if both are in play and if the line is a single line they add up</a:t>
-            </a:r>
-          </a:p>
-          <a:p>
-            <a:pPr marL="274320" indent="0"/>
-            <a:r>
-              <a:rPr lang="en-US" sz="1800" dirty="0"/>
-              <a:t>For single line bullets, the “double spacing” inadvertently acts like as if it is applied to multiple bullets.</a:t>
-            </a:r>
-          </a:p>
-          <a:p>
-            <a:pPr marL="274320" indent="0"/>
-            <a:r>
-              <a:rPr lang="en-US" sz="1800" dirty="0"/>
-              <a:t>Advice</a:t>
-            </a:r>
-          </a:p>
-          <a:p>
-            <a:pPr marL="674370" lvl="1" indent="0"/>
-            <a:r>
-              <a:rPr lang="en-US" sz="1800" dirty="0"/>
-              <a:t>For spacing between the boundary and the list use the “shape” controls not paragraph</a:t>
-            </a:r>
-          </a:p>
-          <a:p>
-            <a:pPr marL="674370" lvl="1" indent="0"/>
-            <a:r>
-              <a:rPr lang="en-US" sz="1800" dirty="0"/>
-              <a:t>Use before and after for better control when the list has bullets that are multi line</a:t>
-            </a:r>
-          </a:p>
-          <a:p>
-            <a:pPr marL="674370" lvl="1" indent="0"/>
-            <a:r>
-              <a:rPr lang="en-US" sz="1800" dirty="0"/>
-              <a:t>For single line ones you can get away with line spacing</a:t>
+              <a:rPr lang="en-US" dirty="0"/>
+              <a:t>So, use the tab work around</a:t>
             </a:r>
           </a:p>
         </p:txBody>
@@ -3728,7 +4043,7 @@
     </p:spTree>
     <p:extLst>
       <p:ext uri="{BB962C8B-B14F-4D97-AF65-F5344CB8AC3E}">
-        <p14:creationId xmlns:p14="http://schemas.microsoft.com/office/powerpoint/2010/main" val="4103118673"/>
+        <p14:creationId xmlns:p14="http://schemas.microsoft.com/office/powerpoint/2010/main" val="2378095540"/>
       </p:ext>
     </p:extLst>
   </p:cSld>
@@ -3778,43 +4093,8 @@
           <a:p>
             <a:r>
               <a:rPr lang="en-US" dirty="0"/>
-              <a:t>Place Holders and Layouts: </a:t>
-            </a:r>
-            <a:r>
-              <a:rPr kumimoji="0" lang="en-US" sz="1800" b="0" i="0" u="none" strike="noStrike" kern="1200" cap="none" spc="0" normalizeH="0" baseline="0" noProof="0" dirty="0">
-                <a:ln>
-                  <a:noFill/>
-                </a:ln>
-                <a:solidFill>
-                  <a:prstClr val="black"/>
-                </a:solidFill>
-                <a:effectLst/>
-                <a:uLnTx/>
-                <a:uFillTx/>
-                <a:latin typeface="Aptos Display" panose="02110004020202020204"/>
-                <a:ea typeface="+mj-ea"/>
-                <a:cs typeface="+mj-cs"/>
-              </a:rPr>
-              <a:t>: </a:t>
-            </a:r>
-            <a:r>
-              <a:rPr kumimoji="0" lang="en-US" sz="1200" b="0" i="1" u="none" strike="noStrike" kern="1200" cap="none" spc="0" normalizeH="0" baseline="0" noProof="0" dirty="0">
-                <a:ln>
-                  <a:noFill/>
-                </a:ln>
-                <a:solidFill>
-                  <a:srgbClr val="00B050"/>
-                </a:solidFill>
-                <a:effectLst/>
-                <a:uLnTx/>
-                <a:uFillTx/>
-                <a:latin typeface="Aptos Display" panose="02110004020202020204"/>
-                <a:ea typeface="+mj-ea"/>
-                <a:cs typeface="+mj-cs"/>
-              </a:rPr>
-              <a:t>Content Page layout: Title + Main content List</a:t>
-            </a:r>
-            <a:endParaRPr lang="en-US" dirty="0"/>
+              <a:t>Paragraph Controls: The spacing options</a:t>
+            </a:r>
           </a:p>
         </p:txBody>
       </p:sp>
@@ -3836,23 +4116,103 @@
         </p:nvSpPr>
         <p:spPr>
           <a:xfrm>
-            <a:off x="838200" y="1160199"/>
-            <a:ext cx="10515600" cy="4351338"/>
+            <a:off x="822959" y="1026634"/>
+            <a:ext cx="10515599" cy="5329715"/>
           </a:xfrm>
         </p:spPr>
         <p:txBody>
-          <a:bodyPr/>
-          <a:lstStyle/>
-          <a:p>
+          <a:bodyPr lIns="0" tIns="91440"/>
+          <a:lstStyle/>
+          <a:p>
+            <a:pPr marL="274320" indent="0"/>
             <a:r>
               <a:rPr lang="en-US" sz="1800" dirty="0"/>
-              <a:t>Insert Place holders are not available on Master layout, but only on child layouts.</a:t>
-            </a:r>
-          </a:p>
-          <a:p>
+              <a:t>They apply to each line (that is a paragraph) in the bulleted list</a:t>
+            </a:r>
+          </a:p>
+          <a:p>
+            <a:pPr marL="274320" indent="0"/>
             <a:r>
               <a:rPr lang="en-US" sz="1800" dirty="0"/>
-              <a:t>Master layout has a fixed number of insertable layouts like title, footer, page etc. These can be turned on or off. That’s it.</a:t>
+              <a:t>Not between the bullets!!</a:t>
+            </a:r>
+          </a:p>
+          <a:p>
+            <a:pPr marL="274320" indent="0"/>
+            <a:r>
+              <a:rPr lang="en-US" sz="1800" dirty="0"/>
+              <a:t>Very tricky!!</a:t>
+            </a:r>
+          </a:p>
+          <a:p>
+            <a:pPr marL="274320" indent="0"/>
+            <a:r>
+              <a:rPr lang="en-US" sz="1800" dirty="0"/>
+              <a:t>Before and after refers to each line inside ONE bullet</a:t>
+            </a:r>
+          </a:p>
+          <a:p>
+            <a:pPr marL="274320" indent="0"/>
+            <a:r>
+              <a:rPr lang="en-US" sz="1800" dirty="0"/>
+              <a:t>Line spacing (single, double, </a:t>
+            </a:r>
+            <a:r>
+              <a:rPr lang="en-US" sz="1800" dirty="0" err="1"/>
+              <a:t>etc</a:t>
+            </a:r>
+            <a:r>
+              <a:rPr lang="en-US" sz="1800" dirty="0"/>
+              <a:t>) is for lines inside a paragraph</a:t>
+            </a:r>
+          </a:p>
+          <a:p>
+            <a:pPr marL="274320" indent="0"/>
+            <a:r>
+              <a:rPr lang="en-US" sz="1800" dirty="0"/>
+              <a:t>Before and after is outside the paragraph</a:t>
+            </a:r>
+          </a:p>
+          <a:p>
+            <a:pPr marL="274320" indent="0"/>
+            <a:r>
+              <a:rPr lang="en-US" sz="1800" dirty="0"/>
+              <a:t>So, if both are in play and if the line is a single line they add up</a:t>
+            </a:r>
+          </a:p>
+          <a:p>
+            <a:pPr marL="274320" indent="0"/>
+            <a:r>
+              <a:rPr lang="en-US" sz="1800" dirty="0"/>
+              <a:t>For single line bullets, the “double spacing” inadvertently acts like as if it is applied to multiple bullets.</a:t>
+            </a:r>
+          </a:p>
+          <a:p>
+            <a:pPr marL="274320" indent="0"/>
+            <a:r>
+              <a:rPr lang="en-US" sz="1800" dirty="0"/>
+              <a:t>Advice</a:t>
+            </a:r>
+          </a:p>
+          <a:p>
+            <a:pPr marL="674370" lvl="1" indent="0"/>
+            <a:r>
+              <a:rPr lang="en-US" sz="1800" dirty="0"/>
+              <a:t>For spacing between the boundary and the list use the “shape” controls not paragraph</a:t>
+            </a:r>
+          </a:p>
+          <a:p>
+            <a:pPr marL="674370" lvl="1" indent="0"/>
+            <a:r>
+              <a:rPr lang="en-US" sz="1800" dirty="0"/>
+              <a:t>Use before and after for better control when the list has bullets that are multi line</a:t>
+            </a:r>
+          </a:p>
+          <a:p>
+            <a:pPr marL="674370" lvl="1" indent="0"/>
+            <a:r>
+              <a:rPr lang="en-US" sz="1800" dirty="0"/>
+              <a:t>For single line ones you can get away with line spacing</a:t>
             </a:r>
           </a:p>
         </p:txBody>
@@ -3862,7 +4222,7 @@
           <p:cNvPr id="2" name="Slide Number Placeholder 1">
             <a:extLst>
               <a:ext uri="{FF2B5EF4-FFF2-40B4-BE49-F238E27FC236}">
-                <a16:creationId xmlns:a16="http://schemas.microsoft.com/office/drawing/2014/main" id="{C6821A94-6BAD-9F3A-7582-507F97BAC898}"/>
+                <a16:creationId xmlns:a16="http://schemas.microsoft.com/office/drawing/2014/main" id="{856375BB-A417-BFDF-DF3D-984BE8D7CEFE}"/>
               </a:ext>
             </a:extLst>
           </p:cNvPr>
@@ -3889,7 +4249,7 @@
     </p:spTree>
     <p:extLst>
       <p:ext uri="{BB962C8B-B14F-4D97-AF65-F5344CB8AC3E}">
-        <p14:creationId xmlns:p14="http://schemas.microsoft.com/office/powerpoint/2010/main" val="2604000396"/>
+        <p14:creationId xmlns:p14="http://schemas.microsoft.com/office/powerpoint/2010/main" val="4103118673"/>
       </p:ext>
     </p:extLst>
   </p:cSld>
@@ -3939,8 +4299,43 @@
           <a:p>
             <a:r>
               <a:rPr lang="en-US" dirty="0"/>
-              <a:t>Multiple Master Layouts</a:t>
-            </a:r>
+              <a:t>Place Holders and Layouts: </a:t>
+            </a:r>
+            <a:r>
+              <a:rPr kumimoji="0" lang="en-US" sz="1800" b="0" i="0" u="none" strike="noStrike" kern="1200" cap="none" spc="0" normalizeH="0" baseline="0" noProof="0" dirty="0">
+                <a:ln>
+                  <a:noFill/>
+                </a:ln>
+                <a:solidFill>
+                  <a:prstClr val="black"/>
+                </a:solidFill>
+                <a:effectLst/>
+                <a:uLnTx/>
+                <a:uFillTx/>
+                <a:latin typeface="Aptos Display" panose="02110004020202020204"/>
+                <a:ea typeface="+mj-ea"/>
+                <a:cs typeface="+mj-cs"/>
+              </a:rPr>
+              <a:t>: </a:t>
+            </a:r>
+            <a:r>
+              <a:rPr kumimoji="0" lang="en-US" sz="1200" b="0" i="1" u="none" strike="noStrike" kern="1200" cap="none" spc="0" normalizeH="0" baseline="0" noProof="0" dirty="0">
+                <a:ln>
+                  <a:noFill/>
+                </a:ln>
+                <a:solidFill>
+                  <a:srgbClr val="00B050"/>
+                </a:solidFill>
+                <a:effectLst/>
+                <a:uLnTx/>
+                <a:uFillTx/>
+                <a:latin typeface="Aptos Display" panose="02110004020202020204"/>
+                <a:ea typeface="+mj-ea"/>
+                <a:cs typeface="+mj-cs"/>
+              </a:rPr>
+              <a:t>Content Page layout: Title + Main content List</a:t>
+            </a:r>
+            <a:endParaRPr lang="en-US" dirty="0"/>
           </a:p>
         </p:txBody>
       </p:sp>
@@ -3962,8 +4357,8 @@
         </p:nvSpPr>
         <p:spPr>
           <a:xfrm>
-            <a:off x="838200" y="1026635"/>
-            <a:ext cx="10515600" cy="4901554"/>
+            <a:off x="838200" y="1160199"/>
+            <a:ext cx="10515600" cy="4351338"/>
           </a:xfrm>
         </p:spPr>
         <p:txBody>
@@ -3972,49 +4367,13 @@
           <a:p>
             <a:r>
               <a:rPr lang="en-US" sz="1800" dirty="0"/>
-              <a:t>Say, most pages want a divider line between title and the content. Say these are 100 pages.</a:t>
+              <a:t>Insert Place holders are not available on Master layout, but only on child layouts.</a:t>
             </a:r>
           </a:p>
           <a:p>
             <a:r>
               <a:rPr lang="en-US" sz="1800" dirty="0"/>
-              <a:t>So you do that....</a:t>
-            </a:r>
-          </a:p>
-          <a:p>
-            <a:r>
-              <a:rPr lang="en-US" sz="1800" dirty="0"/>
-              <a:t>Now you want a page that doesn't have that title</a:t>
-            </a:r>
-          </a:p>
-          <a:p>
-            <a:r>
-              <a:rPr lang="en-US" sz="1800" dirty="0"/>
-              <a:t>Say these are 10 pages</a:t>
-            </a:r>
-          </a:p>
-          <a:p>
-            <a:r>
-              <a:rPr lang="en-US" sz="1800" dirty="0"/>
-              <a:t>These pages cannot use a layout from the other master because they will get the line a the top!</a:t>
-            </a:r>
-          </a:p>
-          <a:p>
-            <a:r>
-              <a:rPr lang="en-US" sz="1800" dirty="0"/>
-              <a:t>So you need to create another master layout without that line!</a:t>
-            </a:r>
-          </a:p>
-          <a:p>
-            <a:r>
-              <a:rPr lang="en-US" sz="1800" dirty="0"/>
-              <a:t>Now you have 2 masters!</a:t>
-            </a:r>
-          </a:p>
-          <a:p>
-            <a:r>
-              <a:rPr lang="en-US" sz="1800" dirty="0"/>
-              <a:t>there may be other ways to do it, but this is one way!</a:t>
+              <a:t>Master layout has a fixed number of insertable layouts like title, footer, page etc. These can be turned on or off. That’s it.</a:t>
             </a:r>
           </a:p>
         </p:txBody>
@@ -4024,7 +4383,7 @@
           <p:cNvPr id="2" name="Slide Number Placeholder 1">
             <a:extLst>
               <a:ext uri="{FF2B5EF4-FFF2-40B4-BE49-F238E27FC236}">
-                <a16:creationId xmlns:a16="http://schemas.microsoft.com/office/drawing/2014/main" id="{FAF85DC8-5A57-FE03-5A3A-8CC218E0C641}"/>
+                <a16:creationId xmlns:a16="http://schemas.microsoft.com/office/drawing/2014/main" id="{C6821A94-6BAD-9F3A-7582-507F97BAC898}"/>
               </a:ext>
             </a:extLst>
           </p:cNvPr>
@@ -4051,7 +4410,7 @@
     </p:spTree>
     <p:extLst>
       <p:ext uri="{BB962C8B-B14F-4D97-AF65-F5344CB8AC3E}">
-        <p14:creationId xmlns:p14="http://schemas.microsoft.com/office/powerpoint/2010/main" val="495550801"/>
+        <p14:creationId xmlns:p14="http://schemas.microsoft.com/office/powerpoint/2010/main" val="2604000396"/>
       </p:ext>
     </p:extLst>
   </p:cSld>
@@ -4101,7 +4460,7 @@
           <a:p>
             <a:r>
               <a:rPr lang="en-US" dirty="0"/>
-              <a:t>A separate master for non-content pages</a:t>
+              <a:t>Multiple Master Layouts</a:t>
             </a:r>
           </a:p>
         </p:txBody>
@@ -4134,31 +4493,49 @@
           <a:p>
             <a:r>
               <a:rPr lang="en-US" sz="1800" dirty="0"/>
-              <a:t>May be a good idea to use a separate master for non content pages</a:t>
+              <a:t>Say, most pages want a divider line between title and the content. Say these are 100 pages.</a:t>
             </a:r>
           </a:p>
           <a:p>
             <a:r>
               <a:rPr lang="en-US" sz="1800" dirty="0"/>
-              <a:t>Title page</a:t>
+              <a:t>So you do that....</a:t>
             </a:r>
           </a:p>
           <a:p>
             <a:r>
               <a:rPr lang="en-US" sz="1800" dirty="0"/>
-              <a:t>Separator page</a:t>
+              <a:t>Now you want a page that doesn't have that title</a:t>
             </a:r>
           </a:p>
           <a:p>
             <a:r>
               <a:rPr lang="en-US" sz="1800" dirty="0"/>
-              <a:t>This one typically misses the a) page title b) horizontal line at the top etc.</a:t>
+              <a:t>Say these are 10 pages</a:t>
             </a:r>
           </a:p>
           <a:p>
             <a:r>
               <a:rPr lang="en-US" sz="1800" dirty="0"/>
-              <a:t>Any drawings or images you place on a master cannot be removed from children!!</a:t>
+              <a:t>These pages cannot use a layout from the other master because they will get the line a the top!</a:t>
+            </a:r>
+          </a:p>
+          <a:p>
+            <a:r>
+              <a:rPr lang="en-US" sz="1800" dirty="0"/>
+              <a:t>So you need to create another master layout without that line!</a:t>
+            </a:r>
+          </a:p>
+          <a:p>
+            <a:r>
+              <a:rPr lang="en-US" sz="1800" dirty="0"/>
+              <a:t>Now you have 2 masters!</a:t>
+            </a:r>
+          </a:p>
+          <a:p>
+            <a:r>
+              <a:rPr lang="en-US" sz="1800" dirty="0"/>
+              <a:t>there may be other ways to do it, but this is one way!</a:t>
             </a:r>
           </a:p>
         </p:txBody>
@@ -4195,7 +4572,7 @@
     </p:spTree>
     <p:extLst>
       <p:ext uri="{BB962C8B-B14F-4D97-AF65-F5344CB8AC3E}">
-        <p14:creationId xmlns:p14="http://schemas.microsoft.com/office/powerpoint/2010/main" val="1878373529"/>
+        <p14:creationId xmlns:p14="http://schemas.microsoft.com/office/powerpoint/2010/main" val="495550801"/>
       </p:ext>
     </p:extLst>
   </p:cSld>
@@ -4227,7 +4604,7 @@
           <p:cNvPr id="4" name="Title 3">
             <a:extLst>
               <a:ext uri="{FF2B5EF4-FFF2-40B4-BE49-F238E27FC236}">
-                <a16:creationId xmlns:a16="http://schemas.microsoft.com/office/drawing/2014/main" id="{BB2BD00F-8EA4-14C5-BD5F-97F9AD513213}"/>
+                <a16:creationId xmlns:a16="http://schemas.microsoft.com/office/drawing/2014/main" id="{0D0E3244-86CC-ED51-EFBC-B4D48F99AEED}"/>
               </a:ext>
             </a:extLst>
           </p:cNvPr>
@@ -4235,7 +4612,7 @@
             <a:spLocks noGrp="1"/>
           </p:cNvSpPr>
           <p:nvPr>
-            <p:ph type="ctrTitle"/>
+            <p:ph type="title"/>
           </p:nvPr>
         </p:nvSpPr>
         <p:spPr/>
@@ -4245,25 +4622,74 @@
           <a:p>
             <a:r>
               <a:rPr lang="en-US" dirty="0"/>
-              <a:t>Demonstrating the 2</a:t>
-            </a:r>
-            <a:r>
-              <a:rPr lang="en-US" baseline="30000" dirty="0"/>
-              <a:t>nd</a:t>
-            </a:r>
-            <a:r>
-              <a:rPr lang="en-US" dirty="0"/>
-              <a:t> Master Style</a:t>
-            </a:r>
-          </a:p>
-        </p:txBody>
-      </p:sp>
-      <p:sp>
-        <p:nvSpPr>
-          <p:cNvPr id="3" name="Slide Number Placeholder 2">
-            <a:extLst>
-              <a:ext uri="{FF2B5EF4-FFF2-40B4-BE49-F238E27FC236}">
-                <a16:creationId xmlns:a16="http://schemas.microsoft.com/office/drawing/2014/main" id="{CEF38F97-C294-632E-FD05-A5A19DE454DC}"/>
+              <a:t>A separate master for non-content pages</a:t>
+            </a:r>
+          </a:p>
+        </p:txBody>
+      </p:sp>
+      <p:sp>
+        <p:nvSpPr>
+          <p:cNvPr id="3" name="Content Placeholder 2">
+            <a:extLst>
+              <a:ext uri="{FF2B5EF4-FFF2-40B4-BE49-F238E27FC236}">
+                <a16:creationId xmlns:a16="http://schemas.microsoft.com/office/drawing/2014/main" id="{5F640BAD-5564-4449-341E-F0DC31C356F5}"/>
+              </a:ext>
+            </a:extLst>
+          </p:cNvPr>
+          <p:cNvSpPr>
+            <a:spLocks noGrp="1"/>
+          </p:cNvSpPr>
+          <p:nvPr>
+            <p:ph idx="1"/>
+          </p:nvPr>
+        </p:nvSpPr>
+        <p:spPr>
+          <a:xfrm>
+            <a:off x="838200" y="1026635"/>
+            <a:ext cx="10515600" cy="4901554"/>
+          </a:xfrm>
+        </p:spPr>
+        <p:txBody>
+          <a:bodyPr/>
+          <a:lstStyle/>
+          <a:p>
+            <a:r>
+              <a:rPr lang="en-US" sz="1800" dirty="0"/>
+              <a:t>May be a good idea to use a separate master for non content pages</a:t>
+            </a:r>
+          </a:p>
+          <a:p>
+            <a:r>
+              <a:rPr lang="en-US" sz="1800" dirty="0"/>
+              <a:t>Title page</a:t>
+            </a:r>
+          </a:p>
+          <a:p>
+            <a:r>
+              <a:rPr lang="en-US" sz="1800" dirty="0"/>
+              <a:t>Separator page</a:t>
+            </a:r>
+          </a:p>
+          <a:p>
+            <a:r>
+              <a:rPr lang="en-US" sz="1800" dirty="0"/>
+              <a:t>This one typically misses the a) page title b) horizontal line at the top etc.</a:t>
+            </a:r>
+          </a:p>
+          <a:p>
+            <a:r>
+              <a:rPr lang="en-US" sz="1800" dirty="0"/>
+              <a:t>Any drawings or images you place on a master cannot be removed from children!!</a:t>
+            </a:r>
+          </a:p>
+        </p:txBody>
+      </p:sp>
+      <p:sp>
+        <p:nvSpPr>
+          <p:cNvPr id="2" name="Slide Number Placeholder 1">
+            <a:extLst>
+              <a:ext uri="{FF2B5EF4-FFF2-40B4-BE49-F238E27FC236}">
+                <a16:creationId xmlns:a16="http://schemas.microsoft.com/office/drawing/2014/main" id="{FAF85DC8-5A57-FE03-5A3A-8CC218E0C641}"/>
               </a:ext>
             </a:extLst>
           </p:cNvPr>
@@ -4287,62 +4713,10 @@
           </a:p>
         </p:txBody>
       </p:sp>
-      <p:sp>
-        <p:nvSpPr>
-          <p:cNvPr id="2" name="TextBox 1">
-            <a:extLst>
-              <a:ext uri="{FF2B5EF4-FFF2-40B4-BE49-F238E27FC236}">
-                <a16:creationId xmlns:a16="http://schemas.microsoft.com/office/drawing/2014/main" id="{330C3690-3838-041D-3E68-4BC2C594DD48}"/>
-              </a:ext>
-            </a:extLst>
-          </p:cNvPr>
-          <p:cNvSpPr txBox="1"/>
-          <p:nvPr/>
-        </p:nvSpPr>
-        <p:spPr>
-          <a:xfrm>
-            <a:off x="1381875" y="4964188"/>
-            <a:ext cx="9092629" cy="812648"/>
-          </a:xfrm>
-          <a:prstGeom prst="rect">
-            <a:avLst/>
-          </a:prstGeom>
-          <a:noFill/>
-          <a:ln w="28575">
-            <a:solidFill>
-              <a:schemeClr val="accent2"/>
-            </a:solidFill>
-          </a:ln>
-        </p:spPr>
-        <p:txBody>
-          <a:bodyPr wrap="square" rtlCol="0">
-            <a:noAutofit/>
-          </a:bodyPr>
-          <a:lstStyle/>
-          <a:p>
-            <a:pPr marL="342900" indent="-342900">
-              <a:buAutoNum type="arabicPeriod"/>
-            </a:pPr>
-            <a:r>
-              <a:rPr lang="en-US" dirty="0"/>
-              <a:t>Uses the Non-Title-Master master</a:t>
-            </a:r>
-          </a:p>
-          <a:p>
-            <a:pPr marL="342900" indent="-342900">
-              <a:buAutoNum type="arabicPeriod"/>
-            </a:pPr>
-            <a:r>
-              <a:rPr lang="en-US" dirty="0"/>
-              <a:t>Uses a “separator” layout</a:t>
-            </a:r>
-          </a:p>
-        </p:txBody>
-      </p:sp>
     </p:spTree>
     <p:extLst>
       <p:ext uri="{BB962C8B-B14F-4D97-AF65-F5344CB8AC3E}">
-        <p14:creationId xmlns:p14="http://schemas.microsoft.com/office/powerpoint/2010/main" val="2251273196"/>
+        <p14:creationId xmlns:p14="http://schemas.microsoft.com/office/powerpoint/2010/main" val="1878373529"/>
       </p:ext>
     </p:extLst>
   </p:cSld>
@@ -4392,7 +4766,15 @@
           <a:p>
             <a:r>
               <a:rPr lang="en-US" dirty="0"/>
-              <a:t>Recommendation</a:t>
+              <a:t>Demonstrating the 2</a:t>
+            </a:r>
+            <a:r>
+              <a:rPr lang="en-US" baseline="30000" dirty="0"/>
+              <a:t>nd</a:t>
+            </a:r>
+            <a:r>
+              <a:rPr lang="en-US" dirty="0"/>
+              <a:t> Master Style</a:t>
             </a:r>
           </a:p>
         </p:txBody>
@@ -4426,10 +4808,62 @@
           </a:p>
         </p:txBody>
       </p:sp>
+      <p:sp>
+        <p:nvSpPr>
+          <p:cNvPr id="2" name="TextBox 1">
+            <a:extLst>
+              <a:ext uri="{FF2B5EF4-FFF2-40B4-BE49-F238E27FC236}">
+                <a16:creationId xmlns:a16="http://schemas.microsoft.com/office/drawing/2014/main" id="{330C3690-3838-041D-3E68-4BC2C594DD48}"/>
+              </a:ext>
+            </a:extLst>
+          </p:cNvPr>
+          <p:cNvSpPr txBox="1"/>
+          <p:nvPr/>
+        </p:nvSpPr>
+        <p:spPr>
+          <a:xfrm>
+            <a:off x="1381875" y="4964188"/>
+            <a:ext cx="9092629" cy="812648"/>
+          </a:xfrm>
+          <a:prstGeom prst="rect">
+            <a:avLst/>
+          </a:prstGeom>
+          <a:noFill/>
+          <a:ln w="28575">
+            <a:solidFill>
+              <a:schemeClr val="accent2"/>
+            </a:solidFill>
+          </a:ln>
+        </p:spPr>
+        <p:txBody>
+          <a:bodyPr wrap="square" rtlCol="0">
+            <a:noAutofit/>
+          </a:bodyPr>
+          <a:lstStyle/>
+          <a:p>
+            <a:pPr marL="342900" indent="-342900">
+              <a:buAutoNum type="arabicPeriod"/>
+            </a:pPr>
+            <a:r>
+              <a:rPr lang="en-US" dirty="0"/>
+              <a:t>Uses the Non-Title-Master master</a:t>
+            </a:r>
+          </a:p>
+          <a:p>
+            <a:pPr marL="342900" indent="-342900">
+              <a:buAutoNum type="arabicPeriod"/>
+            </a:pPr>
+            <a:r>
+              <a:rPr lang="en-US" dirty="0"/>
+              <a:t>Uses a “separator” layout</a:t>
+            </a:r>
+          </a:p>
+        </p:txBody>
+      </p:sp>
     </p:spTree>
     <p:extLst>
       <p:ext uri="{BB962C8B-B14F-4D97-AF65-F5344CB8AC3E}">
-        <p14:creationId xmlns:p14="http://schemas.microsoft.com/office/powerpoint/2010/main" val="3049210581"/>
+        <p14:creationId xmlns:p14="http://schemas.microsoft.com/office/powerpoint/2010/main" val="2251273196"/>
       </p:ext>
     </p:extLst>
   </p:cSld>
@@ -4461,7 +4895,7 @@
           <p:cNvPr id="4" name="Title 3">
             <a:extLst>
               <a:ext uri="{FF2B5EF4-FFF2-40B4-BE49-F238E27FC236}">
-                <a16:creationId xmlns:a16="http://schemas.microsoft.com/office/drawing/2014/main" id="{0D0E3244-86CC-ED51-EFBC-B4D48F99AEED}"/>
+                <a16:creationId xmlns:a16="http://schemas.microsoft.com/office/drawing/2014/main" id="{BB2BD00F-8EA4-14C5-BD5F-97F9AD513213}"/>
               </a:ext>
             </a:extLst>
           </p:cNvPr>
@@ -4469,7 +4903,7 @@
             <a:spLocks noGrp="1"/>
           </p:cNvSpPr>
           <p:nvPr>
-            <p:ph type="title"/>
+            <p:ph type="ctrTitle"/>
           </p:nvPr>
         </p:nvSpPr>
         <p:spPr/>
@@ -4479,979 +4913,7 @@
           <a:p>
             <a:r>
               <a:rPr lang="en-US" dirty="0"/>
-              <a:t>Guidance: Design of layouts for lists: Primary and Secondary Options</a:t>
-            </a:r>
-          </a:p>
-        </p:txBody>
-      </p:sp>
-      <p:sp>
-        <p:nvSpPr>
-          <p:cNvPr id="2" name="Rectangle 1">
-            <a:extLst>
-              <a:ext uri="{FF2B5EF4-FFF2-40B4-BE49-F238E27FC236}">
-                <a16:creationId xmlns:a16="http://schemas.microsoft.com/office/drawing/2014/main" id="{E3FD8DAD-0002-ECA3-09EE-39011DED416A}"/>
-              </a:ext>
-            </a:extLst>
-          </p:cNvPr>
-          <p:cNvSpPr/>
-          <p:nvPr/>
-        </p:nvSpPr>
-        <p:spPr>
-          <a:xfrm>
-            <a:off x="838200" y="3287730"/>
-            <a:ext cx="2178121" cy="598470"/>
-          </a:xfrm>
-          <a:prstGeom prst="rect">
-            <a:avLst/>
-          </a:prstGeom>
-        </p:spPr>
-        <p:style>
-          <a:lnRef idx="2">
-            <a:schemeClr val="accent1">
-              <a:shade val="15000"/>
-            </a:schemeClr>
-          </a:lnRef>
-          <a:fillRef idx="1">
-            <a:schemeClr val="accent1"/>
-          </a:fillRef>
-          <a:effectRef idx="0">
-            <a:schemeClr val="accent1"/>
-          </a:effectRef>
-          <a:fontRef idx="minor">
-            <a:schemeClr val="lt1"/>
-          </a:fontRef>
-        </p:style>
-        <p:txBody>
-          <a:bodyPr rtlCol="0" anchor="ctr"/>
-          <a:lstStyle/>
-          <a:p>
-            <a:pPr algn="ctr"/>
-            <a:r>
-              <a:rPr lang="en-US" dirty="0"/>
-              <a:t>Content layout</a:t>
-            </a:r>
-          </a:p>
-        </p:txBody>
-      </p:sp>
-      <p:sp>
-        <p:nvSpPr>
-          <p:cNvPr id="5" name="Rectangle 4">
-            <a:extLst>
-              <a:ext uri="{FF2B5EF4-FFF2-40B4-BE49-F238E27FC236}">
-                <a16:creationId xmlns:a16="http://schemas.microsoft.com/office/drawing/2014/main" id="{33C18229-8A3D-70BE-2A35-F0C7FEEA4BBD}"/>
-              </a:ext>
-            </a:extLst>
-          </p:cNvPr>
-          <p:cNvSpPr/>
-          <p:nvPr/>
-        </p:nvSpPr>
-        <p:spPr>
-          <a:xfrm>
-            <a:off x="4177301" y="2178122"/>
-            <a:ext cx="3076254" cy="598470"/>
-          </a:xfrm>
-          <a:prstGeom prst="rect">
-            <a:avLst/>
-          </a:prstGeom>
-        </p:spPr>
-        <p:style>
-          <a:lnRef idx="2">
-            <a:schemeClr val="accent1">
-              <a:shade val="15000"/>
-            </a:schemeClr>
-          </a:lnRef>
-          <a:fillRef idx="1">
-            <a:schemeClr val="accent1"/>
-          </a:fillRef>
-          <a:effectRef idx="0">
-            <a:schemeClr val="accent1"/>
-          </a:effectRef>
-          <a:fontRef idx="minor">
-            <a:schemeClr val="lt1"/>
-          </a:fontRef>
-        </p:style>
-        <p:txBody>
-          <a:bodyPr rtlCol="0" anchor="ctr"/>
-          <a:lstStyle/>
-          <a:p>
-            <a:pPr algn="ctr"/>
-            <a:r>
-              <a:rPr lang="en-US" dirty="0"/>
-              <a:t>Content with 1 list</a:t>
-            </a:r>
-          </a:p>
-        </p:txBody>
-      </p:sp>
-      <p:sp>
-        <p:nvSpPr>
-          <p:cNvPr id="6" name="Rectangle 5">
-            <a:extLst>
-              <a:ext uri="{FF2B5EF4-FFF2-40B4-BE49-F238E27FC236}">
-                <a16:creationId xmlns:a16="http://schemas.microsoft.com/office/drawing/2014/main" id="{9981450D-B959-E60E-143A-F8792FAFE4BF}"/>
-              </a:ext>
-            </a:extLst>
-          </p:cNvPr>
-          <p:cNvSpPr/>
-          <p:nvPr/>
-        </p:nvSpPr>
-        <p:spPr>
-          <a:xfrm>
-            <a:off x="4177301" y="3129765"/>
-            <a:ext cx="3076254" cy="598470"/>
-          </a:xfrm>
-          <a:prstGeom prst="rect">
-            <a:avLst/>
-          </a:prstGeom>
-        </p:spPr>
-        <p:style>
-          <a:lnRef idx="2">
-            <a:schemeClr val="accent1">
-              <a:shade val="15000"/>
-            </a:schemeClr>
-          </a:lnRef>
-          <a:fillRef idx="1">
-            <a:schemeClr val="accent1"/>
-          </a:fillRef>
-          <a:effectRef idx="0">
-            <a:schemeClr val="accent1"/>
-          </a:effectRef>
-          <a:fontRef idx="minor">
-            <a:schemeClr val="lt1"/>
-          </a:fontRef>
-        </p:style>
-        <p:txBody>
-          <a:bodyPr rtlCol="0" anchor="ctr"/>
-          <a:lstStyle/>
-          <a:p>
-            <a:pPr algn="ctr"/>
-            <a:r>
-              <a:rPr lang="en-US" dirty="0"/>
-              <a:t>Content with 2 lists</a:t>
-            </a:r>
-          </a:p>
-        </p:txBody>
-      </p:sp>
-      <p:sp>
-        <p:nvSpPr>
-          <p:cNvPr id="7" name="Rectangle 6">
-            <a:extLst>
-              <a:ext uri="{FF2B5EF4-FFF2-40B4-BE49-F238E27FC236}">
-                <a16:creationId xmlns:a16="http://schemas.microsoft.com/office/drawing/2014/main" id="{5808AFAA-5EAC-2DDF-404E-CAF6D6D0A228}"/>
-              </a:ext>
-            </a:extLst>
-          </p:cNvPr>
-          <p:cNvSpPr/>
-          <p:nvPr/>
-        </p:nvSpPr>
-        <p:spPr>
-          <a:xfrm>
-            <a:off x="4177301" y="4081408"/>
-            <a:ext cx="3076254" cy="598470"/>
-          </a:xfrm>
-          <a:prstGeom prst="rect">
-            <a:avLst/>
-          </a:prstGeom>
-        </p:spPr>
-        <p:style>
-          <a:lnRef idx="2">
-            <a:schemeClr val="accent1">
-              <a:shade val="15000"/>
-            </a:schemeClr>
-          </a:lnRef>
-          <a:fillRef idx="1">
-            <a:schemeClr val="accent1"/>
-          </a:fillRef>
-          <a:effectRef idx="0">
-            <a:schemeClr val="accent1"/>
-          </a:effectRef>
-          <a:fontRef idx="minor">
-            <a:schemeClr val="lt1"/>
-          </a:fontRef>
-        </p:style>
-        <p:txBody>
-          <a:bodyPr rtlCol="0" anchor="ctr"/>
-          <a:lstStyle/>
-          <a:p>
-            <a:pPr algn="ctr"/>
-            <a:r>
-              <a:rPr lang="en-US" dirty="0"/>
-              <a:t>Content with 3 lists</a:t>
-            </a:r>
-          </a:p>
-        </p:txBody>
-      </p:sp>
-      <p:cxnSp>
-        <p:nvCxnSpPr>
-          <p:cNvPr id="9" name="Straight Arrow Connector 8">
-            <a:extLst>
-              <a:ext uri="{FF2B5EF4-FFF2-40B4-BE49-F238E27FC236}">
-                <a16:creationId xmlns:a16="http://schemas.microsoft.com/office/drawing/2014/main" id="{C4488C34-9066-A344-56BF-341A1C546668}"/>
-              </a:ext>
-            </a:extLst>
-          </p:cNvPr>
-          <p:cNvCxnSpPr>
-            <a:stCxn id="2" idx="3"/>
-            <a:endCxn id="5" idx="1"/>
-          </p:cNvCxnSpPr>
-          <p:nvPr/>
-        </p:nvCxnSpPr>
-        <p:spPr>
-          <a:xfrm flipV="1">
-            <a:off x="3016321" y="2477357"/>
-            <a:ext cx="1160980" cy="1109608"/>
-          </a:xfrm>
-          <a:prstGeom prst="straightConnector1">
-            <a:avLst/>
-          </a:prstGeom>
-          <a:ln>
-            <a:tailEnd type="triangle"/>
-          </a:ln>
-        </p:spPr>
-        <p:style>
-          <a:lnRef idx="2">
-            <a:schemeClr val="accent1"/>
-          </a:lnRef>
-          <a:fillRef idx="0">
-            <a:schemeClr val="accent1"/>
-          </a:fillRef>
-          <a:effectRef idx="1">
-            <a:schemeClr val="accent1"/>
-          </a:effectRef>
-          <a:fontRef idx="minor">
-            <a:schemeClr val="tx1"/>
-          </a:fontRef>
-        </p:style>
-      </p:cxnSp>
-      <p:cxnSp>
-        <p:nvCxnSpPr>
-          <p:cNvPr id="10" name="Straight Arrow Connector 9">
-            <a:extLst>
-              <a:ext uri="{FF2B5EF4-FFF2-40B4-BE49-F238E27FC236}">
-                <a16:creationId xmlns:a16="http://schemas.microsoft.com/office/drawing/2014/main" id="{BA56CA6B-ACBB-7034-F921-F66C40A2938E}"/>
-              </a:ext>
-            </a:extLst>
-          </p:cNvPr>
-          <p:cNvCxnSpPr>
-            <a:cxnSpLocks/>
-            <a:stCxn id="2" idx="3"/>
-            <a:endCxn id="6" idx="1"/>
-          </p:cNvCxnSpPr>
-          <p:nvPr/>
-        </p:nvCxnSpPr>
-        <p:spPr>
-          <a:xfrm flipV="1">
-            <a:off x="3016321" y="3429000"/>
-            <a:ext cx="1160980" cy="157965"/>
-          </a:xfrm>
-          <a:prstGeom prst="straightConnector1">
-            <a:avLst/>
-          </a:prstGeom>
-          <a:ln>
-            <a:tailEnd type="triangle"/>
-          </a:ln>
-        </p:spPr>
-        <p:style>
-          <a:lnRef idx="2">
-            <a:schemeClr val="accent1"/>
-          </a:lnRef>
-          <a:fillRef idx="0">
-            <a:schemeClr val="accent1"/>
-          </a:fillRef>
-          <a:effectRef idx="1">
-            <a:schemeClr val="accent1"/>
-          </a:effectRef>
-          <a:fontRef idx="minor">
-            <a:schemeClr val="tx1"/>
-          </a:fontRef>
-        </p:style>
-      </p:cxnSp>
-      <p:cxnSp>
-        <p:nvCxnSpPr>
-          <p:cNvPr id="11" name="Straight Arrow Connector 10">
-            <a:extLst>
-              <a:ext uri="{FF2B5EF4-FFF2-40B4-BE49-F238E27FC236}">
-                <a16:creationId xmlns:a16="http://schemas.microsoft.com/office/drawing/2014/main" id="{26DA93C0-B104-55E9-ED99-3DEB304A22B7}"/>
-              </a:ext>
-            </a:extLst>
-          </p:cNvPr>
-          <p:cNvCxnSpPr>
-            <a:cxnSpLocks/>
-            <a:stCxn id="2" idx="3"/>
-            <a:endCxn id="7" idx="1"/>
-          </p:cNvCxnSpPr>
-          <p:nvPr/>
-        </p:nvCxnSpPr>
-        <p:spPr>
-          <a:xfrm>
-            <a:off x="3016321" y="3586965"/>
-            <a:ext cx="1160980" cy="793678"/>
-          </a:xfrm>
-          <a:prstGeom prst="straightConnector1">
-            <a:avLst/>
-          </a:prstGeom>
-          <a:ln>
-            <a:tailEnd type="triangle"/>
-          </a:ln>
-        </p:spPr>
-        <p:style>
-          <a:lnRef idx="2">
-            <a:schemeClr val="accent1"/>
-          </a:lnRef>
-          <a:fillRef idx="0">
-            <a:schemeClr val="accent1"/>
-          </a:fillRef>
-          <a:effectRef idx="1">
-            <a:schemeClr val="accent1"/>
-          </a:effectRef>
-          <a:fontRef idx="minor">
-            <a:schemeClr val="tx1"/>
-          </a:fontRef>
-        </p:style>
-      </p:cxnSp>
-      <p:sp>
-        <p:nvSpPr>
-          <p:cNvPr id="16" name="Rectangle 15">
-            <a:extLst>
-              <a:ext uri="{FF2B5EF4-FFF2-40B4-BE49-F238E27FC236}">
-                <a16:creationId xmlns:a16="http://schemas.microsoft.com/office/drawing/2014/main" id="{AB59A247-3607-4956-8E77-3B98E50E9EA4}"/>
-              </a:ext>
-            </a:extLst>
-          </p:cNvPr>
-          <p:cNvSpPr/>
-          <p:nvPr/>
-        </p:nvSpPr>
-        <p:spPr>
-          <a:xfrm>
-            <a:off x="8126857" y="2178122"/>
-            <a:ext cx="2373330" cy="2501756"/>
-          </a:xfrm>
-          <a:prstGeom prst="rect">
-            <a:avLst/>
-          </a:prstGeom>
-        </p:spPr>
-        <p:style>
-          <a:lnRef idx="2">
-            <a:schemeClr val="accent1">
-              <a:shade val="15000"/>
-            </a:schemeClr>
-          </a:lnRef>
-          <a:fillRef idx="1">
-            <a:schemeClr val="accent1"/>
-          </a:fillRef>
-          <a:effectRef idx="0">
-            <a:schemeClr val="accent1"/>
-          </a:effectRef>
-          <a:fontRef idx="minor">
-            <a:schemeClr val="lt1"/>
-          </a:fontRef>
-        </p:style>
-        <p:txBody>
-          <a:bodyPr rtlCol="0" anchor="ctr"/>
-          <a:lstStyle/>
-          <a:p>
-            <a:pPr algn="ctr"/>
-            <a:r>
-              <a:rPr lang="en-US" dirty="0"/>
-              <a:t>Have pages use one of these layouts</a:t>
-            </a:r>
-          </a:p>
-        </p:txBody>
-      </p:sp>
-      <p:sp>
-        <p:nvSpPr>
-          <p:cNvPr id="17" name="Rectangle 16">
-            <a:extLst>
-              <a:ext uri="{FF2B5EF4-FFF2-40B4-BE49-F238E27FC236}">
-                <a16:creationId xmlns:a16="http://schemas.microsoft.com/office/drawing/2014/main" id="{E514C8F5-57FB-FE2C-50C3-2CBEB6754C11}"/>
-              </a:ext>
-            </a:extLst>
-          </p:cNvPr>
-          <p:cNvSpPr/>
-          <p:nvPr/>
-        </p:nvSpPr>
-        <p:spPr>
-          <a:xfrm>
-            <a:off x="4331412" y="5656077"/>
-            <a:ext cx="3076253" cy="598471"/>
-          </a:xfrm>
-          <a:prstGeom prst="rect">
-            <a:avLst/>
-          </a:prstGeom>
-          <a:solidFill>
-            <a:schemeClr val="accent2">
-              <a:lumMod val="40000"/>
-              <a:lumOff val="60000"/>
-            </a:schemeClr>
-          </a:solidFill>
-        </p:spPr>
-        <p:style>
-          <a:lnRef idx="2">
-            <a:schemeClr val="accent1">
-              <a:shade val="15000"/>
-            </a:schemeClr>
-          </a:lnRef>
-          <a:fillRef idx="1">
-            <a:schemeClr val="accent1"/>
-          </a:fillRef>
-          <a:effectRef idx="0">
-            <a:schemeClr val="accent1"/>
-          </a:effectRef>
-          <a:fontRef idx="minor">
-            <a:schemeClr val="lt1"/>
-          </a:fontRef>
-        </p:style>
-        <p:txBody>
-          <a:bodyPr rtlCol="0" anchor="ctr"/>
-          <a:lstStyle/>
-          <a:p>
-            <a:pPr algn="ctr"/>
-            <a:r>
-              <a:rPr lang="en-US" dirty="0"/>
-              <a:t>Style these lists in layouts</a:t>
-            </a:r>
-          </a:p>
-        </p:txBody>
-      </p:sp>
-      <p:sp>
-        <p:nvSpPr>
-          <p:cNvPr id="18" name="Arrow: Right 17">
-            <a:extLst>
-              <a:ext uri="{FF2B5EF4-FFF2-40B4-BE49-F238E27FC236}">
-                <a16:creationId xmlns:a16="http://schemas.microsoft.com/office/drawing/2014/main" id="{3A8F7476-91DF-958F-45A1-938C566FA686}"/>
-              </a:ext>
-            </a:extLst>
-          </p:cNvPr>
-          <p:cNvSpPr/>
-          <p:nvPr/>
-        </p:nvSpPr>
-        <p:spPr>
-          <a:xfrm>
-            <a:off x="7417941" y="3443769"/>
-            <a:ext cx="544530" cy="157965"/>
-          </a:xfrm>
-          <a:prstGeom prst="rightArrow">
-            <a:avLst/>
-          </a:prstGeom>
-        </p:spPr>
-        <p:style>
-          <a:lnRef idx="2">
-            <a:schemeClr val="accent1">
-              <a:shade val="15000"/>
-            </a:schemeClr>
-          </a:lnRef>
-          <a:fillRef idx="1">
-            <a:schemeClr val="accent1"/>
-          </a:fillRef>
-          <a:effectRef idx="0">
-            <a:schemeClr val="accent1"/>
-          </a:effectRef>
-          <a:fontRef idx="minor">
-            <a:schemeClr val="lt1"/>
-          </a:fontRef>
-        </p:style>
-        <p:txBody>
-          <a:bodyPr rtlCol="0" anchor="ctr"/>
-          <a:lstStyle/>
-          <a:p>
-            <a:pPr algn="ctr"/>
-            <a:endParaRPr lang="en-US"/>
-          </a:p>
-        </p:txBody>
-      </p:sp>
-      <p:sp>
-        <p:nvSpPr>
-          <p:cNvPr id="20" name="Arrow: Right 19">
-            <a:extLst>
-              <a:ext uri="{FF2B5EF4-FFF2-40B4-BE49-F238E27FC236}">
-                <a16:creationId xmlns:a16="http://schemas.microsoft.com/office/drawing/2014/main" id="{C56A7452-0D4C-075E-53ED-81D6C02A8CF5}"/>
-              </a:ext>
-            </a:extLst>
-          </p:cNvPr>
-          <p:cNvSpPr/>
-          <p:nvPr/>
-        </p:nvSpPr>
-        <p:spPr>
-          <a:xfrm rot="16200000">
-            <a:off x="5551470" y="5169828"/>
-            <a:ext cx="544530" cy="157965"/>
-          </a:xfrm>
-          <a:prstGeom prst="rightArrow">
-            <a:avLst/>
-          </a:prstGeom>
-        </p:spPr>
-        <p:style>
-          <a:lnRef idx="2">
-            <a:schemeClr val="accent1">
-              <a:shade val="15000"/>
-            </a:schemeClr>
-          </a:lnRef>
-          <a:fillRef idx="1">
-            <a:schemeClr val="accent1"/>
-          </a:fillRef>
-          <a:effectRef idx="0">
-            <a:schemeClr val="accent1"/>
-          </a:effectRef>
-          <a:fontRef idx="minor">
-            <a:schemeClr val="lt1"/>
-          </a:fontRef>
-        </p:style>
-        <p:txBody>
-          <a:bodyPr rtlCol="0" anchor="ctr"/>
-          <a:lstStyle/>
-          <a:p>
-            <a:pPr algn="ctr"/>
-            <a:endParaRPr lang="en-US"/>
-          </a:p>
-        </p:txBody>
-      </p:sp>
-      <p:sp>
-        <p:nvSpPr>
-          <p:cNvPr id="21" name="Rectangle 20">
-            <a:extLst>
-              <a:ext uri="{FF2B5EF4-FFF2-40B4-BE49-F238E27FC236}">
-                <a16:creationId xmlns:a16="http://schemas.microsoft.com/office/drawing/2014/main" id="{A67762C6-D034-1E53-C7F0-227931945664}"/>
-              </a:ext>
-            </a:extLst>
-          </p:cNvPr>
-          <p:cNvSpPr/>
-          <p:nvPr/>
-        </p:nvSpPr>
-        <p:spPr>
-          <a:xfrm>
-            <a:off x="3123344" y="918102"/>
-            <a:ext cx="5589141" cy="598471"/>
-          </a:xfrm>
-          <a:prstGeom prst="rect">
-            <a:avLst/>
-          </a:prstGeom>
-          <a:solidFill>
-            <a:schemeClr val="accent2">
-              <a:lumMod val="40000"/>
-              <a:lumOff val="60000"/>
-            </a:schemeClr>
-          </a:solidFill>
-        </p:spPr>
-        <p:style>
-          <a:lnRef idx="2">
-            <a:schemeClr val="accent1">
-              <a:shade val="15000"/>
-            </a:schemeClr>
-          </a:lnRef>
-          <a:fillRef idx="1">
-            <a:schemeClr val="accent1"/>
-          </a:fillRef>
-          <a:effectRef idx="0">
-            <a:schemeClr val="accent1"/>
-          </a:effectRef>
-          <a:fontRef idx="minor">
-            <a:schemeClr val="lt1"/>
-          </a:fontRef>
-        </p:style>
-        <p:txBody>
-          <a:bodyPr rtlCol="0" anchor="ctr"/>
-          <a:lstStyle/>
-          <a:p>
-            <a:pPr algn="ctr"/>
-            <a:r>
-              <a:rPr lang="en-US" dirty="0"/>
-              <a:t>3 sister layout pages</a:t>
-            </a:r>
-          </a:p>
-          <a:p>
-            <a:pPr algn="ctr"/>
-            <a:r>
-              <a:rPr lang="en-US" dirty="0"/>
-              <a:t>Extending a common content layout</a:t>
-            </a:r>
-          </a:p>
-        </p:txBody>
-      </p:sp>
-      <p:sp>
-        <p:nvSpPr>
-          <p:cNvPr id="22" name="Arrow: Right 21">
-            <a:extLst>
-              <a:ext uri="{FF2B5EF4-FFF2-40B4-BE49-F238E27FC236}">
-                <a16:creationId xmlns:a16="http://schemas.microsoft.com/office/drawing/2014/main" id="{EC446D1D-7238-1613-0ED0-E8156796659B}"/>
-              </a:ext>
-            </a:extLst>
-          </p:cNvPr>
-          <p:cNvSpPr/>
-          <p:nvPr/>
-        </p:nvSpPr>
-        <p:spPr>
-          <a:xfrm rot="5400000">
-            <a:off x="5522145" y="1775847"/>
-            <a:ext cx="544530" cy="157965"/>
-          </a:xfrm>
-          <a:prstGeom prst="rightArrow">
-            <a:avLst/>
-          </a:prstGeom>
-        </p:spPr>
-        <p:style>
-          <a:lnRef idx="2">
-            <a:schemeClr val="accent1">
-              <a:shade val="15000"/>
-            </a:schemeClr>
-          </a:lnRef>
-          <a:fillRef idx="1">
-            <a:schemeClr val="accent1"/>
-          </a:fillRef>
-          <a:effectRef idx="0">
-            <a:schemeClr val="accent1"/>
-          </a:effectRef>
-          <a:fontRef idx="minor">
-            <a:schemeClr val="lt1"/>
-          </a:fontRef>
-        </p:style>
-        <p:txBody>
-          <a:bodyPr rtlCol="0" anchor="ctr"/>
-          <a:lstStyle/>
-          <a:p>
-            <a:pPr algn="ctr"/>
-            <a:endParaRPr lang="en-US"/>
-          </a:p>
-        </p:txBody>
-      </p:sp>
-      <p:sp>
-        <p:nvSpPr>
-          <p:cNvPr id="23" name="Rectangle 22">
-            <a:extLst>
-              <a:ext uri="{FF2B5EF4-FFF2-40B4-BE49-F238E27FC236}">
-                <a16:creationId xmlns:a16="http://schemas.microsoft.com/office/drawing/2014/main" id="{79C1BF21-E7A3-41D3-0637-41A5859286BE}"/>
-              </a:ext>
-            </a:extLst>
-          </p:cNvPr>
-          <p:cNvSpPr/>
-          <p:nvPr/>
-        </p:nvSpPr>
-        <p:spPr>
-          <a:xfrm>
-            <a:off x="678096" y="4976545"/>
-            <a:ext cx="2100210" cy="1276715"/>
-          </a:xfrm>
-          <a:prstGeom prst="rect">
-            <a:avLst/>
-          </a:prstGeom>
-          <a:solidFill>
-            <a:schemeClr val="accent2"/>
-          </a:solidFill>
-        </p:spPr>
-        <p:style>
-          <a:lnRef idx="2">
-            <a:schemeClr val="accent1">
-              <a:shade val="15000"/>
-            </a:schemeClr>
-          </a:lnRef>
-          <a:fillRef idx="1">
-            <a:schemeClr val="accent1"/>
-          </a:fillRef>
-          <a:effectRef idx="0">
-            <a:schemeClr val="accent1"/>
-          </a:effectRef>
-          <a:fontRef idx="minor">
-            <a:schemeClr val="lt1"/>
-          </a:fontRef>
-        </p:style>
-        <p:txBody>
-          <a:bodyPr rtlCol="0" anchor="ctr"/>
-          <a:lstStyle/>
-          <a:p>
-            <a:pPr algn="ctr"/>
-            <a:r>
-              <a:rPr lang="en-US" dirty="0"/>
-              <a:t>Style:</a:t>
-            </a:r>
-          </a:p>
-          <a:p>
-            <a:pPr marL="342900" indent="-342900" algn="ctr">
-              <a:buAutoNum type="arabicPeriod"/>
-            </a:pPr>
-            <a:r>
-              <a:rPr lang="en-US" dirty="0"/>
-              <a:t>Spacing</a:t>
-            </a:r>
-          </a:p>
-          <a:p>
-            <a:pPr marL="342900" indent="-342900" algn="ctr">
-              <a:buAutoNum type="arabicPeriod"/>
-            </a:pPr>
-            <a:r>
-              <a:rPr lang="en-US" dirty="0"/>
-              <a:t>Fonts</a:t>
-            </a:r>
-          </a:p>
-          <a:p>
-            <a:pPr marL="342900" indent="-342900" algn="ctr">
-              <a:buAutoNum type="arabicPeriod"/>
-            </a:pPr>
-            <a:r>
-              <a:rPr lang="en-US" dirty="0"/>
-              <a:t>Color</a:t>
-            </a:r>
-          </a:p>
-        </p:txBody>
-      </p:sp>
-      <p:cxnSp>
-        <p:nvCxnSpPr>
-          <p:cNvPr id="25" name="Straight Arrow Connector 24">
-            <a:extLst>
-              <a:ext uri="{FF2B5EF4-FFF2-40B4-BE49-F238E27FC236}">
-                <a16:creationId xmlns:a16="http://schemas.microsoft.com/office/drawing/2014/main" id="{F4165BCF-6E50-67E2-6D43-0DA32C926803}"/>
-              </a:ext>
-            </a:extLst>
-          </p:cNvPr>
-          <p:cNvCxnSpPr>
-            <a:stCxn id="23" idx="0"/>
-          </p:cNvCxnSpPr>
-          <p:nvPr/>
-        </p:nvCxnSpPr>
-        <p:spPr>
-          <a:xfrm flipV="1">
-            <a:off x="1728201" y="4582274"/>
-            <a:ext cx="1590352" cy="394271"/>
-          </a:xfrm>
-          <a:prstGeom prst="straightConnector1">
-            <a:avLst/>
-          </a:prstGeom>
-          <a:ln>
-            <a:tailEnd type="triangle"/>
-          </a:ln>
-        </p:spPr>
-        <p:style>
-          <a:lnRef idx="2">
-            <a:schemeClr val="accent1"/>
-          </a:lnRef>
-          <a:fillRef idx="0">
-            <a:schemeClr val="accent1"/>
-          </a:fillRef>
-          <a:effectRef idx="1">
-            <a:schemeClr val="accent1"/>
-          </a:effectRef>
-          <a:fontRef idx="minor">
-            <a:schemeClr val="tx1"/>
-          </a:fontRef>
-        </p:style>
-      </p:cxnSp>
-      <p:sp>
-        <p:nvSpPr>
-          <p:cNvPr id="26" name="Rectangle 25">
-            <a:extLst>
-              <a:ext uri="{FF2B5EF4-FFF2-40B4-BE49-F238E27FC236}">
-                <a16:creationId xmlns:a16="http://schemas.microsoft.com/office/drawing/2014/main" id="{C446B378-D735-74B9-27A5-F2987FBE06B3}"/>
-              </a:ext>
-            </a:extLst>
-          </p:cNvPr>
-          <p:cNvSpPr/>
-          <p:nvPr/>
-        </p:nvSpPr>
-        <p:spPr>
-          <a:xfrm>
-            <a:off x="9851624" y="5212621"/>
-            <a:ext cx="1875031" cy="1276715"/>
-          </a:xfrm>
-          <a:prstGeom prst="rect">
-            <a:avLst/>
-          </a:prstGeom>
-          <a:ln w="28575">
-            <a:solidFill>
-              <a:srgbClr val="FF0000"/>
-            </a:solidFill>
-          </a:ln>
-        </p:spPr>
-        <p:style>
-          <a:lnRef idx="2">
-            <a:schemeClr val="accent1">
-              <a:shade val="15000"/>
-            </a:schemeClr>
-          </a:lnRef>
-          <a:fillRef idx="1">
-            <a:schemeClr val="accent1"/>
-          </a:fillRef>
-          <a:effectRef idx="0">
-            <a:schemeClr val="accent1"/>
-          </a:effectRef>
-          <a:fontRef idx="minor">
-            <a:schemeClr val="lt1"/>
-          </a:fontRef>
-        </p:style>
-        <p:txBody>
-          <a:bodyPr rtlCol="0" anchor="ctr"/>
-          <a:lstStyle/>
-          <a:p>
-            <a:pPr algn="ctr"/>
-            <a:r>
-              <a:rPr lang="en-US" dirty="0"/>
-              <a:t>A page with many “simple” text box lists to copy if needed</a:t>
-            </a:r>
-          </a:p>
-        </p:txBody>
-      </p:sp>
-      <p:sp>
-        <p:nvSpPr>
-          <p:cNvPr id="27" name="Oval 26">
-            <a:extLst>
-              <a:ext uri="{FF2B5EF4-FFF2-40B4-BE49-F238E27FC236}">
-                <a16:creationId xmlns:a16="http://schemas.microsoft.com/office/drawing/2014/main" id="{8C0E29F9-181C-34D4-2BB2-2A810C494312}"/>
-              </a:ext>
-            </a:extLst>
-          </p:cNvPr>
-          <p:cNvSpPr/>
-          <p:nvPr/>
-        </p:nvSpPr>
-        <p:spPr>
-          <a:xfrm>
-            <a:off x="3521722" y="4679878"/>
-            <a:ext cx="437857" cy="437857"/>
-          </a:xfrm>
-          <a:prstGeom prst="ellipse">
-            <a:avLst/>
-          </a:prstGeom>
-        </p:spPr>
-        <p:style>
-          <a:lnRef idx="2">
-            <a:schemeClr val="accent1">
-              <a:shade val="15000"/>
-            </a:schemeClr>
-          </a:lnRef>
-          <a:fillRef idx="1">
-            <a:schemeClr val="accent1"/>
-          </a:fillRef>
-          <a:effectRef idx="0">
-            <a:schemeClr val="accent1"/>
-          </a:effectRef>
-          <a:fontRef idx="minor">
-            <a:schemeClr val="lt1"/>
-          </a:fontRef>
-        </p:style>
-        <p:txBody>
-          <a:bodyPr rtlCol="0" anchor="ctr"/>
-          <a:lstStyle/>
-          <a:p>
-            <a:pPr algn="ctr"/>
-            <a:r>
-              <a:rPr lang="en-US" dirty="0"/>
-              <a:t>1</a:t>
-            </a:r>
-          </a:p>
-        </p:txBody>
-      </p:sp>
-      <p:sp>
-        <p:nvSpPr>
-          <p:cNvPr id="28" name="Oval 27">
-            <a:extLst>
-              <a:ext uri="{FF2B5EF4-FFF2-40B4-BE49-F238E27FC236}">
-                <a16:creationId xmlns:a16="http://schemas.microsoft.com/office/drawing/2014/main" id="{CDE95F12-2811-FBBD-9B88-367040C995AD}"/>
-              </a:ext>
-            </a:extLst>
-          </p:cNvPr>
-          <p:cNvSpPr/>
-          <p:nvPr/>
-        </p:nvSpPr>
-        <p:spPr>
-          <a:xfrm>
-            <a:off x="9313522" y="5677830"/>
-            <a:ext cx="437857" cy="437857"/>
-          </a:xfrm>
-          <a:prstGeom prst="ellipse">
-            <a:avLst/>
-          </a:prstGeom>
-        </p:spPr>
-        <p:style>
-          <a:lnRef idx="2">
-            <a:schemeClr val="accent1">
-              <a:shade val="15000"/>
-            </a:schemeClr>
-          </a:lnRef>
-          <a:fillRef idx="1">
-            <a:schemeClr val="accent1"/>
-          </a:fillRef>
-          <a:effectRef idx="0">
-            <a:schemeClr val="accent1"/>
-          </a:effectRef>
-          <a:fontRef idx="minor">
-            <a:schemeClr val="lt1"/>
-          </a:fontRef>
-        </p:style>
-        <p:txBody>
-          <a:bodyPr rtlCol="0" anchor="ctr"/>
-          <a:lstStyle/>
-          <a:p>
-            <a:pPr algn="ctr"/>
-            <a:r>
-              <a:rPr lang="en-US" dirty="0"/>
-              <a:t>2</a:t>
-            </a:r>
-          </a:p>
-        </p:txBody>
-      </p:sp>
-      <p:sp>
-        <p:nvSpPr>
-          <p:cNvPr id="29" name="TextBox 28">
-            <a:extLst>
-              <a:ext uri="{FF2B5EF4-FFF2-40B4-BE49-F238E27FC236}">
-                <a16:creationId xmlns:a16="http://schemas.microsoft.com/office/drawing/2014/main" id="{9D115F54-FFF3-F1FB-9474-0D1E98D17DB3}"/>
-              </a:ext>
-            </a:extLst>
-          </p:cNvPr>
-          <p:cNvSpPr txBox="1"/>
-          <p:nvPr/>
-        </p:nvSpPr>
-        <p:spPr>
-          <a:xfrm>
-            <a:off x="9977480" y="6507664"/>
-            <a:ext cx="1623318" cy="307777"/>
-          </a:xfrm>
-          <a:prstGeom prst="rect">
-            <a:avLst/>
-          </a:prstGeom>
-          <a:noFill/>
-        </p:spPr>
-        <p:txBody>
-          <a:bodyPr wrap="square" rtlCol="0">
-            <a:spAutoFit/>
-          </a:bodyPr>
-          <a:lstStyle/>
-          <a:p>
-            <a:pPr algn="ctr"/>
-            <a:r>
-              <a:rPr lang="en-US" sz="1400" dirty="0"/>
-              <a:t>Cannot inherit</a:t>
-            </a:r>
-          </a:p>
-        </p:txBody>
-      </p:sp>
-      <p:sp>
-        <p:nvSpPr>
-          <p:cNvPr id="30" name="TextBox 29">
-            <a:extLst>
-              <a:ext uri="{FF2B5EF4-FFF2-40B4-BE49-F238E27FC236}">
-                <a16:creationId xmlns:a16="http://schemas.microsoft.com/office/drawing/2014/main" id="{1425159A-EDD6-74AB-A389-1ED3560A79F5}"/>
-              </a:ext>
-            </a:extLst>
-          </p:cNvPr>
-          <p:cNvSpPr txBox="1"/>
-          <p:nvPr/>
-        </p:nvSpPr>
-        <p:spPr>
-          <a:xfrm>
-            <a:off x="8720791" y="1739693"/>
-            <a:ext cx="1623318" cy="307777"/>
-          </a:xfrm>
-          <a:prstGeom prst="rect">
-            <a:avLst/>
-          </a:prstGeom>
-          <a:noFill/>
-        </p:spPr>
-        <p:txBody>
-          <a:bodyPr wrap="square" rtlCol="0">
-            <a:spAutoFit/>
-          </a:bodyPr>
-          <a:lstStyle/>
-          <a:p>
-            <a:pPr algn="ctr"/>
-            <a:r>
-              <a:rPr lang="en-US" sz="1400" dirty="0"/>
-              <a:t>Can  inherit</a:t>
+              <a:t>Recommendation</a:t>
             </a:r>
           </a:p>
         </p:txBody>
@@ -5461,7 +4923,7 @@
           <p:cNvPr id="3" name="Slide Number Placeholder 2">
             <a:extLst>
               <a:ext uri="{FF2B5EF4-FFF2-40B4-BE49-F238E27FC236}">
-                <a16:creationId xmlns:a16="http://schemas.microsoft.com/office/drawing/2014/main" id="{3582FC77-6A46-E2DE-9D6A-A717E3259DFB}"/>
+                <a16:creationId xmlns:a16="http://schemas.microsoft.com/office/drawing/2014/main" id="{CEF38F97-C294-632E-FD05-A5A19DE454DC}"/>
               </a:ext>
             </a:extLst>
           </p:cNvPr>
@@ -5488,7 +4950,7 @@
     </p:spTree>
     <p:extLst>
       <p:ext uri="{BB962C8B-B14F-4D97-AF65-F5344CB8AC3E}">
-        <p14:creationId xmlns:p14="http://schemas.microsoft.com/office/powerpoint/2010/main" val="40197265"/>
+        <p14:creationId xmlns:p14="http://schemas.microsoft.com/office/powerpoint/2010/main" val="3049210581"/>
       </p:ext>
     </p:extLst>
   </p:cSld>
@@ -5520,7 +4982,7 @@
           <p:cNvPr id="4" name="Title 3">
             <a:extLst>
               <a:ext uri="{FF2B5EF4-FFF2-40B4-BE49-F238E27FC236}">
-                <a16:creationId xmlns:a16="http://schemas.microsoft.com/office/drawing/2014/main" id="{BB2BD00F-8EA4-14C5-BD5F-97F9AD513213}"/>
+                <a16:creationId xmlns:a16="http://schemas.microsoft.com/office/drawing/2014/main" id="{0D0E3244-86CC-ED51-EFBC-B4D48F99AEED}"/>
               </a:ext>
             </a:extLst>
           </p:cNvPr>
@@ -5528,7 +4990,7 @@
             <a:spLocks noGrp="1"/>
           </p:cNvSpPr>
           <p:nvPr>
-            <p:ph type="ctrTitle"/>
+            <p:ph type="title"/>
           </p:nvPr>
         </p:nvSpPr>
         <p:spPr/>
@@ -5538,7 +5000,979 @@
           <a:p>
             <a:r>
               <a:rPr lang="en-US" dirty="0"/>
-              <a:t>Testing of List Behavior</a:t>
+              <a:t>Guidance: Design of layouts for lists: Primary and Secondary Options</a:t>
+            </a:r>
+          </a:p>
+        </p:txBody>
+      </p:sp>
+      <p:sp>
+        <p:nvSpPr>
+          <p:cNvPr id="2" name="Rectangle 1">
+            <a:extLst>
+              <a:ext uri="{FF2B5EF4-FFF2-40B4-BE49-F238E27FC236}">
+                <a16:creationId xmlns:a16="http://schemas.microsoft.com/office/drawing/2014/main" id="{E3FD8DAD-0002-ECA3-09EE-39011DED416A}"/>
+              </a:ext>
+            </a:extLst>
+          </p:cNvPr>
+          <p:cNvSpPr/>
+          <p:nvPr/>
+        </p:nvSpPr>
+        <p:spPr>
+          <a:xfrm>
+            <a:off x="838200" y="3287730"/>
+            <a:ext cx="2178121" cy="598470"/>
+          </a:xfrm>
+          <a:prstGeom prst="rect">
+            <a:avLst/>
+          </a:prstGeom>
+        </p:spPr>
+        <p:style>
+          <a:lnRef idx="2">
+            <a:schemeClr val="accent1">
+              <a:shade val="15000"/>
+            </a:schemeClr>
+          </a:lnRef>
+          <a:fillRef idx="1">
+            <a:schemeClr val="accent1"/>
+          </a:fillRef>
+          <a:effectRef idx="0">
+            <a:schemeClr val="accent1"/>
+          </a:effectRef>
+          <a:fontRef idx="minor">
+            <a:schemeClr val="lt1"/>
+          </a:fontRef>
+        </p:style>
+        <p:txBody>
+          <a:bodyPr rtlCol="0" anchor="ctr"/>
+          <a:lstStyle/>
+          <a:p>
+            <a:pPr algn="ctr"/>
+            <a:r>
+              <a:rPr lang="en-US" dirty="0"/>
+              <a:t>Content layout</a:t>
+            </a:r>
+          </a:p>
+        </p:txBody>
+      </p:sp>
+      <p:sp>
+        <p:nvSpPr>
+          <p:cNvPr id="5" name="Rectangle 4">
+            <a:extLst>
+              <a:ext uri="{FF2B5EF4-FFF2-40B4-BE49-F238E27FC236}">
+                <a16:creationId xmlns:a16="http://schemas.microsoft.com/office/drawing/2014/main" id="{33C18229-8A3D-70BE-2A35-F0C7FEEA4BBD}"/>
+              </a:ext>
+            </a:extLst>
+          </p:cNvPr>
+          <p:cNvSpPr/>
+          <p:nvPr/>
+        </p:nvSpPr>
+        <p:spPr>
+          <a:xfrm>
+            <a:off x="4177301" y="2178122"/>
+            <a:ext cx="3076254" cy="598470"/>
+          </a:xfrm>
+          <a:prstGeom prst="rect">
+            <a:avLst/>
+          </a:prstGeom>
+        </p:spPr>
+        <p:style>
+          <a:lnRef idx="2">
+            <a:schemeClr val="accent1">
+              <a:shade val="15000"/>
+            </a:schemeClr>
+          </a:lnRef>
+          <a:fillRef idx="1">
+            <a:schemeClr val="accent1"/>
+          </a:fillRef>
+          <a:effectRef idx="0">
+            <a:schemeClr val="accent1"/>
+          </a:effectRef>
+          <a:fontRef idx="minor">
+            <a:schemeClr val="lt1"/>
+          </a:fontRef>
+        </p:style>
+        <p:txBody>
+          <a:bodyPr rtlCol="0" anchor="ctr"/>
+          <a:lstStyle/>
+          <a:p>
+            <a:pPr algn="ctr"/>
+            <a:r>
+              <a:rPr lang="en-US" dirty="0"/>
+              <a:t>Content with 1 list</a:t>
+            </a:r>
+          </a:p>
+        </p:txBody>
+      </p:sp>
+      <p:sp>
+        <p:nvSpPr>
+          <p:cNvPr id="6" name="Rectangle 5">
+            <a:extLst>
+              <a:ext uri="{FF2B5EF4-FFF2-40B4-BE49-F238E27FC236}">
+                <a16:creationId xmlns:a16="http://schemas.microsoft.com/office/drawing/2014/main" id="{9981450D-B959-E60E-143A-F8792FAFE4BF}"/>
+              </a:ext>
+            </a:extLst>
+          </p:cNvPr>
+          <p:cNvSpPr/>
+          <p:nvPr/>
+        </p:nvSpPr>
+        <p:spPr>
+          <a:xfrm>
+            <a:off x="4177301" y="3129765"/>
+            <a:ext cx="3076254" cy="598470"/>
+          </a:xfrm>
+          <a:prstGeom prst="rect">
+            <a:avLst/>
+          </a:prstGeom>
+        </p:spPr>
+        <p:style>
+          <a:lnRef idx="2">
+            <a:schemeClr val="accent1">
+              <a:shade val="15000"/>
+            </a:schemeClr>
+          </a:lnRef>
+          <a:fillRef idx="1">
+            <a:schemeClr val="accent1"/>
+          </a:fillRef>
+          <a:effectRef idx="0">
+            <a:schemeClr val="accent1"/>
+          </a:effectRef>
+          <a:fontRef idx="minor">
+            <a:schemeClr val="lt1"/>
+          </a:fontRef>
+        </p:style>
+        <p:txBody>
+          <a:bodyPr rtlCol="0" anchor="ctr"/>
+          <a:lstStyle/>
+          <a:p>
+            <a:pPr algn="ctr"/>
+            <a:r>
+              <a:rPr lang="en-US" dirty="0"/>
+              <a:t>Content with 2 lists</a:t>
+            </a:r>
+          </a:p>
+        </p:txBody>
+      </p:sp>
+      <p:sp>
+        <p:nvSpPr>
+          <p:cNvPr id="7" name="Rectangle 6">
+            <a:extLst>
+              <a:ext uri="{FF2B5EF4-FFF2-40B4-BE49-F238E27FC236}">
+                <a16:creationId xmlns:a16="http://schemas.microsoft.com/office/drawing/2014/main" id="{5808AFAA-5EAC-2DDF-404E-CAF6D6D0A228}"/>
+              </a:ext>
+            </a:extLst>
+          </p:cNvPr>
+          <p:cNvSpPr/>
+          <p:nvPr/>
+        </p:nvSpPr>
+        <p:spPr>
+          <a:xfrm>
+            <a:off x="4177301" y="4081408"/>
+            <a:ext cx="3076254" cy="598470"/>
+          </a:xfrm>
+          <a:prstGeom prst="rect">
+            <a:avLst/>
+          </a:prstGeom>
+        </p:spPr>
+        <p:style>
+          <a:lnRef idx="2">
+            <a:schemeClr val="accent1">
+              <a:shade val="15000"/>
+            </a:schemeClr>
+          </a:lnRef>
+          <a:fillRef idx="1">
+            <a:schemeClr val="accent1"/>
+          </a:fillRef>
+          <a:effectRef idx="0">
+            <a:schemeClr val="accent1"/>
+          </a:effectRef>
+          <a:fontRef idx="minor">
+            <a:schemeClr val="lt1"/>
+          </a:fontRef>
+        </p:style>
+        <p:txBody>
+          <a:bodyPr rtlCol="0" anchor="ctr"/>
+          <a:lstStyle/>
+          <a:p>
+            <a:pPr algn="ctr"/>
+            <a:r>
+              <a:rPr lang="en-US" dirty="0"/>
+              <a:t>Content with 3 lists</a:t>
+            </a:r>
+          </a:p>
+        </p:txBody>
+      </p:sp>
+      <p:cxnSp>
+        <p:nvCxnSpPr>
+          <p:cNvPr id="9" name="Straight Arrow Connector 8">
+            <a:extLst>
+              <a:ext uri="{FF2B5EF4-FFF2-40B4-BE49-F238E27FC236}">
+                <a16:creationId xmlns:a16="http://schemas.microsoft.com/office/drawing/2014/main" id="{C4488C34-9066-A344-56BF-341A1C546668}"/>
+              </a:ext>
+            </a:extLst>
+          </p:cNvPr>
+          <p:cNvCxnSpPr>
+            <a:stCxn id="2" idx="3"/>
+            <a:endCxn id="5" idx="1"/>
+          </p:cNvCxnSpPr>
+          <p:nvPr/>
+        </p:nvCxnSpPr>
+        <p:spPr>
+          <a:xfrm flipV="1">
+            <a:off x="3016321" y="2477357"/>
+            <a:ext cx="1160980" cy="1109608"/>
+          </a:xfrm>
+          <a:prstGeom prst="straightConnector1">
+            <a:avLst/>
+          </a:prstGeom>
+          <a:ln>
+            <a:tailEnd type="triangle"/>
+          </a:ln>
+        </p:spPr>
+        <p:style>
+          <a:lnRef idx="2">
+            <a:schemeClr val="accent1"/>
+          </a:lnRef>
+          <a:fillRef idx="0">
+            <a:schemeClr val="accent1"/>
+          </a:fillRef>
+          <a:effectRef idx="1">
+            <a:schemeClr val="accent1"/>
+          </a:effectRef>
+          <a:fontRef idx="minor">
+            <a:schemeClr val="tx1"/>
+          </a:fontRef>
+        </p:style>
+      </p:cxnSp>
+      <p:cxnSp>
+        <p:nvCxnSpPr>
+          <p:cNvPr id="10" name="Straight Arrow Connector 9">
+            <a:extLst>
+              <a:ext uri="{FF2B5EF4-FFF2-40B4-BE49-F238E27FC236}">
+                <a16:creationId xmlns:a16="http://schemas.microsoft.com/office/drawing/2014/main" id="{BA56CA6B-ACBB-7034-F921-F66C40A2938E}"/>
+              </a:ext>
+            </a:extLst>
+          </p:cNvPr>
+          <p:cNvCxnSpPr>
+            <a:cxnSpLocks/>
+            <a:stCxn id="2" idx="3"/>
+            <a:endCxn id="6" idx="1"/>
+          </p:cNvCxnSpPr>
+          <p:nvPr/>
+        </p:nvCxnSpPr>
+        <p:spPr>
+          <a:xfrm flipV="1">
+            <a:off x="3016321" y="3429000"/>
+            <a:ext cx="1160980" cy="157965"/>
+          </a:xfrm>
+          <a:prstGeom prst="straightConnector1">
+            <a:avLst/>
+          </a:prstGeom>
+          <a:ln>
+            <a:tailEnd type="triangle"/>
+          </a:ln>
+        </p:spPr>
+        <p:style>
+          <a:lnRef idx="2">
+            <a:schemeClr val="accent1"/>
+          </a:lnRef>
+          <a:fillRef idx="0">
+            <a:schemeClr val="accent1"/>
+          </a:fillRef>
+          <a:effectRef idx="1">
+            <a:schemeClr val="accent1"/>
+          </a:effectRef>
+          <a:fontRef idx="minor">
+            <a:schemeClr val="tx1"/>
+          </a:fontRef>
+        </p:style>
+      </p:cxnSp>
+      <p:cxnSp>
+        <p:nvCxnSpPr>
+          <p:cNvPr id="11" name="Straight Arrow Connector 10">
+            <a:extLst>
+              <a:ext uri="{FF2B5EF4-FFF2-40B4-BE49-F238E27FC236}">
+                <a16:creationId xmlns:a16="http://schemas.microsoft.com/office/drawing/2014/main" id="{26DA93C0-B104-55E9-ED99-3DEB304A22B7}"/>
+              </a:ext>
+            </a:extLst>
+          </p:cNvPr>
+          <p:cNvCxnSpPr>
+            <a:cxnSpLocks/>
+            <a:stCxn id="2" idx="3"/>
+            <a:endCxn id="7" idx="1"/>
+          </p:cNvCxnSpPr>
+          <p:nvPr/>
+        </p:nvCxnSpPr>
+        <p:spPr>
+          <a:xfrm>
+            <a:off x="3016321" y="3586965"/>
+            <a:ext cx="1160980" cy="793678"/>
+          </a:xfrm>
+          <a:prstGeom prst="straightConnector1">
+            <a:avLst/>
+          </a:prstGeom>
+          <a:ln>
+            <a:tailEnd type="triangle"/>
+          </a:ln>
+        </p:spPr>
+        <p:style>
+          <a:lnRef idx="2">
+            <a:schemeClr val="accent1"/>
+          </a:lnRef>
+          <a:fillRef idx="0">
+            <a:schemeClr val="accent1"/>
+          </a:fillRef>
+          <a:effectRef idx="1">
+            <a:schemeClr val="accent1"/>
+          </a:effectRef>
+          <a:fontRef idx="minor">
+            <a:schemeClr val="tx1"/>
+          </a:fontRef>
+        </p:style>
+      </p:cxnSp>
+      <p:sp>
+        <p:nvSpPr>
+          <p:cNvPr id="16" name="Rectangle 15">
+            <a:extLst>
+              <a:ext uri="{FF2B5EF4-FFF2-40B4-BE49-F238E27FC236}">
+                <a16:creationId xmlns:a16="http://schemas.microsoft.com/office/drawing/2014/main" id="{AB59A247-3607-4956-8E77-3B98E50E9EA4}"/>
+              </a:ext>
+            </a:extLst>
+          </p:cNvPr>
+          <p:cNvSpPr/>
+          <p:nvPr/>
+        </p:nvSpPr>
+        <p:spPr>
+          <a:xfrm>
+            <a:off x="8126857" y="2178122"/>
+            <a:ext cx="2373330" cy="2501756"/>
+          </a:xfrm>
+          <a:prstGeom prst="rect">
+            <a:avLst/>
+          </a:prstGeom>
+        </p:spPr>
+        <p:style>
+          <a:lnRef idx="2">
+            <a:schemeClr val="accent1">
+              <a:shade val="15000"/>
+            </a:schemeClr>
+          </a:lnRef>
+          <a:fillRef idx="1">
+            <a:schemeClr val="accent1"/>
+          </a:fillRef>
+          <a:effectRef idx="0">
+            <a:schemeClr val="accent1"/>
+          </a:effectRef>
+          <a:fontRef idx="minor">
+            <a:schemeClr val="lt1"/>
+          </a:fontRef>
+        </p:style>
+        <p:txBody>
+          <a:bodyPr rtlCol="0" anchor="ctr"/>
+          <a:lstStyle/>
+          <a:p>
+            <a:pPr algn="ctr"/>
+            <a:r>
+              <a:rPr lang="en-US" dirty="0"/>
+              <a:t>Have pages use one of these layouts</a:t>
+            </a:r>
+          </a:p>
+        </p:txBody>
+      </p:sp>
+      <p:sp>
+        <p:nvSpPr>
+          <p:cNvPr id="17" name="Rectangle 16">
+            <a:extLst>
+              <a:ext uri="{FF2B5EF4-FFF2-40B4-BE49-F238E27FC236}">
+                <a16:creationId xmlns:a16="http://schemas.microsoft.com/office/drawing/2014/main" id="{E514C8F5-57FB-FE2C-50C3-2CBEB6754C11}"/>
+              </a:ext>
+            </a:extLst>
+          </p:cNvPr>
+          <p:cNvSpPr/>
+          <p:nvPr/>
+        </p:nvSpPr>
+        <p:spPr>
+          <a:xfrm>
+            <a:off x="4331412" y="5656077"/>
+            <a:ext cx="3076253" cy="598471"/>
+          </a:xfrm>
+          <a:prstGeom prst="rect">
+            <a:avLst/>
+          </a:prstGeom>
+          <a:solidFill>
+            <a:schemeClr val="accent2">
+              <a:lumMod val="40000"/>
+              <a:lumOff val="60000"/>
+            </a:schemeClr>
+          </a:solidFill>
+        </p:spPr>
+        <p:style>
+          <a:lnRef idx="2">
+            <a:schemeClr val="accent1">
+              <a:shade val="15000"/>
+            </a:schemeClr>
+          </a:lnRef>
+          <a:fillRef idx="1">
+            <a:schemeClr val="accent1"/>
+          </a:fillRef>
+          <a:effectRef idx="0">
+            <a:schemeClr val="accent1"/>
+          </a:effectRef>
+          <a:fontRef idx="minor">
+            <a:schemeClr val="lt1"/>
+          </a:fontRef>
+        </p:style>
+        <p:txBody>
+          <a:bodyPr rtlCol="0" anchor="ctr"/>
+          <a:lstStyle/>
+          <a:p>
+            <a:pPr algn="ctr"/>
+            <a:r>
+              <a:rPr lang="en-US" dirty="0"/>
+              <a:t>Style these lists in layouts</a:t>
+            </a:r>
+          </a:p>
+        </p:txBody>
+      </p:sp>
+      <p:sp>
+        <p:nvSpPr>
+          <p:cNvPr id="18" name="Arrow: Right 17">
+            <a:extLst>
+              <a:ext uri="{FF2B5EF4-FFF2-40B4-BE49-F238E27FC236}">
+                <a16:creationId xmlns:a16="http://schemas.microsoft.com/office/drawing/2014/main" id="{3A8F7476-91DF-958F-45A1-938C566FA686}"/>
+              </a:ext>
+            </a:extLst>
+          </p:cNvPr>
+          <p:cNvSpPr/>
+          <p:nvPr/>
+        </p:nvSpPr>
+        <p:spPr>
+          <a:xfrm>
+            <a:off x="7417941" y="3443769"/>
+            <a:ext cx="544530" cy="157965"/>
+          </a:xfrm>
+          <a:prstGeom prst="rightArrow">
+            <a:avLst/>
+          </a:prstGeom>
+        </p:spPr>
+        <p:style>
+          <a:lnRef idx="2">
+            <a:schemeClr val="accent1">
+              <a:shade val="15000"/>
+            </a:schemeClr>
+          </a:lnRef>
+          <a:fillRef idx="1">
+            <a:schemeClr val="accent1"/>
+          </a:fillRef>
+          <a:effectRef idx="0">
+            <a:schemeClr val="accent1"/>
+          </a:effectRef>
+          <a:fontRef idx="minor">
+            <a:schemeClr val="lt1"/>
+          </a:fontRef>
+        </p:style>
+        <p:txBody>
+          <a:bodyPr rtlCol="0" anchor="ctr"/>
+          <a:lstStyle/>
+          <a:p>
+            <a:pPr algn="ctr"/>
+            <a:endParaRPr lang="en-US"/>
+          </a:p>
+        </p:txBody>
+      </p:sp>
+      <p:sp>
+        <p:nvSpPr>
+          <p:cNvPr id="20" name="Arrow: Right 19">
+            <a:extLst>
+              <a:ext uri="{FF2B5EF4-FFF2-40B4-BE49-F238E27FC236}">
+                <a16:creationId xmlns:a16="http://schemas.microsoft.com/office/drawing/2014/main" id="{C56A7452-0D4C-075E-53ED-81D6C02A8CF5}"/>
+              </a:ext>
+            </a:extLst>
+          </p:cNvPr>
+          <p:cNvSpPr/>
+          <p:nvPr/>
+        </p:nvSpPr>
+        <p:spPr>
+          <a:xfrm rot="16200000">
+            <a:off x="5551470" y="5169828"/>
+            <a:ext cx="544530" cy="157965"/>
+          </a:xfrm>
+          <a:prstGeom prst="rightArrow">
+            <a:avLst/>
+          </a:prstGeom>
+        </p:spPr>
+        <p:style>
+          <a:lnRef idx="2">
+            <a:schemeClr val="accent1">
+              <a:shade val="15000"/>
+            </a:schemeClr>
+          </a:lnRef>
+          <a:fillRef idx="1">
+            <a:schemeClr val="accent1"/>
+          </a:fillRef>
+          <a:effectRef idx="0">
+            <a:schemeClr val="accent1"/>
+          </a:effectRef>
+          <a:fontRef idx="minor">
+            <a:schemeClr val="lt1"/>
+          </a:fontRef>
+        </p:style>
+        <p:txBody>
+          <a:bodyPr rtlCol="0" anchor="ctr"/>
+          <a:lstStyle/>
+          <a:p>
+            <a:pPr algn="ctr"/>
+            <a:endParaRPr lang="en-US"/>
+          </a:p>
+        </p:txBody>
+      </p:sp>
+      <p:sp>
+        <p:nvSpPr>
+          <p:cNvPr id="21" name="Rectangle 20">
+            <a:extLst>
+              <a:ext uri="{FF2B5EF4-FFF2-40B4-BE49-F238E27FC236}">
+                <a16:creationId xmlns:a16="http://schemas.microsoft.com/office/drawing/2014/main" id="{A67762C6-D034-1E53-C7F0-227931945664}"/>
+              </a:ext>
+            </a:extLst>
+          </p:cNvPr>
+          <p:cNvSpPr/>
+          <p:nvPr/>
+        </p:nvSpPr>
+        <p:spPr>
+          <a:xfrm>
+            <a:off x="3123344" y="918102"/>
+            <a:ext cx="5589141" cy="598471"/>
+          </a:xfrm>
+          <a:prstGeom prst="rect">
+            <a:avLst/>
+          </a:prstGeom>
+          <a:solidFill>
+            <a:schemeClr val="accent2">
+              <a:lumMod val="40000"/>
+              <a:lumOff val="60000"/>
+            </a:schemeClr>
+          </a:solidFill>
+        </p:spPr>
+        <p:style>
+          <a:lnRef idx="2">
+            <a:schemeClr val="accent1">
+              <a:shade val="15000"/>
+            </a:schemeClr>
+          </a:lnRef>
+          <a:fillRef idx="1">
+            <a:schemeClr val="accent1"/>
+          </a:fillRef>
+          <a:effectRef idx="0">
+            <a:schemeClr val="accent1"/>
+          </a:effectRef>
+          <a:fontRef idx="minor">
+            <a:schemeClr val="lt1"/>
+          </a:fontRef>
+        </p:style>
+        <p:txBody>
+          <a:bodyPr rtlCol="0" anchor="ctr"/>
+          <a:lstStyle/>
+          <a:p>
+            <a:pPr algn="ctr"/>
+            <a:r>
+              <a:rPr lang="en-US" dirty="0"/>
+              <a:t>3 sister layout pages</a:t>
+            </a:r>
+          </a:p>
+          <a:p>
+            <a:pPr algn="ctr"/>
+            <a:r>
+              <a:rPr lang="en-US" dirty="0"/>
+              <a:t>Extending a common content layout</a:t>
+            </a:r>
+          </a:p>
+        </p:txBody>
+      </p:sp>
+      <p:sp>
+        <p:nvSpPr>
+          <p:cNvPr id="22" name="Arrow: Right 21">
+            <a:extLst>
+              <a:ext uri="{FF2B5EF4-FFF2-40B4-BE49-F238E27FC236}">
+                <a16:creationId xmlns:a16="http://schemas.microsoft.com/office/drawing/2014/main" id="{EC446D1D-7238-1613-0ED0-E8156796659B}"/>
+              </a:ext>
+            </a:extLst>
+          </p:cNvPr>
+          <p:cNvSpPr/>
+          <p:nvPr/>
+        </p:nvSpPr>
+        <p:spPr>
+          <a:xfrm rot="5400000">
+            <a:off x="5522145" y="1775847"/>
+            <a:ext cx="544530" cy="157965"/>
+          </a:xfrm>
+          <a:prstGeom prst="rightArrow">
+            <a:avLst/>
+          </a:prstGeom>
+        </p:spPr>
+        <p:style>
+          <a:lnRef idx="2">
+            <a:schemeClr val="accent1">
+              <a:shade val="15000"/>
+            </a:schemeClr>
+          </a:lnRef>
+          <a:fillRef idx="1">
+            <a:schemeClr val="accent1"/>
+          </a:fillRef>
+          <a:effectRef idx="0">
+            <a:schemeClr val="accent1"/>
+          </a:effectRef>
+          <a:fontRef idx="minor">
+            <a:schemeClr val="lt1"/>
+          </a:fontRef>
+        </p:style>
+        <p:txBody>
+          <a:bodyPr rtlCol="0" anchor="ctr"/>
+          <a:lstStyle/>
+          <a:p>
+            <a:pPr algn="ctr"/>
+            <a:endParaRPr lang="en-US"/>
+          </a:p>
+        </p:txBody>
+      </p:sp>
+      <p:sp>
+        <p:nvSpPr>
+          <p:cNvPr id="23" name="Rectangle 22">
+            <a:extLst>
+              <a:ext uri="{FF2B5EF4-FFF2-40B4-BE49-F238E27FC236}">
+                <a16:creationId xmlns:a16="http://schemas.microsoft.com/office/drawing/2014/main" id="{79C1BF21-E7A3-41D3-0637-41A5859286BE}"/>
+              </a:ext>
+            </a:extLst>
+          </p:cNvPr>
+          <p:cNvSpPr/>
+          <p:nvPr/>
+        </p:nvSpPr>
+        <p:spPr>
+          <a:xfrm>
+            <a:off x="678096" y="4976545"/>
+            <a:ext cx="2100210" cy="1276715"/>
+          </a:xfrm>
+          <a:prstGeom prst="rect">
+            <a:avLst/>
+          </a:prstGeom>
+          <a:solidFill>
+            <a:schemeClr val="accent2"/>
+          </a:solidFill>
+        </p:spPr>
+        <p:style>
+          <a:lnRef idx="2">
+            <a:schemeClr val="accent1">
+              <a:shade val="15000"/>
+            </a:schemeClr>
+          </a:lnRef>
+          <a:fillRef idx="1">
+            <a:schemeClr val="accent1"/>
+          </a:fillRef>
+          <a:effectRef idx="0">
+            <a:schemeClr val="accent1"/>
+          </a:effectRef>
+          <a:fontRef idx="minor">
+            <a:schemeClr val="lt1"/>
+          </a:fontRef>
+        </p:style>
+        <p:txBody>
+          <a:bodyPr rtlCol="0" anchor="ctr"/>
+          <a:lstStyle/>
+          <a:p>
+            <a:pPr algn="ctr"/>
+            <a:r>
+              <a:rPr lang="en-US" dirty="0"/>
+              <a:t>Style:</a:t>
+            </a:r>
+          </a:p>
+          <a:p>
+            <a:pPr marL="342900" indent="-342900" algn="ctr">
+              <a:buAutoNum type="arabicPeriod"/>
+            </a:pPr>
+            <a:r>
+              <a:rPr lang="en-US" dirty="0"/>
+              <a:t>Spacing</a:t>
+            </a:r>
+          </a:p>
+          <a:p>
+            <a:pPr marL="342900" indent="-342900" algn="ctr">
+              <a:buAutoNum type="arabicPeriod"/>
+            </a:pPr>
+            <a:r>
+              <a:rPr lang="en-US" dirty="0"/>
+              <a:t>Fonts</a:t>
+            </a:r>
+          </a:p>
+          <a:p>
+            <a:pPr marL="342900" indent="-342900" algn="ctr">
+              <a:buAutoNum type="arabicPeriod"/>
+            </a:pPr>
+            <a:r>
+              <a:rPr lang="en-US" dirty="0"/>
+              <a:t>Color</a:t>
+            </a:r>
+          </a:p>
+        </p:txBody>
+      </p:sp>
+      <p:cxnSp>
+        <p:nvCxnSpPr>
+          <p:cNvPr id="25" name="Straight Arrow Connector 24">
+            <a:extLst>
+              <a:ext uri="{FF2B5EF4-FFF2-40B4-BE49-F238E27FC236}">
+                <a16:creationId xmlns:a16="http://schemas.microsoft.com/office/drawing/2014/main" id="{F4165BCF-6E50-67E2-6D43-0DA32C926803}"/>
+              </a:ext>
+            </a:extLst>
+          </p:cNvPr>
+          <p:cNvCxnSpPr>
+            <a:stCxn id="23" idx="0"/>
+          </p:cNvCxnSpPr>
+          <p:nvPr/>
+        </p:nvCxnSpPr>
+        <p:spPr>
+          <a:xfrm flipV="1">
+            <a:off x="1728201" y="4582274"/>
+            <a:ext cx="1590352" cy="394271"/>
+          </a:xfrm>
+          <a:prstGeom prst="straightConnector1">
+            <a:avLst/>
+          </a:prstGeom>
+          <a:ln>
+            <a:tailEnd type="triangle"/>
+          </a:ln>
+        </p:spPr>
+        <p:style>
+          <a:lnRef idx="2">
+            <a:schemeClr val="accent1"/>
+          </a:lnRef>
+          <a:fillRef idx="0">
+            <a:schemeClr val="accent1"/>
+          </a:fillRef>
+          <a:effectRef idx="1">
+            <a:schemeClr val="accent1"/>
+          </a:effectRef>
+          <a:fontRef idx="minor">
+            <a:schemeClr val="tx1"/>
+          </a:fontRef>
+        </p:style>
+      </p:cxnSp>
+      <p:sp>
+        <p:nvSpPr>
+          <p:cNvPr id="26" name="Rectangle 25">
+            <a:extLst>
+              <a:ext uri="{FF2B5EF4-FFF2-40B4-BE49-F238E27FC236}">
+                <a16:creationId xmlns:a16="http://schemas.microsoft.com/office/drawing/2014/main" id="{C446B378-D735-74B9-27A5-F2987FBE06B3}"/>
+              </a:ext>
+            </a:extLst>
+          </p:cNvPr>
+          <p:cNvSpPr/>
+          <p:nvPr/>
+        </p:nvSpPr>
+        <p:spPr>
+          <a:xfrm>
+            <a:off x="9851624" y="5212621"/>
+            <a:ext cx="1875031" cy="1276715"/>
+          </a:xfrm>
+          <a:prstGeom prst="rect">
+            <a:avLst/>
+          </a:prstGeom>
+          <a:ln w="28575">
+            <a:solidFill>
+              <a:srgbClr val="FF0000"/>
+            </a:solidFill>
+          </a:ln>
+        </p:spPr>
+        <p:style>
+          <a:lnRef idx="2">
+            <a:schemeClr val="accent1">
+              <a:shade val="15000"/>
+            </a:schemeClr>
+          </a:lnRef>
+          <a:fillRef idx="1">
+            <a:schemeClr val="accent1"/>
+          </a:fillRef>
+          <a:effectRef idx="0">
+            <a:schemeClr val="accent1"/>
+          </a:effectRef>
+          <a:fontRef idx="minor">
+            <a:schemeClr val="lt1"/>
+          </a:fontRef>
+        </p:style>
+        <p:txBody>
+          <a:bodyPr rtlCol="0" anchor="ctr"/>
+          <a:lstStyle/>
+          <a:p>
+            <a:pPr algn="ctr"/>
+            <a:r>
+              <a:rPr lang="en-US" dirty="0"/>
+              <a:t>A page with many “simple” text box lists to copy if needed</a:t>
+            </a:r>
+          </a:p>
+        </p:txBody>
+      </p:sp>
+      <p:sp>
+        <p:nvSpPr>
+          <p:cNvPr id="27" name="Oval 26">
+            <a:extLst>
+              <a:ext uri="{FF2B5EF4-FFF2-40B4-BE49-F238E27FC236}">
+                <a16:creationId xmlns:a16="http://schemas.microsoft.com/office/drawing/2014/main" id="{8C0E29F9-181C-34D4-2BB2-2A810C494312}"/>
+              </a:ext>
+            </a:extLst>
+          </p:cNvPr>
+          <p:cNvSpPr/>
+          <p:nvPr/>
+        </p:nvSpPr>
+        <p:spPr>
+          <a:xfrm>
+            <a:off x="3521722" y="4679878"/>
+            <a:ext cx="437857" cy="437857"/>
+          </a:xfrm>
+          <a:prstGeom prst="ellipse">
+            <a:avLst/>
+          </a:prstGeom>
+        </p:spPr>
+        <p:style>
+          <a:lnRef idx="2">
+            <a:schemeClr val="accent1">
+              <a:shade val="15000"/>
+            </a:schemeClr>
+          </a:lnRef>
+          <a:fillRef idx="1">
+            <a:schemeClr val="accent1"/>
+          </a:fillRef>
+          <a:effectRef idx="0">
+            <a:schemeClr val="accent1"/>
+          </a:effectRef>
+          <a:fontRef idx="minor">
+            <a:schemeClr val="lt1"/>
+          </a:fontRef>
+        </p:style>
+        <p:txBody>
+          <a:bodyPr rtlCol="0" anchor="ctr"/>
+          <a:lstStyle/>
+          <a:p>
+            <a:pPr algn="ctr"/>
+            <a:r>
+              <a:rPr lang="en-US" dirty="0"/>
+              <a:t>1</a:t>
+            </a:r>
+          </a:p>
+        </p:txBody>
+      </p:sp>
+      <p:sp>
+        <p:nvSpPr>
+          <p:cNvPr id="28" name="Oval 27">
+            <a:extLst>
+              <a:ext uri="{FF2B5EF4-FFF2-40B4-BE49-F238E27FC236}">
+                <a16:creationId xmlns:a16="http://schemas.microsoft.com/office/drawing/2014/main" id="{CDE95F12-2811-FBBD-9B88-367040C995AD}"/>
+              </a:ext>
+            </a:extLst>
+          </p:cNvPr>
+          <p:cNvSpPr/>
+          <p:nvPr/>
+        </p:nvSpPr>
+        <p:spPr>
+          <a:xfrm>
+            <a:off x="9313522" y="5677830"/>
+            <a:ext cx="437857" cy="437857"/>
+          </a:xfrm>
+          <a:prstGeom prst="ellipse">
+            <a:avLst/>
+          </a:prstGeom>
+        </p:spPr>
+        <p:style>
+          <a:lnRef idx="2">
+            <a:schemeClr val="accent1">
+              <a:shade val="15000"/>
+            </a:schemeClr>
+          </a:lnRef>
+          <a:fillRef idx="1">
+            <a:schemeClr val="accent1"/>
+          </a:fillRef>
+          <a:effectRef idx="0">
+            <a:schemeClr val="accent1"/>
+          </a:effectRef>
+          <a:fontRef idx="minor">
+            <a:schemeClr val="lt1"/>
+          </a:fontRef>
+        </p:style>
+        <p:txBody>
+          <a:bodyPr rtlCol="0" anchor="ctr"/>
+          <a:lstStyle/>
+          <a:p>
+            <a:pPr algn="ctr"/>
+            <a:r>
+              <a:rPr lang="en-US" dirty="0"/>
+              <a:t>2</a:t>
+            </a:r>
+          </a:p>
+        </p:txBody>
+      </p:sp>
+      <p:sp>
+        <p:nvSpPr>
+          <p:cNvPr id="29" name="TextBox 28">
+            <a:extLst>
+              <a:ext uri="{FF2B5EF4-FFF2-40B4-BE49-F238E27FC236}">
+                <a16:creationId xmlns:a16="http://schemas.microsoft.com/office/drawing/2014/main" id="{9D115F54-FFF3-F1FB-9474-0D1E98D17DB3}"/>
+              </a:ext>
+            </a:extLst>
+          </p:cNvPr>
+          <p:cNvSpPr txBox="1"/>
+          <p:nvPr/>
+        </p:nvSpPr>
+        <p:spPr>
+          <a:xfrm>
+            <a:off x="9977480" y="6507664"/>
+            <a:ext cx="1623318" cy="307777"/>
+          </a:xfrm>
+          <a:prstGeom prst="rect">
+            <a:avLst/>
+          </a:prstGeom>
+          <a:noFill/>
+        </p:spPr>
+        <p:txBody>
+          <a:bodyPr wrap="square" rtlCol="0">
+            <a:spAutoFit/>
+          </a:bodyPr>
+          <a:lstStyle/>
+          <a:p>
+            <a:pPr algn="ctr"/>
+            <a:r>
+              <a:rPr lang="en-US" sz="1400" dirty="0"/>
+              <a:t>Cannot inherit</a:t>
+            </a:r>
+          </a:p>
+        </p:txBody>
+      </p:sp>
+      <p:sp>
+        <p:nvSpPr>
+          <p:cNvPr id="30" name="TextBox 29">
+            <a:extLst>
+              <a:ext uri="{FF2B5EF4-FFF2-40B4-BE49-F238E27FC236}">
+                <a16:creationId xmlns:a16="http://schemas.microsoft.com/office/drawing/2014/main" id="{1425159A-EDD6-74AB-A389-1ED3560A79F5}"/>
+              </a:ext>
+            </a:extLst>
+          </p:cNvPr>
+          <p:cNvSpPr txBox="1"/>
+          <p:nvPr/>
+        </p:nvSpPr>
+        <p:spPr>
+          <a:xfrm>
+            <a:off x="8720791" y="1739693"/>
+            <a:ext cx="1623318" cy="307777"/>
+          </a:xfrm>
+          <a:prstGeom prst="rect">
+            <a:avLst/>
+          </a:prstGeom>
+          <a:noFill/>
+        </p:spPr>
+        <p:txBody>
+          <a:bodyPr wrap="square" rtlCol="0">
+            <a:spAutoFit/>
+          </a:bodyPr>
+          <a:lstStyle/>
+          <a:p>
+            <a:pPr algn="ctr"/>
+            <a:r>
+              <a:rPr lang="en-US" sz="1400" dirty="0"/>
+              <a:t>Can  inherit</a:t>
             </a:r>
           </a:p>
         </p:txBody>
@@ -5548,7 +5982,7 @@
           <p:cNvPr id="3" name="Slide Number Placeholder 2">
             <a:extLst>
               <a:ext uri="{FF2B5EF4-FFF2-40B4-BE49-F238E27FC236}">
-                <a16:creationId xmlns:a16="http://schemas.microsoft.com/office/drawing/2014/main" id="{CEF38F97-C294-632E-FD05-A5A19DE454DC}"/>
+                <a16:creationId xmlns:a16="http://schemas.microsoft.com/office/drawing/2014/main" id="{3582FC77-6A46-E2DE-9D6A-A717E3259DFB}"/>
               </a:ext>
             </a:extLst>
           </p:cNvPr>
@@ -5575,7 +6009,7 @@
     </p:spTree>
     <p:extLst>
       <p:ext uri="{BB962C8B-B14F-4D97-AF65-F5344CB8AC3E}">
-        <p14:creationId xmlns:p14="http://schemas.microsoft.com/office/powerpoint/2010/main" val="2129008339"/>
+        <p14:creationId xmlns:p14="http://schemas.microsoft.com/office/powerpoint/2010/main" val="40197265"/>
       </p:ext>
     </p:extLst>
   </p:cSld>
@@ -5604,10 +6038,10 @@
       </p:grpSpPr>
       <p:sp>
         <p:nvSpPr>
-          <p:cNvPr id="2" name="Title 1">
-            <a:extLst>
-              <a:ext uri="{FF2B5EF4-FFF2-40B4-BE49-F238E27FC236}">
-                <a16:creationId xmlns:a16="http://schemas.microsoft.com/office/drawing/2014/main" id="{19BBCCE5-5245-8FBD-AF76-88D1B2E00AB6}"/>
+          <p:cNvPr id="4" name="Title 3">
+            <a:extLst>
+              <a:ext uri="{FF2B5EF4-FFF2-40B4-BE49-F238E27FC236}">
+                <a16:creationId xmlns:a16="http://schemas.microsoft.com/office/drawing/2014/main" id="{BB2BD00F-8EA4-14C5-BD5F-97F9AD513213}"/>
               </a:ext>
             </a:extLst>
           </p:cNvPr>
@@ -5615,7 +6049,7 @@
             <a:spLocks noGrp="1"/>
           </p:cNvSpPr>
           <p:nvPr>
-            <p:ph type="title"/>
+            <p:ph type="ctrTitle"/>
           </p:nvPr>
         </p:nvSpPr>
         <p:spPr/>
@@ -5623,91 +6057,9 @@
           <a:bodyPr/>
           <a:lstStyle/>
           <a:p>
-            <a:pPr algn="ctr"/>
-            <a:r>
-              <a:rPr lang="en-US" dirty="0"/>
-              <a:t>A Simple List layout: black-list-layout</a:t>
-            </a:r>
-          </a:p>
-        </p:txBody>
-      </p:sp>
-      <p:sp>
-        <p:nvSpPr>
-          <p:cNvPr id="7" name="Content Placeholder 6">
-            <a:extLst>
-              <a:ext uri="{FF2B5EF4-FFF2-40B4-BE49-F238E27FC236}">
-                <a16:creationId xmlns:a16="http://schemas.microsoft.com/office/drawing/2014/main" id="{42A0049C-AD5E-973D-12AA-663DC835CF4C}"/>
-              </a:ext>
-            </a:extLst>
-          </p:cNvPr>
-          <p:cNvSpPr>
-            <a:spLocks noGrp="1"/>
-          </p:cNvSpPr>
-          <p:nvPr>
-            <p:ph idx="1"/>
-          </p:nvPr>
-        </p:nvSpPr>
-        <p:spPr>
-          <a:xfrm>
-            <a:off x="838200" y="1026635"/>
-            <a:ext cx="10515600" cy="2928916"/>
-          </a:xfrm>
-        </p:spPr>
-        <p:txBody>
-          <a:bodyPr/>
-          <a:lstStyle/>
-          <a:p>
-            <a:r>
-              <a:rPr lang="en-US" sz="1800" dirty="0"/>
-              <a:t>Heading 1 [Black color]</a:t>
-            </a:r>
-          </a:p>
-          <a:p>
-            <a:pPr lvl="1"/>
-            <a:r>
-              <a:rPr lang="en-US" sz="1600" dirty="0"/>
-              <a:t>L2</a:t>
-            </a:r>
-          </a:p>
-          <a:p>
-            <a:pPr lvl="1"/>
-            <a:r>
-              <a:rPr lang="en-US" sz="1600" dirty="0"/>
-              <a:t>L2</a:t>
-            </a:r>
-          </a:p>
-          <a:p>
-            <a:pPr lvl="2"/>
-            <a:r>
-              <a:rPr lang="en-US" sz="1400" dirty="0"/>
-              <a:t>L3</a:t>
-            </a:r>
-          </a:p>
-          <a:p>
-            <a:pPr lvl="2"/>
-            <a:r>
-              <a:rPr lang="en-US" sz="1400" dirty="0"/>
-              <a:t>L3</a:t>
-            </a:r>
-          </a:p>
-          <a:p>
-            <a:pPr lvl="1"/>
-            <a:r>
-              <a:rPr lang="en-US" sz="1600" dirty="0"/>
-              <a:t>L2</a:t>
-            </a:r>
-          </a:p>
-          <a:p>
-            <a:r>
-              <a:rPr lang="en-US" sz="1800" dirty="0"/>
-              <a:t>Heading 1</a:t>
-            </a:r>
-          </a:p>
-          <a:p>
-            <a:pPr lvl="1"/>
-            <a:r>
-              <a:rPr lang="en-US" sz="1600" dirty="0"/>
-              <a:t>Etc.</a:t>
+            <a:r>
+              <a:rPr lang="en-US" dirty="0"/>
+              <a:t>Testing of List Behavior</a:t>
             </a:r>
           </a:p>
         </p:txBody>
@@ -5717,7 +6069,7 @@
           <p:cNvPr id="3" name="Slide Number Placeholder 2">
             <a:extLst>
               <a:ext uri="{FF2B5EF4-FFF2-40B4-BE49-F238E27FC236}">
-                <a16:creationId xmlns:a16="http://schemas.microsoft.com/office/drawing/2014/main" id="{CA447B35-C114-1246-1A16-CFD2AE877806}"/>
+                <a16:creationId xmlns:a16="http://schemas.microsoft.com/office/drawing/2014/main" id="{CEF38F97-C294-632E-FD05-A5A19DE454DC}"/>
               </a:ext>
             </a:extLst>
           </p:cNvPr>
@@ -5741,334 +6093,10 @@
           </a:p>
         </p:txBody>
       </p:sp>
-      <p:sp>
-        <p:nvSpPr>
-          <p:cNvPr id="6" name="TextBox 5">
-            <a:extLst>
-              <a:ext uri="{FF2B5EF4-FFF2-40B4-BE49-F238E27FC236}">
-                <a16:creationId xmlns:a16="http://schemas.microsoft.com/office/drawing/2014/main" id="{8A74DE0E-E0F1-40E9-9EBA-8FCE9F676E03}"/>
-              </a:ext>
-            </a:extLst>
-          </p:cNvPr>
-          <p:cNvSpPr txBox="1"/>
-          <p:nvPr/>
-        </p:nvSpPr>
-        <p:spPr>
-          <a:xfrm>
-            <a:off x="4008584" y="4962418"/>
-            <a:ext cx="7345216" cy="1200329"/>
-          </a:xfrm>
-          <a:prstGeom prst="rect">
-            <a:avLst/>
-          </a:prstGeom>
-          <a:noFill/>
-          <a:ln w="28575">
-            <a:solidFill>
-              <a:schemeClr val="accent2"/>
-            </a:solidFill>
-          </a:ln>
-        </p:spPr>
-        <p:txBody>
-          <a:bodyPr wrap="none" rtlCol="0">
-            <a:spAutoFit/>
-          </a:bodyPr>
-          <a:lstStyle/>
-          <a:p>
-            <a:pPr marL="342900" indent="-342900">
-              <a:buAutoNum type="arabicPeriod"/>
-            </a:pPr>
-            <a:r>
-              <a:rPr lang="en-US" dirty="0"/>
-              <a:t>A simple example of using a layout list</a:t>
-            </a:r>
-          </a:p>
-          <a:p>
-            <a:pPr marL="342900" indent="-342900">
-              <a:buAutoNum type="arabicPeriod"/>
-            </a:pPr>
-            <a:r>
-              <a:rPr lang="en-US" dirty="0"/>
-              <a:t>The space, font, </a:t>
-            </a:r>
-            <a:r>
-              <a:rPr lang="en-US" dirty="0" err="1"/>
-              <a:t>etc</a:t>
-            </a:r>
-            <a:r>
-              <a:rPr lang="en-US" dirty="0"/>
-              <a:t> are configured on the layout page (master pages)</a:t>
-            </a:r>
-          </a:p>
-          <a:p>
-            <a:pPr marL="342900" indent="-342900">
-              <a:buAutoNum type="arabicPeriod"/>
-            </a:pPr>
-            <a:r>
-              <a:rPr lang="en-US" dirty="0"/>
-              <a:t>Changing that definition will change this list above.</a:t>
-            </a:r>
-          </a:p>
-          <a:p>
-            <a:pPr marL="342900" indent="-342900">
-              <a:buAutoNum type="arabicPeriod"/>
-            </a:pPr>
-            <a:r>
-              <a:rPr lang="en-US" dirty="0"/>
-              <a:t>Note: Those lists are different from this list here (inside this text box)</a:t>
-            </a:r>
-          </a:p>
-        </p:txBody>
-      </p:sp>
-      <p:sp>
-        <p:nvSpPr>
-          <p:cNvPr id="9" name="Rectangle 8">
-            <a:extLst>
-              <a:ext uri="{FF2B5EF4-FFF2-40B4-BE49-F238E27FC236}">
-                <a16:creationId xmlns:a16="http://schemas.microsoft.com/office/drawing/2014/main" id="{2008F7A9-61C1-3CFF-3DC7-11A4F4248A8A}"/>
-              </a:ext>
-            </a:extLst>
-          </p:cNvPr>
-          <p:cNvSpPr/>
-          <p:nvPr/>
-        </p:nvSpPr>
-        <p:spPr>
-          <a:xfrm>
-            <a:off x="2321959" y="4042252"/>
-            <a:ext cx="1921267" cy="318499"/>
-          </a:xfrm>
-          <a:prstGeom prst="rect">
-            <a:avLst/>
-          </a:prstGeom>
-        </p:spPr>
-        <p:style>
-          <a:lnRef idx="2">
-            <a:schemeClr val="accent1">
-              <a:shade val="15000"/>
-            </a:schemeClr>
-          </a:lnRef>
-          <a:fillRef idx="1">
-            <a:schemeClr val="accent1"/>
-          </a:fillRef>
-          <a:effectRef idx="0">
-            <a:schemeClr val="accent1"/>
-          </a:effectRef>
-          <a:fontRef idx="minor">
-            <a:schemeClr val="lt1"/>
-          </a:fontRef>
-        </p:style>
-        <p:txBody>
-          <a:bodyPr rtlCol="0" anchor="ctr"/>
-          <a:lstStyle/>
-          <a:p>
-            <a:pPr algn="ctr"/>
-            <a:r>
-              <a:rPr lang="en-US" dirty="0"/>
-              <a:t>Layout list</a:t>
-            </a:r>
-          </a:p>
-        </p:txBody>
-      </p:sp>
-      <p:sp>
-        <p:nvSpPr>
-          <p:cNvPr id="10" name="Rectangle 9">
-            <a:extLst>
-              <a:ext uri="{FF2B5EF4-FFF2-40B4-BE49-F238E27FC236}">
-                <a16:creationId xmlns:a16="http://schemas.microsoft.com/office/drawing/2014/main" id="{4F68B47C-42C8-BDD4-79A1-51CAC04C420A}"/>
-              </a:ext>
-            </a:extLst>
-          </p:cNvPr>
-          <p:cNvSpPr/>
-          <p:nvPr/>
-        </p:nvSpPr>
-        <p:spPr>
-          <a:xfrm>
-            <a:off x="4008584" y="6266018"/>
-            <a:ext cx="1921267" cy="318499"/>
-          </a:xfrm>
-          <a:prstGeom prst="rect">
-            <a:avLst/>
-          </a:prstGeom>
-        </p:spPr>
-        <p:style>
-          <a:lnRef idx="2">
-            <a:schemeClr val="accent1">
-              <a:shade val="15000"/>
-            </a:schemeClr>
-          </a:lnRef>
-          <a:fillRef idx="1">
-            <a:schemeClr val="accent1"/>
-          </a:fillRef>
-          <a:effectRef idx="0">
-            <a:schemeClr val="accent1"/>
-          </a:effectRef>
-          <a:fontRef idx="minor">
-            <a:schemeClr val="lt1"/>
-          </a:fontRef>
-        </p:style>
-        <p:txBody>
-          <a:bodyPr rtlCol="0" anchor="ctr"/>
-          <a:lstStyle/>
-          <a:p>
-            <a:pPr algn="ctr"/>
-            <a:r>
-              <a:rPr lang="en-US" dirty="0"/>
-              <a:t>Just a text box list</a:t>
-            </a:r>
-          </a:p>
-        </p:txBody>
-      </p:sp>
-      <p:sp>
-        <p:nvSpPr>
-          <p:cNvPr id="11" name="Oval 10">
-            <a:extLst>
-              <a:ext uri="{FF2B5EF4-FFF2-40B4-BE49-F238E27FC236}">
-                <a16:creationId xmlns:a16="http://schemas.microsoft.com/office/drawing/2014/main" id="{ECD32560-B899-A73A-1720-3D39EE1DDAB1}"/>
-              </a:ext>
-            </a:extLst>
-          </p:cNvPr>
-          <p:cNvSpPr/>
-          <p:nvPr/>
-        </p:nvSpPr>
-        <p:spPr>
-          <a:xfrm>
-            <a:off x="513709" y="4962418"/>
-            <a:ext cx="1921267" cy="914400"/>
-          </a:xfrm>
-          <a:prstGeom prst="ellipse">
-            <a:avLst/>
-          </a:prstGeom>
-        </p:spPr>
-        <p:style>
-          <a:lnRef idx="2">
-            <a:schemeClr val="accent1">
-              <a:shade val="15000"/>
-            </a:schemeClr>
-          </a:lnRef>
-          <a:fillRef idx="1">
-            <a:schemeClr val="accent1"/>
-          </a:fillRef>
-          <a:effectRef idx="0">
-            <a:schemeClr val="accent1"/>
-          </a:effectRef>
-          <a:fontRef idx="minor">
-            <a:schemeClr val="lt1"/>
-          </a:fontRef>
-        </p:style>
-        <p:txBody>
-          <a:bodyPr rtlCol="0" anchor="ctr"/>
-          <a:lstStyle/>
-          <a:p>
-            <a:pPr algn="ctr"/>
-            <a:r>
-              <a:rPr lang="en-US" dirty="0"/>
-              <a:t>Two</a:t>
-            </a:r>
-          </a:p>
-          <a:p>
-            <a:pPr algn="ctr"/>
-            <a:r>
-              <a:rPr lang="en-US" dirty="0"/>
-              <a:t>Different</a:t>
-            </a:r>
-          </a:p>
-          <a:p>
-            <a:pPr algn="ctr"/>
-            <a:r>
-              <a:rPr lang="en-US" dirty="0"/>
-              <a:t> Things</a:t>
-            </a:r>
-          </a:p>
-        </p:txBody>
-      </p:sp>
-      <p:cxnSp>
-        <p:nvCxnSpPr>
-          <p:cNvPr id="13" name="Straight Arrow Connector 12">
-            <a:extLst>
-              <a:ext uri="{FF2B5EF4-FFF2-40B4-BE49-F238E27FC236}">
-                <a16:creationId xmlns:a16="http://schemas.microsoft.com/office/drawing/2014/main" id="{D4393FDE-A4E6-3575-7738-8BAF771730E5}"/>
-              </a:ext>
-            </a:extLst>
-          </p:cNvPr>
-          <p:cNvCxnSpPr>
-            <a:stCxn id="11" idx="6"/>
-            <a:endCxn id="9" idx="2"/>
-          </p:cNvCxnSpPr>
-          <p:nvPr/>
-        </p:nvCxnSpPr>
-        <p:spPr>
-          <a:xfrm flipV="1">
-            <a:off x="2434976" y="4360751"/>
-            <a:ext cx="847617" cy="1058867"/>
-          </a:xfrm>
-          <a:prstGeom prst="straightConnector1">
-            <a:avLst/>
-          </a:prstGeom>
-          <a:ln>
-            <a:tailEnd type="triangle"/>
-          </a:ln>
-        </p:spPr>
-        <p:style>
-          <a:lnRef idx="2">
-            <a:schemeClr val="accent1"/>
-          </a:lnRef>
-          <a:fillRef idx="0">
-            <a:schemeClr val="accent1"/>
-          </a:fillRef>
-          <a:effectRef idx="1">
-            <a:schemeClr val="accent1"/>
-          </a:effectRef>
-          <a:fontRef idx="minor">
-            <a:schemeClr val="tx1"/>
-          </a:fontRef>
-        </p:style>
-      </p:cxnSp>
-      <p:cxnSp>
-        <p:nvCxnSpPr>
-          <p:cNvPr id="14" name="Straight Arrow Connector 13">
-            <a:extLst>
-              <a:ext uri="{FF2B5EF4-FFF2-40B4-BE49-F238E27FC236}">
-                <a16:creationId xmlns:a16="http://schemas.microsoft.com/office/drawing/2014/main" id="{EA1A4872-458D-2507-FC71-2A2D9745B6F7}"/>
-              </a:ext>
-            </a:extLst>
-          </p:cNvPr>
-          <p:cNvCxnSpPr>
-            <a:cxnSpLocks/>
-            <a:stCxn id="11" idx="6"/>
-            <a:endCxn id="10" idx="1"/>
-          </p:cNvCxnSpPr>
-          <p:nvPr/>
-        </p:nvCxnSpPr>
-        <p:spPr>
-          <a:xfrm>
-            <a:off x="2434976" y="5419618"/>
-            <a:ext cx="1573608" cy="1005650"/>
-          </a:xfrm>
-          <a:prstGeom prst="straightConnector1">
-            <a:avLst/>
-          </a:prstGeom>
-          <a:ln>
-            <a:tailEnd type="triangle"/>
-          </a:ln>
-        </p:spPr>
-        <p:style>
-          <a:lnRef idx="2">
-            <a:schemeClr val="accent1"/>
-          </a:lnRef>
-          <a:fillRef idx="0">
-            <a:schemeClr val="accent1"/>
-          </a:fillRef>
-          <a:effectRef idx="1">
-            <a:schemeClr val="accent1"/>
-          </a:effectRef>
-          <a:fontRef idx="minor">
-            <a:schemeClr val="tx1"/>
-          </a:fontRef>
-        </p:style>
-      </p:cxnSp>
     </p:spTree>
     <p:extLst>
       <p:ext uri="{BB962C8B-B14F-4D97-AF65-F5344CB8AC3E}">
-        <p14:creationId xmlns:p14="http://schemas.microsoft.com/office/powerpoint/2010/main" val="2951360396"/>
+        <p14:creationId xmlns:p14="http://schemas.microsoft.com/office/powerpoint/2010/main" val="2129008339"/>
       </p:ext>
     </p:extLst>
   </p:cSld>
@@ -7191,7 +7219,7 @@
             <a:pPr algn="ctr"/>
             <a:r>
               <a:rPr lang="en-US" dirty="0"/>
-              <a:t>Layout lists: Using 2 layout lists on a page</a:t>
+              <a:t>A Simple List layout: black-list-layout</a:t>
             </a:r>
           </a:p>
         </p:txBody>
@@ -7212,61 +7240,66 @@
             <p:ph idx="1"/>
           </p:nvPr>
         </p:nvSpPr>
-        <p:spPr/>
+        <p:spPr>
+          <a:xfrm>
+            <a:off x="838200" y="1026635"/>
+            <a:ext cx="10515600" cy="2928916"/>
+          </a:xfrm>
+        </p:spPr>
         <p:txBody>
           <a:bodyPr/>
           <a:lstStyle/>
           <a:p>
             <a:r>
-              <a:rPr lang="en-US" sz="2000" dirty="0"/>
-              <a:t>Heading 1 [Colorful one]</a:t>
+              <a:rPr lang="en-US" sz="1800" dirty="0"/>
+              <a:t>Heading 1 [Black color]</a:t>
             </a:r>
           </a:p>
           <a:p>
             <a:pPr lvl="1"/>
             <a:r>
+              <a:rPr lang="en-US" sz="1600" dirty="0"/>
+              <a:t>L2</a:t>
+            </a:r>
+          </a:p>
+          <a:p>
+            <a:pPr lvl="1"/>
+            <a:r>
+              <a:rPr lang="en-US" sz="1600" dirty="0"/>
+              <a:t>L2</a:t>
+            </a:r>
+          </a:p>
+          <a:p>
+            <a:pPr lvl="2"/>
+            <a:r>
+              <a:rPr lang="en-US" sz="1400" dirty="0"/>
+              <a:t>L3</a:t>
+            </a:r>
+          </a:p>
+          <a:p>
+            <a:pPr lvl="2"/>
+            <a:r>
+              <a:rPr lang="en-US" sz="1400" dirty="0"/>
+              <a:t>L3</a:t>
+            </a:r>
+          </a:p>
+          <a:p>
+            <a:pPr lvl="1"/>
+            <a:r>
+              <a:rPr lang="en-US" sz="1600" dirty="0"/>
+              <a:t>L2</a:t>
+            </a:r>
+          </a:p>
+          <a:p>
+            <a:r>
               <a:rPr lang="en-US" sz="1800" dirty="0"/>
-              <a:t>L2</a:t>
+              <a:t>Heading 1</a:t>
             </a:r>
           </a:p>
           <a:p>
             <a:pPr lvl="1"/>
             <a:r>
-              <a:rPr lang="en-US" sz="1800" dirty="0"/>
-              <a:t>L2</a:t>
-            </a:r>
-          </a:p>
-          <a:p>
-            <a:pPr lvl="2"/>
-            <a:r>
               <a:rPr lang="en-US" sz="1600" dirty="0"/>
-              <a:t>L3</a:t>
-            </a:r>
-          </a:p>
-          <a:p>
-            <a:pPr lvl="2"/>
-            <a:r>
-              <a:rPr lang="en-US" sz="1600" dirty="0"/>
-              <a:t>L3</a:t>
-            </a:r>
-          </a:p>
-          <a:p>
-            <a:pPr lvl="1"/>
-            <a:r>
-              <a:rPr lang="en-US" sz="1800" dirty="0"/>
-              <a:t>L2</a:t>
-            </a:r>
-          </a:p>
-          <a:p>
-            <a:r>
-              <a:rPr lang="en-US" sz="2000" dirty="0"/>
-              <a:t>Heading 1</a:t>
-            </a:r>
-          </a:p>
-          <a:p>
-            <a:pPr lvl="1"/>
-            <a:r>
-              <a:rPr lang="en-US" sz="1800" dirty="0"/>
               <a:t>Etc.</a:t>
             </a:r>
           </a:p>
@@ -7274,10 +7307,10 @@
       </p:sp>
       <p:sp>
         <p:nvSpPr>
-          <p:cNvPr id="8" name="Slide Number Placeholder 7">
-            <a:extLst>
-              <a:ext uri="{FF2B5EF4-FFF2-40B4-BE49-F238E27FC236}">
-                <a16:creationId xmlns:a16="http://schemas.microsoft.com/office/drawing/2014/main" id="{1FAB160F-8C75-F154-BC92-F72D6EE09F8E}"/>
+          <p:cNvPr id="3" name="Slide Number Placeholder 2">
+            <a:extLst>
+              <a:ext uri="{FF2B5EF4-FFF2-40B4-BE49-F238E27FC236}">
+                <a16:creationId xmlns:a16="http://schemas.microsoft.com/office/drawing/2014/main" id="{CA447B35-C114-1246-1A16-CFD2AE877806}"/>
               </a:ext>
             </a:extLst>
           </p:cNvPr>
@@ -7296,6 +7329,494 @@
             <a:fld id="{80473052-BA07-4FC5-9696-A0F7625044DE}" type="slidenum">
               <a:rPr lang="en-US" smtClean="0"/>
               <a:t>20</a:t>
+            </a:fld>
+            <a:endParaRPr lang="en-US"/>
+          </a:p>
+        </p:txBody>
+      </p:sp>
+      <p:sp>
+        <p:nvSpPr>
+          <p:cNvPr id="6" name="TextBox 5">
+            <a:extLst>
+              <a:ext uri="{FF2B5EF4-FFF2-40B4-BE49-F238E27FC236}">
+                <a16:creationId xmlns:a16="http://schemas.microsoft.com/office/drawing/2014/main" id="{8A74DE0E-E0F1-40E9-9EBA-8FCE9F676E03}"/>
+              </a:ext>
+            </a:extLst>
+          </p:cNvPr>
+          <p:cNvSpPr txBox="1"/>
+          <p:nvPr/>
+        </p:nvSpPr>
+        <p:spPr>
+          <a:xfrm>
+            <a:off x="4008584" y="4962418"/>
+            <a:ext cx="7345216" cy="1200329"/>
+          </a:xfrm>
+          <a:prstGeom prst="rect">
+            <a:avLst/>
+          </a:prstGeom>
+          <a:noFill/>
+          <a:ln w="28575">
+            <a:solidFill>
+              <a:schemeClr val="accent2"/>
+            </a:solidFill>
+          </a:ln>
+        </p:spPr>
+        <p:txBody>
+          <a:bodyPr wrap="none" rtlCol="0">
+            <a:spAutoFit/>
+          </a:bodyPr>
+          <a:lstStyle/>
+          <a:p>
+            <a:pPr marL="342900" indent="-342900">
+              <a:buAutoNum type="arabicPeriod"/>
+            </a:pPr>
+            <a:r>
+              <a:rPr lang="en-US" dirty="0"/>
+              <a:t>A simple example of using a layout list</a:t>
+            </a:r>
+          </a:p>
+          <a:p>
+            <a:pPr marL="342900" indent="-342900">
+              <a:buAutoNum type="arabicPeriod"/>
+            </a:pPr>
+            <a:r>
+              <a:rPr lang="en-US" dirty="0"/>
+              <a:t>The space, font, </a:t>
+            </a:r>
+            <a:r>
+              <a:rPr lang="en-US" dirty="0" err="1"/>
+              <a:t>etc</a:t>
+            </a:r>
+            <a:r>
+              <a:rPr lang="en-US" dirty="0"/>
+              <a:t> are configured on the layout page (master pages)</a:t>
+            </a:r>
+          </a:p>
+          <a:p>
+            <a:pPr marL="342900" indent="-342900">
+              <a:buAutoNum type="arabicPeriod"/>
+            </a:pPr>
+            <a:r>
+              <a:rPr lang="en-US" dirty="0"/>
+              <a:t>Changing that definition will change this list above.</a:t>
+            </a:r>
+          </a:p>
+          <a:p>
+            <a:pPr marL="342900" indent="-342900">
+              <a:buAutoNum type="arabicPeriod"/>
+            </a:pPr>
+            <a:r>
+              <a:rPr lang="en-US" dirty="0"/>
+              <a:t>Note: Those lists are different from this list here (inside this text box)</a:t>
+            </a:r>
+          </a:p>
+        </p:txBody>
+      </p:sp>
+      <p:sp>
+        <p:nvSpPr>
+          <p:cNvPr id="9" name="Rectangle 8">
+            <a:extLst>
+              <a:ext uri="{FF2B5EF4-FFF2-40B4-BE49-F238E27FC236}">
+                <a16:creationId xmlns:a16="http://schemas.microsoft.com/office/drawing/2014/main" id="{2008F7A9-61C1-3CFF-3DC7-11A4F4248A8A}"/>
+              </a:ext>
+            </a:extLst>
+          </p:cNvPr>
+          <p:cNvSpPr/>
+          <p:nvPr/>
+        </p:nvSpPr>
+        <p:spPr>
+          <a:xfrm>
+            <a:off x="2321959" y="4042252"/>
+            <a:ext cx="1921267" cy="318499"/>
+          </a:xfrm>
+          <a:prstGeom prst="rect">
+            <a:avLst/>
+          </a:prstGeom>
+        </p:spPr>
+        <p:style>
+          <a:lnRef idx="2">
+            <a:schemeClr val="accent1">
+              <a:shade val="15000"/>
+            </a:schemeClr>
+          </a:lnRef>
+          <a:fillRef idx="1">
+            <a:schemeClr val="accent1"/>
+          </a:fillRef>
+          <a:effectRef idx="0">
+            <a:schemeClr val="accent1"/>
+          </a:effectRef>
+          <a:fontRef idx="minor">
+            <a:schemeClr val="lt1"/>
+          </a:fontRef>
+        </p:style>
+        <p:txBody>
+          <a:bodyPr rtlCol="0" anchor="ctr"/>
+          <a:lstStyle/>
+          <a:p>
+            <a:pPr algn="ctr"/>
+            <a:r>
+              <a:rPr lang="en-US" dirty="0"/>
+              <a:t>Layout list</a:t>
+            </a:r>
+          </a:p>
+        </p:txBody>
+      </p:sp>
+      <p:sp>
+        <p:nvSpPr>
+          <p:cNvPr id="10" name="Rectangle 9">
+            <a:extLst>
+              <a:ext uri="{FF2B5EF4-FFF2-40B4-BE49-F238E27FC236}">
+                <a16:creationId xmlns:a16="http://schemas.microsoft.com/office/drawing/2014/main" id="{4F68B47C-42C8-BDD4-79A1-51CAC04C420A}"/>
+              </a:ext>
+            </a:extLst>
+          </p:cNvPr>
+          <p:cNvSpPr/>
+          <p:nvPr/>
+        </p:nvSpPr>
+        <p:spPr>
+          <a:xfrm>
+            <a:off x="4008584" y="6266018"/>
+            <a:ext cx="1921267" cy="318499"/>
+          </a:xfrm>
+          <a:prstGeom prst="rect">
+            <a:avLst/>
+          </a:prstGeom>
+        </p:spPr>
+        <p:style>
+          <a:lnRef idx="2">
+            <a:schemeClr val="accent1">
+              <a:shade val="15000"/>
+            </a:schemeClr>
+          </a:lnRef>
+          <a:fillRef idx="1">
+            <a:schemeClr val="accent1"/>
+          </a:fillRef>
+          <a:effectRef idx="0">
+            <a:schemeClr val="accent1"/>
+          </a:effectRef>
+          <a:fontRef idx="minor">
+            <a:schemeClr val="lt1"/>
+          </a:fontRef>
+        </p:style>
+        <p:txBody>
+          <a:bodyPr rtlCol="0" anchor="ctr"/>
+          <a:lstStyle/>
+          <a:p>
+            <a:pPr algn="ctr"/>
+            <a:r>
+              <a:rPr lang="en-US" dirty="0"/>
+              <a:t>Just a text box list</a:t>
+            </a:r>
+          </a:p>
+        </p:txBody>
+      </p:sp>
+      <p:sp>
+        <p:nvSpPr>
+          <p:cNvPr id="11" name="Oval 10">
+            <a:extLst>
+              <a:ext uri="{FF2B5EF4-FFF2-40B4-BE49-F238E27FC236}">
+                <a16:creationId xmlns:a16="http://schemas.microsoft.com/office/drawing/2014/main" id="{ECD32560-B899-A73A-1720-3D39EE1DDAB1}"/>
+              </a:ext>
+            </a:extLst>
+          </p:cNvPr>
+          <p:cNvSpPr/>
+          <p:nvPr/>
+        </p:nvSpPr>
+        <p:spPr>
+          <a:xfrm>
+            <a:off x="513709" y="4962418"/>
+            <a:ext cx="1921267" cy="914400"/>
+          </a:xfrm>
+          <a:prstGeom prst="ellipse">
+            <a:avLst/>
+          </a:prstGeom>
+        </p:spPr>
+        <p:style>
+          <a:lnRef idx="2">
+            <a:schemeClr val="accent1">
+              <a:shade val="15000"/>
+            </a:schemeClr>
+          </a:lnRef>
+          <a:fillRef idx="1">
+            <a:schemeClr val="accent1"/>
+          </a:fillRef>
+          <a:effectRef idx="0">
+            <a:schemeClr val="accent1"/>
+          </a:effectRef>
+          <a:fontRef idx="minor">
+            <a:schemeClr val="lt1"/>
+          </a:fontRef>
+        </p:style>
+        <p:txBody>
+          <a:bodyPr rtlCol="0" anchor="ctr"/>
+          <a:lstStyle/>
+          <a:p>
+            <a:pPr algn="ctr"/>
+            <a:r>
+              <a:rPr lang="en-US" dirty="0"/>
+              <a:t>Two</a:t>
+            </a:r>
+          </a:p>
+          <a:p>
+            <a:pPr algn="ctr"/>
+            <a:r>
+              <a:rPr lang="en-US" dirty="0"/>
+              <a:t>Different</a:t>
+            </a:r>
+          </a:p>
+          <a:p>
+            <a:pPr algn="ctr"/>
+            <a:r>
+              <a:rPr lang="en-US" dirty="0"/>
+              <a:t> Things</a:t>
+            </a:r>
+          </a:p>
+        </p:txBody>
+      </p:sp>
+      <p:cxnSp>
+        <p:nvCxnSpPr>
+          <p:cNvPr id="13" name="Straight Arrow Connector 12">
+            <a:extLst>
+              <a:ext uri="{FF2B5EF4-FFF2-40B4-BE49-F238E27FC236}">
+                <a16:creationId xmlns:a16="http://schemas.microsoft.com/office/drawing/2014/main" id="{D4393FDE-A4E6-3575-7738-8BAF771730E5}"/>
+              </a:ext>
+            </a:extLst>
+          </p:cNvPr>
+          <p:cNvCxnSpPr>
+            <a:stCxn id="11" idx="6"/>
+            <a:endCxn id="9" idx="2"/>
+          </p:cNvCxnSpPr>
+          <p:nvPr/>
+        </p:nvCxnSpPr>
+        <p:spPr>
+          <a:xfrm flipV="1">
+            <a:off x="2434976" y="4360751"/>
+            <a:ext cx="847617" cy="1058867"/>
+          </a:xfrm>
+          <a:prstGeom prst="straightConnector1">
+            <a:avLst/>
+          </a:prstGeom>
+          <a:ln>
+            <a:tailEnd type="triangle"/>
+          </a:ln>
+        </p:spPr>
+        <p:style>
+          <a:lnRef idx="2">
+            <a:schemeClr val="accent1"/>
+          </a:lnRef>
+          <a:fillRef idx="0">
+            <a:schemeClr val="accent1"/>
+          </a:fillRef>
+          <a:effectRef idx="1">
+            <a:schemeClr val="accent1"/>
+          </a:effectRef>
+          <a:fontRef idx="minor">
+            <a:schemeClr val="tx1"/>
+          </a:fontRef>
+        </p:style>
+      </p:cxnSp>
+      <p:cxnSp>
+        <p:nvCxnSpPr>
+          <p:cNvPr id="14" name="Straight Arrow Connector 13">
+            <a:extLst>
+              <a:ext uri="{FF2B5EF4-FFF2-40B4-BE49-F238E27FC236}">
+                <a16:creationId xmlns:a16="http://schemas.microsoft.com/office/drawing/2014/main" id="{EA1A4872-458D-2507-FC71-2A2D9745B6F7}"/>
+              </a:ext>
+            </a:extLst>
+          </p:cNvPr>
+          <p:cNvCxnSpPr>
+            <a:cxnSpLocks/>
+            <a:stCxn id="11" idx="6"/>
+            <a:endCxn id="10" idx="1"/>
+          </p:cNvCxnSpPr>
+          <p:nvPr/>
+        </p:nvCxnSpPr>
+        <p:spPr>
+          <a:xfrm>
+            <a:off x="2434976" y="5419618"/>
+            <a:ext cx="1573608" cy="1005650"/>
+          </a:xfrm>
+          <a:prstGeom prst="straightConnector1">
+            <a:avLst/>
+          </a:prstGeom>
+          <a:ln>
+            <a:tailEnd type="triangle"/>
+          </a:ln>
+        </p:spPr>
+        <p:style>
+          <a:lnRef idx="2">
+            <a:schemeClr val="accent1"/>
+          </a:lnRef>
+          <a:fillRef idx="0">
+            <a:schemeClr val="accent1"/>
+          </a:fillRef>
+          <a:effectRef idx="1">
+            <a:schemeClr val="accent1"/>
+          </a:effectRef>
+          <a:fontRef idx="minor">
+            <a:schemeClr val="tx1"/>
+          </a:fontRef>
+        </p:style>
+      </p:cxnSp>
+    </p:spTree>
+    <p:extLst>
+      <p:ext uri="{BB962C8B-B14F-4D97-AF65-F5344CB8AC3E}">
+        <p14:creationId xmlns:p14="http://schemas.microsoft.com/office/powerpoint/2010/main" val="2951360396"/>
+      </p:ext>
+    </p:extLst>
+  </p:cSld>
+  <p:clrMapOvr>
+    <a:masterClrMapping/>
+  </p:clrMapOvr>
+</p:sld>
+</file>
+
+<file path=ppt/slides/slide21.xml><?xml version="1.0" encoding="utf-8"?>
+<p:sld xmlns:a="http://schemas.openxmlformats.org/drawingml/2006/main" xmlns:r="http://schemas.openxmlformats.org/officeDocument/2006/relationships" xmlns:p="http://schemas.openxmlformats.org/presentationml/2006/main">
+  <p:cSld>
+    <p:spTree>
+      <p:nvGrpSpPr>
+        <p:cNvPr id="1" name=""/>
+        <p:cNvGrpSpPr/>
+        <p:nvPr/>
+      </p:nvGrpSpPr>
+      <p:grpSpPr>
+        <a:xfrm>
+          <a:off x="0" y="0"/>
+          <a:ext cx="0" cy="0"/>
+          <a:chOff x="0" y="0"/>
+          <a:chExt cx="0" cy="0"/>
+        </a:xfrm>
+      </p:grpSpPr>
+      <p:sp>
+        <p:nvSpPr>
+          <p:cNvPr id="2" name="Title 1">
+            <a:extLst>
+              <a:ext uri="{FF2B5EF4-FFF2-40B4-BE49-F238E27FC236}">
+                <a16:creationId xmlns:a16="http://schemas.microsoft.com/office/drawing/2014/main" id="{19BBCCE5-5245-8FBD-AF76-88D1B2E00AB6}"/>
+              </a:ext>
+            </a:extLst>
+          </p:cNvPr>
+          <p:cNvSpPr>
+            <a:spLocks noGrp="1"/>
+          </p:cNvSpPr>
+          <p:nvPr>
+            <p:ph type="title"/>
+          </p:nvPr>
+        </p:nvSpPr>
+        <p:spPr/>
+        <p:txBody>
+          <a:bodyPr/>
+          <a:lstStyle/>
+          <a:p>
+            <a:pPr algn="ctr"/>
+            <a:r>
+              <a:rPr lang="en-US" dirty="0"/>
+              <a:t>Layout lists: Using 2 layout lists on a page</a:t>
+            </a:r>
+          </a:p>
+        </p:txBody>
+      </p:sp>
+      <p:sp>
+        <p:nvSpPr>
+          <p:cNvPr id="7" name="Content Placeholder 6">
+            <a:extLst>
+              <a:ext uri="{FF2B5EF4-FFF2-40B4-BE49-F238E27FC236}">
+                <a16:creationId xmlns:a16="http://schemas.microsoft.com/office/drawing/2014/main" id="{42A0049C-AD5E-973D-12AA-663DC835CF4C}"/>
+              </a:ext>
+            </a:extLst>
+          </p:cNvPr>
+          <p:cNvSpPr>
+            <a:spLocks noGrp="1"/>
+          </p:cNvSpPr>
+          <p:nvPr>
+            <p:ph idx="1"/>
+          </p:nvPr>
+        </p:nvSpPr>
+        <p:spPr/>
+        <p:txBody>
+          <a:bodyPr/>
+          <a:lstStyle/>
+          <a:p>
+            <a:r>
+              <a:rPr lang="en-US" sz="2000" dirty="0"/>
+              <a:t>Heading 1 [Colorful one]</a:t>
+            </a:r>
+          </a:p>
+          <a:p>
+            <a:pPr lvl="1"/>
+            <a:r>
+              <a:rPr lang="en-US" sz="1800" dirty="0"/>
+              <a:t>L2</a:t>
+            </a:r>
+          </a:p>
+          <a:p>
+            <a:pPr lvl="1"/>
+            <a:r>
+              <a:rPr lang="en-US" sz="1800" dirty="0"/>
+              <a:t>L2</a:t>
+            </a:r>
+          </a:p>
+          <a:p>
+            <a:pPr lvl="2"/>
+            <a:r>
+              <a:rPr lang="en-US" sz="1600" dirty="0"/>
+              <a:t>L3</a:t>
+            </a:r>
+          </a:p>
+          <a:p>
+            <a:pPr lvl="2"/>
+            <a:r>
+              <a:rPr lang="en-US" sz="1600" dirty="0"/>
+              <a:t>L3</a:t>
+            </a:r>
+          </a:p>
+          <a:p>
+            <a:pPr lvl="1"/>
+            <a:r>
+              <a:rPr lang="en-US" sz="1800" dirty="0"/>
+              <a:t>L2</a:t>
+            </a:r>
+          </a:p>
+          <a:p>
+            <a:r>
+              <a:rPr lang="en-US" sz="2000" dirty="0"/>
+              <a:t>Heading 1</a:t>
+            </a:r>
+          </a:p>
+          <a:p>
+            <a:pPr lvl="1"/>
+            <a:r>
+              <a:rPr lang="en-US" sz="1800" dirty="0"/>
+              <a:t>Etc.</a:t>
+            </a:r>
+          </a:p>
+        </p:txBody>
+      </p:sp>
+      <p:sp>
+        <p:nvSpPr>
+          <p:cNvPr id="8" name="Slide Number Placeholder 7">
+            <a:extLst>
+              <a:ext uri="{FF2B5EF4-FFF2-40B4-BE49-F238E27FC236}">
+                <a16:creationId xmlns:a16="http://schemas.microsoft.com/office/drawing/2014/main" id="{1FAB160F-8C75-F154-BC92-F72D6EE09F8E}"/>
+              </a:ext>
+            </a:extLst>
+          </p:cNvPr>
+          <p:cNvSpPr>
+            <a:spLocks noGrp="1"/>
+          </p:cNvSpPr>
+          <p:nvPr>
+            <p:ph type="sldNum" sz="quarter" idx="12"/>
+          </p:nvPr>
+        </p:nvSpPr>
+        <p:spPr/>
+        <p:txBody>
+          <a:bodyPr/>
+          <a:lstStyle/>
+          <a:p>
+            <a:fld id="{80473052-BA07-4FC5-9696-A0F7625044DE}" type="slidenum">
+              <a:rPr lang="en-US" smtClean="0"/>
+              <a:t>21</a:t>
             </a:fld>
             <a:endParaRPr lang="en-US"/>
           </a:p>
@@ -7588,7 +8109,7 @@
 </p:sld>
 </file>
 
-<file path=ppt/slides/slide21.xml><?xml version="1.0" encoding="utf-8"?>
+<file path=ppt/slides/slide22.xml><?xml version="1.0" encoding="utf-8"?>
 <p:sld xmlns:a="http://schemas.openxmlformats.org/drawingml/2006/main" xmlns:r="http://schemas.openxmlformats.org/officeDocument/2006/relationships" xmlns:p="http://schemas.openxmlformats.org/presentationml/2006/main">
   <p:cSld>
     <p:spTree>
@@ -8226,7 +8747,7 @@
           <a:p>
             <a:fld id="{80473052-BA07-4FC5-9696-A0F7625044DE}" type="slidenum">
               <a:rPr lang="en-US" smtClean="0"/>
-              <a:t>21</a:t>
+              <a:t>22</a:t>
             </a:fld>
             <a:endParaRPr lang="en-US"/>
           </a:p>
@@ -8245,7 +8766,7 @@
 </p:sld>
 </file>
 
-<file path=ppt/slides/slide22.xml><?xml version="1.0" encoding="utf-8"?>
+<file path=ppt/slides/slide23.xml><?xml version="1.0" encoding="utf-8"?>
 <p:sld xmlns:a="http://schemas.openxmlformats.org/drawingml/2006/main" xmlns:r="http://schemas.openxmlformats.org/officeDocument/2006/relationships" xmlns:p="http://schemas.openxmlformats.org/presentationml/2006/main">
   <p:cSld>
     <p:spTree>
@@ -8759,7 +9280,7 @@
           <a:p>
             <a:fld id="{80473052-BA07-4FC5-9696-A0F7625044DE}" type="slidenum">
               <a:rPr lang="en-US" smtClean="0"/>
-              <a:t>22</a:t>
+              <a:t>23</a:t>
             </a:fld>
             <a:endParaRPr lang="en-US"/>
           </a:p>
@@ -8769,93 +9290,6 @@
     <p:extLst>
       <p:ext uri="{BB962C8B-B14F-4D97-AF65-F5344CB8AC3E}">
         <p14:creationId xmlns:p14="http://schemas.microsoft.com/office/powerpoint/2010/main" val="2187506506"/>
-      </p:ext>
-    </p:extLst>
-  </p:cSld>
-  <p:clrMapOvr>
-    <a:masterClrMapping/>
-  </p:clrMapOvr>
-</p:sld>
-</file>
-
-<file path=ppt/slides/slide23.xml><?xml version="1.0" encoding="utf-8"?>
-<p:sld xmlns:a="http://schemas.openxmlformats.org/drawingml/2006/main" xmlns:r="http://schemas.openxmlformats.org/officeDocument/2006/relationships" xmlns:p="http://schemas.openxmlformats.org/presentationml/2006/main">
-  <p:cSld>
-    <p:spTree>
-      <p:nvGrpSpPr>
-        <p:cNvPr id="1" name=""/>
-        <p:cNvGrpSpPr/>
-        <p:nvPr/>
-      </p:nvGrpSpPr>
-      <p:grpSpPr>
-        <a:xfrm>
-          <a:off x="0" y="0"/>
-          <a:ext cx="0" cy="0"/>
-          <a:chOff x="0" y="0"/>
-          <a:chExt cx="0" cy="0"/>
-        </a:xfrm>
-      </p:grpSpPr>
-      <p:sp>
-        <p:nvSpPr>
-          <p:cNvPr id="4" name="Title 3">
-            <a:extLst>
-              <a:ext uri="{FF2B5EF4-FFF2-40B4-BE49-F238E27FC236}">
-                <a16:creationId xmlns:a16="http://schemas.microsoft.com/office/drawing/2014/main" id="{BB2BD00F-8EA4-14C5-BD5F-97F9AD513213}"/>
-              </a:ext>
-            </a:extLst>
-          </p:cNvPr>
-          <p:cNvSpPr>
-            <a:spLocks noGrp="1"/>
-          </p:cNvSpPr>
-          <p:nvPr>
-            <p:ph type="ctrTitle"/>
-          </p:nvPr>
-        </p:nvSpPr>
-        <p:spPr/>
-        <p:txBody>
-          <a:bodyPr/>
-          <a:lstStyle/>
-          <a:p>
-            <a:r>
-              <a:rPr lang="en-US" dirty="0"/>
-              <a:t>Appendix</a:t>
-            </a:r>
-          </a:p>
-        </p:txBody>
-      </p:sp>
-      <p:sp>
-        <p:nvSpPr>
-          <p:cNvPr id="3" name="Slide Number Placeholder 2">
-            <a:extLst>
-              <a:ext uri="{FF2B5EF4-FFF2-40B4-BE49-F238E27FC236}">
-                <a16:creationId xmlns:a16="http://schemas.microsoft.com/office/drawing/2014/main" id="{CEF38F97-C294-632E-FD05-A5A19DE454DC}"/>
-              </a:ext>
-            </a:extLst>
-          </p:cNvPr>
-          <p:cNvSpPr>
-            <a:spLocks noGrp="1"/>
-          </p:cNvSpPr>
-          <p:nvPr>
-            <p:ph type="sldNum" sz="quarter" idx="12"/>
-          </p:nvPr>
-        </p:nvSpPr>
-        <p:spPr/>
-        <p:txBody>
-          <a:bodyPr/>
-          <a:lstStyle/>
-          <a:p>
-            <a:fld id="{80473052-BA07-4FC5-9696-A0F7625044DE}" type="slidenum">
-              <a:rPr lang="en-US" smtClean="0"/>
-              <a:t>23</a:t>
-            </a:fld>
-            <a:endParaRPr lang="en-US"/>
-          </a:p>
-        </p:txBody>
-      </p:sp>
-    </p:spTree>
-    <p:extLst>
-      <p:ext uri="{BB962C8B-B14F-4D97-AF65-F5344CB8AC3E}">
-        <p14:creationId xmlns:p14="http://schemas.microsoft.com/office/powerpoint/2010/main" val="1168578030"/>
       </p:ext>
     </p:extLst>
   </p:cSld>
@@ -8905,6 +9339,305 @@
           <a:p>
             <a:r>
               <a:rPr lang="en-US" dirty="0"/>
+              <a:t>Testing: works</a:t>
+            </a:r>
+          </a:p>
+        </p:txBody>
+      </p:sp>
+      <p:sp>
+        <p:nvSpPr>
+          <p:cNvPr id="8" name="Content Placeholder 7">
+            <a:extLst>
+              <a:ext uri="{FF2B5EF4-FFF2-40B4-BE49-F238E27FC236}">
+                <a16:creationId xmlns:a16="http://schemas.microsoft.com/office/drawing/2014/main" id="{ED3DD3A7-845E-D9B0-28AE-E851ECB350F0}"/>
+              </a:ext>
+            </a:extLst>
+          </p:cNvPr>
+          <p:cNvSpPr>
+            <a:spLocks noGrp="1"/>
+          </p:cNvSpPr>
+          <p:nvPr>
+            <p:ph idx="1"/>
+          </p:nvPr>
+        </p:nvSpPr>
+        <p:spPr/>
+        <p:txBody>
+          <a:bodyPr/>
+          <a:lstStyle/>
+          <a:p>
+            <a:r>
+              <a:rPr lang="en-US" dirty="0"/>
+              <a:t>Level 1</a:t>
+            </a:r>
+          </a:p>
+          <a:p>
+            <a:pPr lvl="1"/>
+            <a:r>
+              <a:rPr lang="en-US" dirty="0"/>
+              <a:t>Level 2</a:t>
+            </a:r>
+          </a:p>
+          <a:p>
+            <a:pPr lvl="2"/>
+            <a:r>
+              <a:rPr lang="en-US" dirty="0"/>
+              <a:t>Level 3</a:t>
+            </a:r>
+          </a:p>
+          <a:p>
+            <a:pPr lvl="1"/>
+            <a:r>
+              <a:rPr lang="en-US" dirty="0"/>
+              <a:t>Level 2, item 2</a:t>
+            </a:r>
+          </a:p>
+          <a:p>
+            <a:pPr lvl="2"/>
+            <a:r>
+              <a:rPr lang="en-US" dirty="0"/>
+              <a:t>Level2 item 1</a:t>
+            </a:r>
+          </a:p>
+          <a:p>
+            <a:pPr lvl="2"/>
+            <a:r>
+              <a:rPr lang="en-US" dirty="0"/>
+              <a:t>Level 2 item 2</a:t>
+            </a:r>
+          </a:p>
+          <a:p>
+            <a:pPr lvl="1"/>
+            <a:r>
+              <a:rPr lang="en-US" dirty="0"/>
+              <a:t>Level 2, item 3</a:t>
+            </a:r>
+          </a:p>
+          <a:p>
+            <a:pPr lvl="2"/>
+            <a:r>
+              <a:rPr lang="en-US" dirty="0"/>
+              <a:t>One</a:t>
+            </a:r>
+          </a:p>
+          <a:p>
+            <a:pPr lvl="2"/>
+            <a:r>
+              <a:rPr lang="en-US" dirty="0"/>
+              <a:t>two</a:t>
+            </a:r>
+          </a:p>
+          <a:p>
+            <a:r>
+              <a:rPr lang="en-US" dirty="0"/>
+              <a:t>Level 1 item 2</a:t>
+            </a:r>
+          </a:p>
+          <a:p>
+            <a:pPr lvl="1"/>
+            <a:r>
+              <a:rPr lang="en-US" dirty="0"/>
+              <a:t>Another</a:t>
+            </a:r>
+          </a:p>
+          <a:p>
+            <a:pPr lvl="1"/>
+            <a:r>
+              <a:rPr lang="en-US" dirty="0"/>
+              <a:t>Another</a:t>
+            </a:r>
+          </a:p>
+          <a:p>
+            <a:pPr lvl="2"/>
+            <a:r>
+              <a:rPr lang="en-US" dirty="0"/>
+              <a:t>One</a:t>
+            </a:r>
+          </a:p>
+          <a:p>
+            <a:pPr lvl="2"/>
+            <a:r>
+              <a:rPr lang="en-US" dirty="0"/>
+              <a:t>Two</a:t>
+            </a:r>
+          </a:p>
+          <a:p>
+            <a:pPr lvl="1"/>
+            <a:r>
+              <a:rPr lang="en-US" dirty="0"/>
+              <a:t>another</a:t>
+            </a:r>
+          </a:p>
+        </p:txBody>
+      </p:sp>
+      <p:sp>
+        <p:nvSpPr>
+          <p:cNvPr id="2" name="Slide Number Placeholder 1">
+            <a:extLst>
+              <a:ext uri="{FF2B5EF4-FFF2-40B4-BE49-F238E27FC236}">
+                <a16:creationId xmlns:a16="http://schemas.microsoft.com/office/drawing/2014/main" id="{FAF85DC8-5A57-FE03-5A3A-8CC218E0C641}"/>
+              </a:ext>
+            </a:extLst>
+          </p:cNvPr>
+          <p:cNvSpPr>
+            <a:spLocks noGrp="1"/>
+          </p:cNvSpPr>
+          <p:nvPr>
+            <p:ph type="sldNum" sz="quarter" idx="12"/>
+          </p:nvPr>
+        </p:nvSpPr>
+        <p:spPr/>
+        <p:txBody>
+          <a:bodyPr/>
+          <a:lstStyle/>
+          <a:p>
+            <a:fld id="{80473052-BA07-4FC5-9696-A0F7625044DE}" type="slidenum">
+              <a:rPr lang="en-US" smtClean="0"/>
+              <a:t>24</a:t>
+            </a:fld>
+            <a:endParaRPr lang="en-US"/>
+          </a:p>
+        </p:txBody>
+      </p:sp>
+    </p:spTree>
+    <p:extLst>
+      <p:ext uri="{BB962C8B-B14F-4D97-AF65-F5344CB8AC3E}">
+        <p14:creationId xmlns:p14="http://schemas.microsoft.com/office/powerpoint/2010/main" val="2391855767"/>
+      </p:ext>
+    </p:extLst>
+  </p:cSld>
+  <p:clrMapOvr>
+    <a:masterClrMapping/>
+  </p:clrMapOvr>
+</p:sld>
+</file>
+
+<file path=ppt/slides/slide25.xml><?xml version="1.0" encoding="utf-8"?>
+<p:sld xmlns:a="http://schemas.openxmlformats.org/drawingml/2006/main" xmlns:r="http://schemas.openxmlformats.org/officeDocument/2006/relationships" xmlns:p="http://schemas.openxmlformats.org/presentationml/2006/main">
+  <p:cSld>
+    <p:spTree>
+      <p:nvGrpSpPr>
+        <p:cNvPr id="1" name=""/>
+        <p:cNvGrpSpPr/>
+        <p:nvPr/>
+      </p:nvGrpSpPr>
+      <p:grpSpPr>
+        <a:xfrm>
+          <a:off x="0" y="0"/>
+          <a:ext cx="0" cy="0"/>
+          <a:chOff x="0" y="0"/>
+          <a:chExt cx="0" cy="0"/>
+        </a:xfrm>
+      </p:grpSpPr>
+      <p:sp>
+        <p:nvSpPr>
+          <p:cNvPr id="4" name="Title 3">
+            <a:extLst>
+              <a:ext uri="{FF2B5EF4-FFF2-40B4-BE49-F238E27FC236}">
+                <a16:creationId xmlns:a16="http://schemas.microsoft.com/office/drawing/2014/main" id="{BB2BD00F-8EA4-14C5-BD5F-97F9AD513213}"/>
+              </a:ext>
+            </a:extLst>
+          </p:cNvPr>
+          <p:cNvSpPr>
+            <a:spLocks noGrp="1"/>
+          </p:cNvSpPr>
+          <p:nvPr>
+            <p:ph type="ctrTitle"/>
+          </p:nvPr>
+        </p:nvSpPr>
+        <p:spPr/>
+        <p:txBody>
+          <a:bodyPr/>
+          <a:lstStyle/>
+          <a:p>
+            <a:r>
+              <a:rPr lang="en-US" dirty="0"/>
+              <a:t>Appendix</a:t>
+            </a:r>
+          </a:p>
+        </p:txBody>
+      </p:sp>
+      <p:sp>
+        <p:nvSpPr>
+          <p:cNvPr id="3" name="Slide Number Placeholder 2">
+            <a:extLst>
+              <a:ext uri="{FF2B5EF4-FFF2-40B4-BE49-F238E27FC236}">
+                <a16:creationId xmlns:a16="http://schemas.microsoft.com/office/drawing/2014/main" id="{CEF38F97-C294-632E-FD05-A5A19DE454DC}"/>
+              </a:ext>
+            </a:extLst>
+          </p:cNvPr>
+          <p:cNvSpPr>
+            <a:spLocks noGrp="1"/>
+          </p:cNvSpPr>
+          <p:nvPr>
+            <p:ph type="sldNum" sz="quarter" idx="12"/>
+          </p:nvPr>
+        </p:nvSpPr>
+        <p:spPr/>
+        <p:txBody>
+          <a:bodyPr/>
+          <a:lstStyle/>
+          <a:p>
+            <a:fld id="{80473052-BA07-4FC5-9696-A0F7625044DE}" type="slidenum">
+              <a:rPr lang="en-US" smtClean="0"/>
+              <a:t>25</a:t>
+            </a:fld>
+            <a:endParaRPr lang="en-US"/>
+          </a:p>
+        </p:txBody>
+      </p:sp>
+    </p:spTree>
+    <p:extLst>
+      <p:ext uri="{BB962C8B-B14F-4D97-AF65-F5344CB8AC3E}">
+        <p14:creationId xmlns:p14="http://schemas.microsoft.com/office/powerpoint/2010/main" val="1168578030"/>
+      </p:ext>
+    </p:extLst>
+  </p:cSld>
+  <p:clrMapOvr>
+    <a:masterClrMapping/>
+  </p:clrMapOvr>
+</p:sld>
+</file>
+
+<file path=ppt/slides/slide26.xml><?xml version="1.0" encoding="utf-8"?>
+<p:sld xmlns:a="http://schemas.openxmlformats.org/drawingml/2006/main" xmlns:r="http://schemas.openxmlformats.org/officeDocument/2006/relationships" xmlns:p="http://schemas.openxmlformats.org/presentationml/2006/main">
+  <p:cSld>
+    <p:spTree>
+      <p:nvGrpSpPr>
+        <p:cNvPr id="1" name=""/>
+        <p:cNvGrpSpPr/>
+        <p:nvPr/>
+      </p:nvGrpSpPr>
+      <p:grpSpPr>
+        <a:xfrm>
+          <a:off x="0" y="0"/>
+          <a:ext cx="0" cy="0"/>
+          <a:chOff x="0" y="0"/>
+          <a:chExt cx="0" cy="0"/>
+        </a:xfrm>
+      </p:grpSpPr>
+      <p:sp>
+        <p:nvSpPr>
+          <p:cNvPr id="4" name="Title 3">
+            <a:extLst>
+              <a:ext uri="{FF2B5EF4-FFF2-40B4-BE49-F238E27FC236}">
+                <a16:creationId xmlns:a16="http://schemas.microsoft.com/office/drawing/2014/main" id="{0D0E3244-86CC-ED51-EFBC-B4D48F99AEED}"/>
+              </a:ext>
+            </a:extLst>
+          </p:cNvPr>
+          <p:cNvSpPr>
+            <a:spLocks noGrp="1"/>
+          </p:cNvSpPr>
+          <p:nvPr>
+            <p:ph type="title"/>
+          </p:nvPr>
+        </p:nvSpPr>
+        <p:spPr/>
+        <p:txBody>
+          <a:bodyPr/>
+          <a:lstStyle/>
+          <a:p>
+            <a:r>
+              <a:rPr lang="en-US" dirty="0"/>
               <a:t>Quick Summary</a:t>
             </a:r>
           </a:p>
@@ -8963,7 +9696,7 @@
           <a:p>
             <a:fld id="{80473052-BA07-4FC5-9696-A0F7625044DE}" type="slidenum">
               <a:rPr lang="en-US" smtClean="0"/>
-              <a:t>24</a:t>
+              <a:t>26</a:t>
             </a:fld>
             <a:endParaRPr lang="en-US"/>
           </a:p>
@@ -11045,7 +11778,7 @@
             </a:r>
             <a:r>
               <a:rPr lang="en-US" sz="1800" dirty="0"/>
-              <a:t> menu to control space between border and numbers or bullets (highlight whole list)</a:t>
+              <a:t> menu to control space between border and numbers or bullets (highlight whole list – Does not work for more than 1 level)</a:t>
             </a:r>
           </a:p>
           <a:p>

</xml_diff>

<commit_message>
Explanation of paragraph indents
</commit_message>
<xml_diff>
--- a/architecture/styling-lists-in-powerpoint.pptx
+++ b/architecture/styling-lists-in-powerpoint.pptx
@@ -6,7 +6,7 @@
     <p:sldMasterId id="2147483653" r:id="rId2"/>
   </p:sldMasterIdLst>
   <p:notesMasterIdLst>
-    <p:notesMasterId r:id="rId29"/>
+    <p:notesMasterId r:id="rId30"/>
   </p:notesMasterIdLst>
   <p:sldIdLst>
     <p:sldId id="256" r:id="rId3"/>
@@ -19,22 +19,23 @@
     <p:sldId id="263" r:id="rId10"/>
     <p:sldId id="265" r:id="rId11"/>
     <p:sldId id="278" r:id="rId12"/>
-    <p:sldId id="280" r:id="rId13"/>
-    <p:sldId id="279" r:id="rId14"/>
-    <p:sldId id="262" r:id="rId15"/>
-    <p:sldId id="273" r:id="rId16"/>
-    <p:sldId id="264" r:id="rId17"/>
-    <p:sldId id="274" r:id="rId18"/>
-    <p:sldId id="271" r:id="rId19"/>
-    <p:sldId id="267" r:id="rId20"/>
-    <p:sldId id="268" r:id="rId21"/>
-    <p:sldId id="258" r:id="rId22"/>
-    <p:sldId id="257" r:id="rId23"/>
-    <p:sldId id="259" r:id="rId24"/>
-    <p:sldId id="261" r:id="rId25"/>
-    <p:sldId id="281" r:id="rId26"/>
-    <p:sldId id="277" r:id="rId27"/>
-    <p:sldId id="270" r:id="rId28"/>
+    <p:sldId id="282" r:id="rId13"/>
+    <p:sldId id="280" r:id="rId14"/>
+    <p:sldId id="279" r:id="rId15"/>
+    <p:sldId id="262" r:id="rId16"/>
+    <p:sldId id="273" r:id="rId17"/>
+    <p:sldId id="264" r:id="rId18"/>
+    <p:sldId id="274" r:id="rId19"/>
+    <p:sldId id="271" r:id="rId20"/>
+    <p:sldId id="267" r:id="rId21"/>
+    <p:sldId id="268" r:id="rId22"/>
+    <p:sldId id="258" r:id="rId23"/>
+    <p:sldId id="257" r:id="rId24"/>
+    <p:sldId id="259" r:id="rId25"/>
+    <p:sldId id="261" r:id="rId26"/>
+    <p:sldId id="281" r:id="rId27"/>
+    <p:sldId id="277" r:id="rId28"/>
+    <p:sldId id="270" r:id="rId29"/>
   </p:sldIdLst>
   <p:sldSz cx="12192000" cy="6858000"/>
   <p:notesSz cx="6858000" cy="9144000"/>
@@ -1642,11 +1643,12 @@
                 </a:solidFill>
               </a:defRPr>
             </a:lvl1pPr>
-            <a:lvl2pPr marL="395288" indent="-168275">
+            <a:lvl2pPr marL="282575" indent="-168275">
               <a:buFont typeface="+mj-lt"/>
               <a:buAutoNum type="arabicPeriod"/>
               <a:tabLst>
-                <a:tab pos="91440" algn="l"/>
+                <a:tab pos="90488" algn="l"/>
+                <a:tab pos="339725" algn="l"/>
               </a:tabLst>
               <a:defRPr sz="1600">
                 <a:solidFill>
@@ -3840,19 +3842,7 @@
           <a:p>
             <a:r>
               <a:rPr lang="en-US" dirty="0"/>
-              <a:t>Paragraph Controls: The left side </a:t>
-            </a:r>
-            <a:r>
-              <a:rPr lang="en-US"/>
-              <a:t>Indent: </a:t>
-            </a:r>
-            <a:r>
-              <a:rPr lang="en-US">
-                <a:solidFill>
-                  <a:srgbClr val="FF0000"/>
-                </a:solidFill>
-              </a:rPr>
-              <a:t>Enter </a:t>
+              <a:t>Paragraph Controls: The left side Indent </a:t>
             </a:r>
             <a:r>
               <a:rPr lang="en-US" dirty="0">
@@ -3860,7 +3850,7 @@
                   <a:srgbClr val="FF0000"/>
                 </a:solidFill>
               </a:rPr>
-              <a:t>and Tab nudge</a:t>
+              <a:t>Full explanation</a:t>
             </a:r>
           </a:p>
         </p:txBody>
@@ -3883,7 +3873,7 @@
         </p:nvSpPr>
         <p:spPr>
           <a:xfrm>
-            <a:off x="838200" y="824035"/>
+            <a:off x="822959" y="1026634"/>
             <a:ext cx="10515599" cy="5329715"/>
           </a:xfrm>
         </p:spPr>
@@ -3893,120 +3883,97 @@
           <a:p>
             <a:pPr marL="274320" indent="0"/>
             <a:r>
-              <a:rPr lang="en-US" dirty="0"/>
-              <a:t>Problem</a:t>
+              <a:rPr lang="en-US" sz="1800" dirty="0"/>
+              <a:t>The ruler and the left indent does the same thing</a:t>
+            </a:r>
+          </a:p>
+          <a:p>
+            <a:pPr marL="274320" indent="0"/>
+            <a:r>
+              <a:rPr lang="en-US" sz="1800" dirty="0"/>
+              <a:t>There are 2 positions</a:t>
             </a:r>
           </a:p>
           <a:p>
             <a:pPr marL="674370" lvl="1" indent="0"/>
             <a:r>
-              <a:rPr lang="en-US" dirty="0"/>
-              <a:t>Changing the left indent on the whole list will move child levels also to the same indent as the parent</a:t>
+              <a:rPr lang="en-US" sz="1800" dirty="0"/>
+              <a:t>Of the number or bullet</a:t>
             </a:r>
           </a:p>
           <a:p>
             <a:pPr marL="674370" lvl="1" indent="0"/>
             <a:r>
-              <a:rPr lang="en-US" dirty="0"/>
-              <a:t>You don’t want that</a:t>
+              <a:rPr lang="en-US" sz="1800" dirty="0"/>
+              <a:t>Text</a:t>
             </a:r>
           </a:p>
           <a:p>
             <a:pPr marL="274320" indent="0"/>
             <a:r>
-              <a:rPr lang="en-US" dirty="0"/>
-              <a:t>How to</a:t>
+              <a:rPr lang="en-US" sz="1800" dirty="0"/>
+              <a:t>What is first line and what is hanging on a list line</a:t>
             </a:r>
           </a:p>
           <a:p>
             <a:pPr marL="674370" lvl="1" indent="0"/>
             <a:r>
-              <a:rPr lang="en-US" dirty="0"/>
-              <a:t>Start with 1 level in the layout list</a:t>
+              <a:rPr lang="en-US" sz="1800" dirty="0"/>
+              <a:t>Number is the first line</a:t>
             </a:r>
           </a:p>
           <a:p>
             <a:pPr marL="674370" lvl="1" indent="0"/>
             <a:r>
-              <a:rPr lang="en-US" dirty="0"/>
-              <a:t>Adjust spaces for line 1</a:t>
-            </a:r>
-          </a:p>
-          <a:p>
-            <a:pPr marL="1131570" lvl="2" indent="0"/>
-            <a:r>
-              <a:rPr lang="en-US" dirty="0"/>
-              <a:t>Fix its “shape” left padding</a:t>
-            </a:r>
-          </a:p>
-          <a:p>
-            <a:pPr marL="1131570" lvl="2" indent="0"/>
-            <a:r>
-              <a:rPr lang="en-US" dirty="0"/>
-              <a:t>Fix its left paragraph indent</a:t>
-            </a:r>
-          </a:p>
-          <a:p>
-            <a:pPr marL="1131570" lvl="2" indent="0"/>
-            <a:r>
-              <a:rPr lang="en-US" dirty="0"/>
-              <a:t>Adjust the ruler as needed</a:t>
-            </a:r>
-          </a:p>
-          <a:p>
-            <a:pPr marL="1131570" lvl="2" indent="0"/>
-            <a:r>
-              <a:rPr lang="en-US" dirty="0"/>
-              <a:t>Then enter and tab from the first line to create the second level and so on</a:t>
+              <a:rPr lang="en-US" sz="1800" dirty="0"/>
+              <a:t>Text is the hanging (rest of the lines)</a:t>
+            </a:r>
+          </a:p>
+          <a:p>
+            <a:pPr marL="274320" indent="0"/>
+            <a:r>
+              <a:rPr lang="en-US" sz="1800" dirty="0"/>
+              <a:t>Indenting: Before text + Hanging</a:t>
             </a:r>
           </a:p>
           <a:p>
             <a:pPr marL="674370" lvl="1" indent="0"/>
             <a:r>
-              <a:rPr lang="en-US" dirty="0"/>
-              <a:t>Second level space adjustments</a:t>
-            </a:r>
-          </a:p>
-          <a:p>
-            <a:pPr marL="1131570" lvl="2" indent="0"/>
-            <a:r>
-              <a:rPr lang="en-US" dirty="0"/>
-              <a:t>Shape left, and paragraph left are preserved</a:t>
-            </a:r>
-          </a:p>
-          <a:p>
-            <a:pPr marL="1131570" lvl="2" indent="0"/>
-            <a:r>
-              <a:rPr lang="en-US" dirty="0"/>
-              <a:t>Adjust the ruler for level 2</a:t>
-            </a:r>
-          </a:p>
-          <a:p>
-            <a:pPr marL="1131570" lvl="2" indent="0"/>
-            <a:r>
-              <a:rPr lang="en-US" dirty="0"/>
-              <a:t>Enter and tab for level 3</a:t>
+              <a:rPr lang="en-US" sz="1800" dirty="0"/>
+              <a:t>Move the number by “before text”</a:t>
             </a:r>
           </a:p>
           <a:p>
             <a:pPr marL="674370" lvl="1" indent="0"/>
             <a:r>
-              <a:rPr lang="en-US" dirty="0"/>
-              <a:t>Repeat this for all levels</a:t>
-            </a:r>
-          </a:p>
-          <a:p>
-            <a:pPr marL="1131570" lvl="2" indent="0"/>
-            <a:r>
-              <a:rPr lang="en-US" dirty="0"/>
-              <a:t>Mainly the Ruler, rest are honored</a:t>
-            </a:r>
+              <a:rPr lang="en-US" sz="1800" dirty="0"/>
+              <a:t>Move the text by “hanging” further to the right </a:t>
+            </a:r>
+            <a:r>
+              <a:rPr lang="en-US" sz="1800"/>
+              <a:t>(relative)</a:t>
+            </a:r>
+            <a:endParaRPr lang="en-US" sz="1800" dirty="0"/>
           </a:p>
           <a:p>
             <a:pPr marL="274320" indent="0"/>
             <a:r>
-              <a:rPr lang="en-US" dirty="0"/>
-              <a:t>So, use the tab work around</a:t>
+              <a:rPr lang="en-US" sz="1800" dirty="0"/>
+              <a:t>Only one selection is active</a:t>
+            </a:r>
+          </a:p>
+          <a:p>
+            <a:pPr marL="674370" lvl="1" indent="0"/>
+            <a:r>
+              <a:rPr lang="en-US" sz="1800" dirty="0"/>
+              <a:t>None, First line, Hanging</a:t>
+            </a:r>
+          </a:p>
+          <a:p>
+            <a:pPr marL="674370" lvl="1" indent="0"/>
+            <a:r>
+              <a:rPr lang="en-US" sz="1800" dirty="0"/>
+              <a:t>Only ONE of them can be active</a:t>
             </a:r>
           </a:p>
         </p:txBody>
@@ -4043,7 +4010,7 @@
     </p:spTree>
     <p:extLst>
       <p:ext uri="{BB962C8B-B14F-4D97-AF65-F5344CB8AC3E}">
-        <p14:creationId xmlns:p14="http://schemas.microsoft.com/office/powerpoint/2010/main" val="2378095540"/>
+        <p14:creationId xmlns:p14="http://schemas.microsoft.com/office/powerpoint/2010/main" val="4229502223"/>
       </p:ext>
     </p:extLst>
   </p:cSld>
@@ -4093,7 +4060,15 @@
           <a:p>
             <a:r>
               <a:rPr lang="en-US" dirty="0"/>
-              <a:t>Paragraph Controls: The spacing options</a:t>
+              <a:t>Paragraph Controls: The left side Indent: </a:t>
+            </a:r>
+            <a:r>
+              <a:rPr lang="en-US" dirty="0">
+                <a:solidFill>
+                  <a:srgbClr val="FF0000"/>
+                </a:solidFill>
+              </a:rPr>
+              <a:t>Enter and Tab nudge</a:t>
             </a:r>
           </a:p>
         </p:txBody>
@@ -4116,7 +4091,7 @@
         </p:nvSpPr>
         <p:spPr>
           <a:xfrm>
-            <a:off x="822959" y="1026634"/>
+            <a:off x="838200" y="824035"/>
             <a:ext cx="10515599" cy="5329715"/>
           </a:xfrm>
         </p:spPr>
@@ -4126,93 +4101,120 @@
           <a:p>
             <a:pPr marL="274320" indent="0"/>
             <a:r>
-              <a:rPr lang="en-US" sz="1800" dirty="0"/>
-              <a:t>They apply to each line (that is a paragraph) in the bulleted list</a:t>
+              <a:rPr lang="en-US" dirty="0"/>
+              <a:t>Problem</a:t>
+            </a:r>
+          </a:p>
+          <a:p>
+            <a:pPr marL="674370" lvl="1" indent="0"/>
+            <a:r>
+              <a:rPr lang="en-US" dirty="0"/>
+              <a:t>Changing the left indent on the whole list will move child levels also to the same indent as the parent</a:t>
+            </a:r>
+          </a:p>
+          <a:p>
+            <a:pPr marL="674370" lvl="1" indent="0"/>
+            <a:r>
+              <a:rPr lang="en-US" dirty="0"/>
+              <a:t>You don’t want that</a:t>
             </a:r>
           </a:p>
           <a:p>
             <a:pPr marL="274320" indent="0"/>
             <a:r>
-              <a:rPr lang="en-US" sz="1800" dirty="0"/>
-              <a:t>Not between the bullets!!</a:t>
+              <a:rPr lang="en-US" dirty="0"/>
+              <a:t>How to</a:t>
+            </a:r>
+          </a:p>
+          <a:p>
+            <a:pPr marL="674370" lvl="1" indent="0"/>
+            <a:r>
+              <a:rPr lang="en-US" dirty="0"/>
+              <a:t>Start with 1 level in the layout list</a:t>
+            </a:r>
+          </a:p>
+          <a:p>
+            <a:pPr marL="674370" lvl="1" indent="0"/>
+            <a:r>
+              <a:rPr lang="en-US" dirty="0"/>
+              <a:t>Adjust spaces for line 1</a:t>
+            </a:r>
+          </a:p>
+          <a:p>
+            <a:pPr marL="1131570" lvl="2" indent="0"/>
+            <a:r>
+              <a:rPr lang="en-US" dirty="0"/>
+              <a:t>Fix its “shape” left padding</a:t>
+            </a:r>
+          </a:p>
+          <a:p>
+            <a:pPr marL="1131570" lvl="2" indent="0"/>
+            <a:r>
+              <a:rPr lang="en-US" dirty="0"/>
+              <a:t>Fix its left paragraph indent</a:t>
+            </a:r>
+          </a:p>
+          <a:p>
+            <a:pPr marL="1131570" lvl="2" indent="0"/>
+            <a:r>
+              <a:rPr lang="en-US" dirty="0"/>
+              <a:t>Adjust the ruler as needed</a:t>
+            </a:r>
+          </a:p>
+          <a:p>
+            <a:pPr marL="1131570" lvl="2" indent="0"/>
+            <a:r>
+              <a:rPr lang="en-US" dirty="0"/>
+              <a:t>Then enter and tab from the first line to create the second level and so on</a:t>
+            </a:r>
+          </a:p>
+          <a:p>
+            <a:pPr marL="674370" lvl="1" indent="0"/>
+            <a:r>
+              <a:rPr lang="en-US" dirty="0"/>
+              <a:t>Second level space adjustments</a:t>
+            </a:r>
+          </a:p>
+          <a:p>
+            <a:pPr marL="1131570" lvl="2" indent="0"/>
+            <a:r>
+              <a:rPr lang="en-US" dirty="0"/>
+              <a:t>Shape left, and paragraph left are preserved</a:t>
+            </a:r>
+          </a:p>
+          <a:p>
+            <a:pPr marL="1131570" lvl="2" indent="0"/>
+            <a:r>
+              <a:rPr lang="en-US" dirty="0"/>
+              <a:t>Adjust the ruler for level 2</a:t>
+            </a:r>
+          </a:p>
+          <a:p>
+            <a:pPr marL="1131570" lvl="2" indent="0"/>
+            <a:r>
+              <a:rPr lang="en-US" dirty="0"/>
+              <a:t>Enter and tab for level 3</a:t>
+            </a:r>
+          </a:p>
+          <a:p>
+            <a:pPr marL="674370" lvl="1" indent="0"/>
+            <a:r>
+              <a:rPr lang="en-US" dirty="0"/>
+              <a:t>Repeat this for all levels</a:t>
+            </a:r>
+          </a:p>
+          <a:p>
+            <a:pPr marL="1131570" lvl="2" indent="0"/>
+            <a:r>
+              <a:rPr lang="en-US" dirty="0"/>
+              <a:t>Mainly the Ruler, rest are honored</a:t>
             </a:r>
           </a:p>
           <a:p>
             <a:pPr marL="274320" indent="0"/>
             <a:r>
-              <a:rPr lang="en-US" sz="1800" dirty="0"/>
-              <a:t>Very tricky!!</a:t>
-            </a:r>
-          </a:p>
-          <a:p>
-            <a:pPr marL="274320" indent="0"/>
-            <a:r>
-              <a:rPr lang="en-US" sz="1800" dirty="0"/>
-              <a:t>Before and after refers to each line inside ONE bullet</a:t>
-            </a:r>
-          </a:p>
-          <a:p>
-            <a:pPr marL="274320" indent="0"/>
-            <a:r>
-              <a:rPr lang="en-US" sz="1800" dirty="0"/>
-              <a:t>Line spacing (single, double, </a:t>
-            </a:r>
-            <a:r>
-              <a:rPr lang="en-US" sz="1800" dirty="0" err="1"/>
-              <a:t>etc</a:t>
-            </a:r>
-            <a:r>
-              <a:rPr lang="en-US" sz="1800" dirty="0"/>
-              <a:t>) is for lines inside a paragraph</a:t>
-            </a:r>
-          </a:p>
-          <a:p>
-            <a:pPr marL="274320" indent="0"/>
-            <a:r>
-              <a:rPr lang="en-US" sz="1800" dirty="0"/>
-              <a:t>Before and after is outside the paragraph</a:t>
-            </a:r>
-          </a:p>
-          <a:p>
-            <a:pPr marL="274320" indent="0"/>
-            <a:r>
-              <a:rPr lang="en-US" sz="1800" dirty="0"/>
-              <a:t>So, if both are in play and if the line is a single line they add up</a:t>
-            </a:r>
-          </a:p>
-          <a:p>
-            <a:pPr marL="274320" indent="0"/>
-            <a:r>
-              <a:rPr lang="en-US" sz="1800" dirty="0"/>
-              <a:t>For single line bullets, the “double spacing” inadvertently acts like as if it is applied to multiple bullets.</a:t>
-            </a:r>
-          </a:p>
-          <a:p>
-            <a:pPr marL="274320" indent="0"/>
-            <a:r>
-              <a:rPr lang="en-US" sz="1800" dirty="0"/>
-              <a:t>Advice</a:t>
-            </a:r>
-          </a:p>
-          <a:p>
-            <a:pPr marL="674370" lvl="1" indent="0"/>
-            <a:r>
-              <a:rPr lang="en-US" sz="1800" dirty="0"/>
-              <a:t>For spacing between the boundary and the list use the “shape” controls not paragraph</a:t>
-            </a:r>
-          </a:p>
-          <a:p>
-            <a:pPr marL="674370" lvl="1" indent="0"/>
-            <a:r>
-              <a:rPr lang="en-US" sz="1800" dirty="0"/>
-              <a:t>Use before and after for better control when the list has bullets that are multi line</a:t>
-            </a:r>
-          </a:p>
-          <a:p>
-            <a:pPr marL="674370" lvl="1" indent="0"/>
-            <a:r>
-              <a:rPr lang="en-US" sz="1800" dirty="0"/>
-              <a:t>For single line ones you can get away with line spacing</a:t>
+              <a:rPr lang="en-US" dirty="0"/>
+              <a:t>So, use the tab work around</a:t>
             </a:r>
           </a:p>
         </p:txBody>
@@ -4249,7 +4251,7 @@
     </p:spTree>
     <p:extLst>
       <p:ext uri="{BB962C8B-B14F-4D97-AF65-F5344CB8AC3E}">
-        <p14:creationId xmlns:p14="http://schemas.microsoft.com/office/powerpoint/2010/main" val="4103118673"/>
+        <p14:creationId xmlns:p14="http://schemas.microsoft.com/office/powerpoint/2010/main" val="2378095540"/>
       </p:ext>
     </p:extLst>
   </p:cSld>
@@ -4299,43 +4301,8 @@
           <a:p>
             <a:r>
               <a:rPr lang="en-US" dirty="0"/>
-              <a:t>Place Holders and Layouts: </a:t>
-            </a:r>
-            <a:r>
-              <a:rPr kumimoji="0" lang="en-US" sz="1800" b="0" i="0" u="none" strike="noStrike" kern="1200" cap="none" spc="0" normalizeH="0" baseline="0" noProof="0" dirty="0">
-                <a:ln>
-                  <a:noFill/>
-                </a:ln>
-                <a:solidFill>
-                  <a:prstClr val="black"/>
-                </a:solidFill>
-                <a:effectLst/>
-                <a:uLnTx/>
-                <a:uFillTx/>
-                <a:latin typeface="Aptos Display" panose="02110004020202020204"/>
-                <a:ea typeface="+mj-ea"/>
-                <a:cs typeface="+mj-cs"/>
-              </a:rPr>
-              <a:t>: </a:t>
-            </a:r>
-            <a:r>
-              <a:rPr kumimoji="0" lang="en-US" sz="1200" b="0" i="1" u="none" strike="noStrike" kern="1200" cap="none" spc="0" normalizeH="0" baseline="0" noProof="0" dirty="0">
-                <a:ln>
-                  <a:noFill/>
-                </a:ln>
-                <a:solidFill>
-                  <a:srgbClr val="00B050"/>
-                </a:solidFill>
-                <a:effectLst/>
-                <a:uLnTx/>
-                <a:uFillTx/>
-                <a:latin typeface="Aptos Display" panose="02110004020202020204"/>
-                <a:ea typeface="+mj-ea"/>
-                <a:cs typeface="+mj-cs"/>
-              </a:rPr>
-              <a:t>Content Page layout: Title + Main content List</a:t>
-            </a:r>
-            <a:endParaRPr lang="en-US" dirty="0"/>
+              <a:t>Paragraph Controls: The spacing options</a:t>
+            </a:r>
           </a:p>
         </p:txBody>
       </p:sp>
@@ -4357,23 +4324,103 @@
         </p:nvSpPr>
         <p:spPr>
           <a:xfrm>
-            <a:off x="838200" y="1160199"/>
-            <a:ext cx="10515600" cy="4351338"/>
+            <a:off x="822959" y="1026634"/>
+            <a:ext cx="10515599" cy="5329715"/>
           </a:xfrm>
         </p:spPr>
         <p:txBody>
-          <a:bodyPr/>
-          <a:lstStyle/>
-          <a:p>
+          <a:bodyPr lIns="0" tIns="91440"/>
+          <a:lstStyle/>
+          <a:p>
+            <a:pPr marL="274320" indent="0"/>
             <a:r>
               <a:rPr lang="en-US" sz="1800" dirty="0"/>
-              <a:t>Insert Place holders are not available on Master layout, but only on child layouts.</a:t>
-            </a:r>
-          </a:p>
-          <a:p>
+              <a:t>They apply to each line (that is a paragraph) in the bulleted list</a:t>
+            </a:r>
+          </a:p>
+          <a:p>
+            <a:pPr marL="274320" indent="0"/>
             <a:r>
               <a:rPr lang="en-US" sz="1800" dirty="0"/>
-              <a:t>Master layout has a fixed number of insertable layouts like title, footer, page etc. These can be turned on or off. That’s it.</a:t>
+              <a:t>Not between the bullets!!</a:t>
+            </a:r>
+          </a:p>
+          <a:p>
+            <a:pPr marL="274320" indent="0"/>
+            <a:r>
+              <a:rPr lang="en-US" sz="1800" dirty="0"/>
+              <a:t>Very tricky!!</a:t>
+            </a:r>
+          </a:p>
+          <a:p>
+            <a:pPr marL="274320" indent="0"/>
+            <a:r>
+              <a:rPr lang="en-US" sz="1800" dirty="0"/>
+              <a:t>Before and after refers to each line inside ONE bullet</a:t>
+            </a:r>
+          </a:p>
+          <a:p>
+            <a:pPr marL="274320" indent="0"/>
+            <a:r>
+              <a:rPr lang="en-US" sz="1800" dirty="0"/>
+              <a:t>Line spacing (single, double, </a:t>
+            </a:r>
+            <a:r>
+              <a:rPr lang="en-US" sz="1800" dirty="0" err="1"/>
+              <a:t>etc</a:t>
+            </a:r>
+            <a:r>
+              <a:rPr lang="en-US" sz="1800" dirty="0"/>
+              <a:t>) is for lines inside a paragraph</a:t>
+            </a:r>
+          </a:p>
+          <a:p>
+            <a:pPr marL="274320" indent="0"/>
+            <a:r>
+              <a:rPr lang="en-US" sz="1800" dirty="0"/>
+              <a:t>Before and after is outside the paragraph</a:t>
+            </a:r>
+          </a:p>
+          <a:p>
+            <a:pPr marL="274320" indent="0"/>
+            <a:r>
+              <a:rPr lang="en-US" sz="1800" dirty="0"/>
+              <a:t>So, if both are in play and if the line is a single line they add up</a:t>
+            </a:r>
+          </a:p>
+          <a:p>
+            <a:pPr marL="274320" indent="0"/>
+            <a:r>
+              <a:rPr lang="en-US" sz="1800" dirty="0"/>
+              <a:t>For single line bullets, the “double spacing” inadvertently acts like as if it is applied to multiple bullets.</a:t>
+            </a:r>
+          </a:p>
+          <a:p>
+            <a:pPr marL="274320" indent="0"/>
+            <a:r>
+              <a:rPr lang="en-US" sz="1800" dirty="0"/>
+              <a:t>Advice</a:t>
+            </a:r>
+          </a:p>
+          <a:p>
+            <a:pPr marL="674370" lvl="1" indent="0"/>
+            <a:r>
+              <a:rPr lang="en-US" sz="1800" dirty="0"/>
+              <a:t>For spacing between the boundary and the list use the “shape” controls not paragraph</a:t>
+            </a:r>
+          </a:p>
+          <a:p>
+            <a:pPr marL="674370" lvl="1" indent="0"/>
+            <a:r>
+              <a:rPr lang="en-US" sz="1800" dirty="0"/>
+              <a:t>Use before and after for better control when the list has bullets that are multi line</a:t>
+            </a:r>
+          </a:p>
+          <a:p>
+            <a:pPr marL="674370" lvl="1" indent="0"/>
+            <a:r>
+              <a:rPr lang="en-US" sz="1800" dirty="0"/>
+              <a:t>For single line ones you can get away with line spacing</a:t>
             </a:r>
           </a:p>
         </p:txBody>
@@ -4383,7 +4430,7 @@
           <p:cNvPr id="2" name="Slide Number Placeholder 1">
             <a:extLst>
               <a:ext uri="{FF2B5EF4-FFF2-40B4-BE49-F238E27FC236}">
-                <a16:creationId xmlns:a16="http://schemas.microsoft.com/office/drawing/2014/main" id="{C6821A94-6BAD-9F3A-7582-507F97BAC898}"/>
+                <a16:creationId xmlns:a16="http://schemas.microsoft.com/office/drawing/2014/main" id="{856375BB-A417-BFDF-DF3D-984BE8D7CEFE}"/>
               </a:ext>
             </a:extLst>
           </p:cNvPr>
@@ -4410,7 +4457,7 @@
     </p:spTree>
     <p:extLst>
       <p:ext uri="{BB962C8B-B14F-4D97-AF65-F5344CB8AC3E}">
-        <p14:creationId xmlns:p14="http://schemas.microsoft.com/office/powerpoint/2010/main" val="2604000396"/>
+        <p14:creationId xmlns:p14="http://schemas.microsoft.com/office/powerpoint/2010/main" val="4103118673"/>
       </p:ext>
     </p:extLst>
   </p:cSld>
@@ -4460,8 +4507,43 @@
           <a:p>
             <a:r>
               <a:rPr lang="en-US" dirty="0"/>
-              <a:t>Multiple Master Layouts</a:t>
-            </a:r>
+              <a:t>Place Holders and Layouts: </a:t>
+            </a:r>
+            <a:r>
+              <a:rPr kumimoji="0" lang="en-US" sz="1800" b="0" i="0" u="none" strike="noStrike" kern="1200" cap="none" spc="0" normalizeH="0" baseline="0" noProof="0" dirty="0">
+                <a:ln>
+                  <a:noFill/>
+                </a:ln>
+                <a:solidFill>
+                  <a:prstClr val="black"/>
+                </a:solidFill>
+                <a:effectLst/>
+                <a:uLnTx/>
+                <a:uFillTx/>
+                <a:latin typeface="Aptos Display" panose="02110004020202020204"/>
+                <a:ea typeface="+mj-ea"/>
+                <a:cs typeface="+mj-cs"/>
+              </a:rPr>
+              <a:t>: </a:t>
+            </a:r>
+            <a:r>
+              <a:rPr kumimoji="0" lang="en-US" sz="1200" b="0" i="1" u="none" strike="noStrike" kern="1200" cap="none" spc="0" normalizeH="0" baseline="0" noProof="0" dirty="0">
+                <a:ln>
+                  <a:noFill/>
+                </a:ln>
+                <a:solidFill>
+                  <a:srgbClr val="00B050"/>
+                </a:solidFill>
+                <a:effectLst/>
+                <a:uLnTx/>
+                <a:uFillTx/>
+                <a:latin typeface="Aptos Display" panose="02110004020202020204"/>
+                <a:ea typeface="+mj-ea"/>
+                <a:cs typeface="+mj-cs"/>
+              </a:rPr>
+              <a:t>Content Page layout: Title + Main content List</a:t>
+            </a:r>
+            <a:endParaRPr lang="en-US" dirty="0"/>
           </a:p>
         </p:txBody>
       </p:sp>
@@ -4483,8 +4565,8 @@
         </p:nvSpPr>
         <p:spPr>
           <a:xfrm>
-            <a:off x="838200" y="1026635"/>
-            <a:ext cx="10515600" cy="4901554"/>
+            <a:off x="838200" y="1160199"/>
+            <a:ext cx="10515600" cy="4351338"/>
           </a:xfrm>
         </p:spPr>
         <p:txBody>
@@ -4493,49 +4575,13 @@
           <a:p>
             <a:r>
               <a:rPr lang="en-US" sz="1800" dirty="0"/>
-              <a:t>Say, most pages want a divider line between title and the content. Say these are 100 pages.</a:t>
+              <a:t>Insert Place holders are not available on Master layout, but only on child layouts.</a:t>
             </a:r>
           </a:p>
           <a:p>
             <a:r>
               <a:rPr lang="en-US" sz="1800" dirty="0"/>
-              <a:t>So you do that....</a:t>
-            </a:r>
-          </a:p>
-          <a:p>
-            <a:r>
-              <a:rPr lang="en-US" sz="1800" dirty="0"/>
-              <a:t>Now you want a page that doesn't have that title</a:t>
-            </a:r>
-          </a:p>
-          <a:p>
-            <a:r>
-              <a:rPr lang="en-US" sz="1800" dirty="0"/>
-              <a:t>Say these are 10 pages</a:t>
-            </a:r>
-          </a:p>
-          <a:p>
-            <a:r>
-              <a:rPr lang="en-US" sz="1800" dirty="0"/>
-              <a:t>These pages cannot use a layout from the other master because they will get the line a the top!</a:t>
-            </a:r>
-          </a:p>
-          <a:p>
-            <a:r>
-              <a:rPr lang="en-US" sz="1800" dirty="0"/>
-              <a:t>So you need to create another master layout without that line!</a:t>
-            </a:r>
-          </a:p>
-          <a:p>
-            <a:r>
-              <a:rPr lang="en-US" sz="1800" dirty="0"/>
-              <a:t>Now you have 2 masters!</a:t>
-            </a:r>
-          </a:p>
-          <a:p>
-            <a:r>
-              <a:rPr lang="en-US" sz="1800" dirty="0"/>
-              <a:t>there may be other ways to do it, but this is one way!</a:t>
+              <a:t>Master layout has a fixed number of insertable layouts like title, footer, page etc. These can be turned on or off. That’s it.</a:t>
             </a:r>
           </a:p>
         </p:txBody>
@@ -4545,7 +4591,7 @@
           <p:cNvPr id="2" name="Slide Number Placeholder 1">
             <a:extLst>
               <a:ext uri="{FF2B5EF4-FFF2-40B4-BE49-F238E27FC236}">
-                <a16:creationId xmlns:a16="http://schemas.microsoft.com/office/drawing/2014/main" id="{FAF85DC8-5A57-FE03-5A3A-8CC218E0C641}"/>
+                <a16:creationId xmlns:a16="http://schemas.microsoft.com/office/drawing/2014/main" id="{C6821A94-6BAD-9F3A-7582-507F97BAC898}"/>
               </a:ext>
             </a:extLst>
           </p:cNvPr>
@@ -4572,7 +4618,7 @@
     </p:spTree>
     <p:extLst>
       <p:ext uri="{BB962C8B-B14F-4D97-AF65-F5344CB8AC3E}">
-        <p14:creationId xmlns:p14="http://schemas.microsoft.com/office/powerpoint/2010/main" val="495550801"/>
+        <p14:creationId xmlns:p14="http://schemas.microsoft.com/office/powerpoint/2010/main" val="2604000396"/>
       </p:ext>
     </p:extLst>
   </p:cSld>
@@ -4622,7 +4668,7 @@
           <a:p>
             <a:r>
               <a:rPr lang="en-US" dirty="0"/>
-              <a:t>A separate master for non-content pages</a:t>
+              <a:t>Multiple Master Layouts</a:t>
             </a:r>
           </a:p>
         </p:txBody>
@@ -4655,31 +4701,49 @@
           <a:p>
             <a:r>
               <a:rPr lang="en-US" sz="1800" dirty="0"/>
-              <a:t>May be a good idea to use a separate master for non content pages</a:t>
+              <a:t>Say, most pages want a divider line between title and the content. Say these are 100 pages.</a:t>
             </a:r>
           </a:p>
           <a:p>
             <a:r>
               <a:rPr lang="en-US" sz="1800" dirty="0"/>
-              <a:t>Title page</a:t>
+              <a:t>So you do that....</a:t>
             </a:r>
           </a:p>
           <a:p>
             <a:r>
               <a:rPr lang="en-US" sz="1800" dirty="0"/>
-              <a:t>Separator page</a:t>
+              <a:t>Now you want a page that doesn't have that title</a:t>
             </a:r>
           </a:p>
           <a:p>
             <a:r>
               <a:rPr lang="en-US" sz="1800" dirty="0"/>
-              <a:t>This one typically misses the a) page title b) horizontal line at the top etc.</a:t>
+              <a:t>Say these are 10 pages</a:t>
             </a:r>
           </a:p>
           <a:p>
             <a:r>
               <a:rPr lang="en-US" sz="1800" dirty="0"/>
-              <a:t>Any drawings or images you place on a master cannot be removed from children!!</a:t>
+              <a:t>These pages cannot use a layout from the other master because they will get the line a the top!</a:t>
+            </a:r>
+          </a:p>
+          <a:p>
+            <a:r>
+              <a:rPr lang="en-US" sz="1800" dirty="0"/>
+              <a:t>So you need to create another master layout without that line!</a:t>
+            </a:r>
+          </a:p>
+          <a:p>
+            <a:r>
+              <a:rPr lang="en-US" sz="1800" dirty="0"/>
+              <a:t>Now you have 2 masters!</a:t>
+            </a:r>
+          </a:p>
+          <a:p>
+            <a:r>
+              <a:rPr lang="en-US" sz="1800" dirty="0"/>
+              <a:t>there may be other ways to do it, but this is one way!</a:t>
             </a:r>
           </a:p>
         </p:txBody>
@@ -4716,7 +4780,7 @@
     </p:spTree>
     <p:extLst>
       <p:ext uri="{BB962C8B-B14F-4D97-AF65-F5344CB8AC3E}">
-        <p14:creationId xmlns:p14="http://schemas.microsoft.com/office/powerpoint/2010/main" val="1878373529"/>
+        <p14:creationId xmlns:p14="http://schemas.microsoft.com/office/powerpoint/2010/main" val="495550801"/>
       </p:ext>
     </p:extLst>
   </p:cSld>
@@ -4748,7 +4812,7 @@
           <p:cNvPr id="4" name="Title 3">
             <a:extLst>
               <a:ext uri="{FF2B5EF4-FFF2-40B4-BE49-F238E27FC236}">
-                <a16:creationId xmlns:a16="http://schemas.microsoft.com/office/drawing/2014/main" id="{BB2BD00F-8EA4-14C5-BD5F-97F9AD513213}"/>
+                <a16:creationId xmlns:a16="http://schemas.microsoft.com/office/drawing/2014/main" id="{0D0E3244-86CC-ED51-EFBC-B4D48F99AEED}"/>
               </a:ext>
             </a:extLst>
           </p:cNvPr>
@@ -4756,7 +4820,7 @@
             <a:spLocks noGrp="1"/>
           </p:cNvSpPr>
           <p:nvPr>
-            <p:ph type="ctrTitle"/>
+            <p:ph type="title"/>
           </p:nvPr>
         </p:nvSpPr>
         <p:spPr/>
@@ -4766,25 +4830,74 @@
           <a:p>
             <a:r>
               <a:rPr lang="en-US" dirty="0"/>
-              <a:t>Demonstrating the 2</a:t>
-            </a:r>
-            <a:r>
-              <a:rPr lang="en-US" baseline="30000" dirty="0"/>
-              <a:t>nd</a:t>
-            </a:r>
-            <a:r>
-              <a:rPr lang="en-US" dirty="0"/>
-              <a:t> Master Style</a:t>
-            </a:r>
-          </a:p>
-        </p:txBody>
-      </p:sp>
-      <p:sp>
-        <p:nvSpPr>
-          <p:cNvPr id="3" name="Slide Number Placeholder 2">
-            <a:extLst>
-              <a:ext uri="{FF2B5EF4-FFF2-40B4-BE49-F238E27FC236}">
-                <a16:creationId xmlns:a16="http://schemas.microsoft.com/office/drawing/2014/main" id="{CEF38F97-C294-632E-FD05-A5A19DE454DC}"/>
+              <a:t>A separate master for non-content pages</a:t>
+            </a:r>
+          </a:p>
+        </p:txBody>
+      </p:sp>
+      <p:sp>
+        <p:nvSpPr>
+          <p:cNvPr id="3" name="Content Placeholder 2">
+            <a:extLst>
+              <a:ext uri="{FF2B5EF4-FFF2-40B4-BE49-F238E27FC236}">
+                <a16:creationId xmlns:a16="http://schemas.microsoft.com/office/drawing/2014/main" id="{5F640BAD-5564-4449-341E-F0DC31C356F5}"/>
+              </a:ext>
+            </a:extLst>
+          </p:cNvPr>
+          <p:cNvSpPr>
+            <a:spLocks noGrp="1"/>
+          </p:cNvSpPr>
+          <p:nvPr>
+            <p:ph idx="1"/>
+          </p:nvPr>
+        </p:nvSpPr>
+        <p:spPr>
+          <a:xfrm>
+            <a:off x="838200" y="1026635"/>
+            <a:ext cx="10515600" cy="4901554"/>
+          </a:xfrm>
+        </p:spPr>
+        <p:txBody>
+          <a:bodyPr/>
+          <a:lstStyle/>
+          <a:p>
+            <a:r>
+              <a:rPr lang="en-US" sz="1800" dirty="0"/>
+              <a:t>May be a good idea to use a separate master for non content pages</a:t>
+            </a:r>
+          </a:p>
+          <a:p>
+            <a:r>
+              <a:rPr lang="en-US" sz="1800" dirty="0"/>
+              <a:t>Title page</a:t>
+            </a:r>
+          </a:p>
+          <a:p>
+            <a:r>
+              <a:rPr lang="en-US" sz="1800" dirty="0"/>
+              <a:t>Separator page</a:t>
+            </a:r>
+          </a:p>
+          <a:p>
+            <a:r>
+              <a:rPr lang="en-US" sz="1800" dirty="0"/>
+              <a:t>This one typically misses the a) page title b) horizontal line at the top etc.</a:t>
+            </a:r>
+          </a:p>
+          <a:p>
+            <a:r>
+              <a:rPr lang="en-US" sz="1800" dirty="0"/>
+              <a:t>Any drawings or images you place on a master cannot be removed from children!!</a:t>
+            </a:r>
+          </a:p>
+        </p:txBody>
+      </p:sp>
+      <p:sp>
+        <p:nvSpPr>
+          <p:cNvPr id="2" name="Slide Number Placeholder 1">
+            <a:extLst>
+              <a:ext uri="{FF2B5EF4-FFF2-40B4-BE49-F238E27FC236}">
+                <a16:creationId xmlns:a16="http://schemas.microsoft.com/office/drawing/2014/main" id="{FAF85DC8-5A57-FE03-5A3A-8CC218E0C641}"/>
               </a:ext>
             </a:extLst>
           </p:cNvPr>
@@ -4808,62 +4921,10 @@
           </a:p>
         </p:txBody>
       </p:sp>
-      <p:sp>
-        <p:nvSpPr>
-          <p:cNvPr id="2" name="TextBox 1">
-            <a:extLst>
-              <a:ext uri="{FF2B5EF4-FFF2-40B4-BE49-F238E27FC236}">
-                <a16:creationId xmlns:a16="http://schemas.microsoft.com/office/drawing/2014/main" id="{330C3690-3838-041D-3E68-4BC2C594DD48}"/>
-              </a:ext>
-            </a:extLst>
-          </p:cNvPr>
-          <p:cNvSpPr txBox="1"/>
-          <p:nvPr/>
-        </p:nvSpPr>
-        <p:spPr>
-          <a:xfrm>
-            <a:off x="1381875" y="4964188"/>
-            <a:ext cx="9092629" cy="812648"/>
-          </a:xfrm>
-          <a:prstGeom prst="rect">
-            <a:avLst/>
-          </a:prstGeom>
-          <a:noFill/>
-          <a:ln w="28575">
-            <a:solidFill>
-              <a:schemeClr val="accent2"/>
-            </a:solidFill>
-          </a:ln>
-        </p:spPr>
-        <p:txBody>
-          <a:bodyPr wrap="square" rtlCol="0">
-            <a:noAutofit/>
-          </a:bodyPr>
-          <a:lstStyle/>
-          <a:p>
-            <a:pPr marL="342900" indent="-342900">
-              <a:buAutoNum type="arabicPeriod"/>
-            </a:pPr>
-            <a:r>
-              <a:rPr lang="en-US" dirty="0"/>
-              <a:t>Uses the Non-Title-Master master</a:t>
-            </a:r>
-          </a:p>
-          <a:p>
-            <a:pPr marL="342900" indent="-342900">
-              <a:buAutoNum type="arabicPeriod"/>
-            </a:pPr>
-            <a:r>
-              <a:rPr lang="en-US" dirty="0"/>
-              <a:t>Uses a “separator” layout</a:t>
-            </a:r>
-          </a:p>
-        </p:txBody>
-      </p:sp>
     </p:spTree>
     <p:extLst>
       <p:ext uri="{BB962C8B-B14F-4D97-AF65-F5344CB8AC3E}">
-        <p14:creationId xmlns:p14="http://schemas.microsoft.com/office/powerpoint/2010/main" val="2251273196"/>
+        <p14:creationId xmlns:p14="http://schemas.microsoft.com/office/powerpoint/2010/main" val="1878373529"/>
       </p:ext>
     </p:extLst>
   </p:cSld>
@@ -4913,7 +4974,15 @@
           <a:p>
             <a:r>
               <a:rPr lang="en-US" dirty="0"/>
-              <a:t>Recommendation</a:t>
+              <a:t>Demonstrating the 2</a:t>
+            </a:r>
+            <a:r>
+              <a:rPr lang="en-US" baseline="30000" dirty="0"/>
+              <a:t>nd</a:t>
+            </a:r>
+            <a:r>
+              <a:rPr lang="en-US" dirty="0"/>
+              <a:t> Master Style</a:t>
             </a:r>
           </a:p>
         </p:txBody>
@@ -4947,10 +5016,62 @@
           </a:p>
         </p:txBody>
       </p:sp>
+      <p:sp>
+        <p:nvSpPr>
+          <p:cNvPr id="2" name="TextBox 1">
+            <a:extLst>
+              <a:ext uri="{FF2B5EF4-FFF2-40B4-BE49-F238E27FC236}">
+                <a16:creationId xmlns:a16="http://schemas.microsoft.com/office/drawing/2014/main" id="{330C3690-3838-041D-3E68-4BC2C594DD48}"/>
+              </a:ext>
+            </a:extLst>
+          </p:cNvPr>
+          <p:cNvSpPr txBox="1"/>
+          <p:nvPr/>
+        </p:nvSpPr>
+        <p:spPr>
+          <a:xfrm>
+            <a:off x="1381875" y="4964188"/>
+            <a:ext cx="9092629" cy="812648"/>
+          </a:xfrm>
+          <a:prstGeom prst="rect">
+            <a:avLst/>
+          </a:prstGeom>
+          <a:noFill/>
+          <a:ln w="28575">
+            <a:solidFill>
+              <a:schemeClr val="accent2"/>
+            </a:solidFill>
+          </a:ln>
+        </p:spPr>
+        <p:txBody>
+          <a:bodyPr wrap="square" rtlCol="0">
+            <a:noAutofit/>
+          </a:bodyPr>
+          <a:lstStyle/>
+          <a:p>
+            <a:pPr marL="342900" indent="-342900">
+              <a:buAutoNum type="arabicPeriod"/>
+            </a:pPr>
+            <a:r>
+              <a:rPr lang="en-US" dirty="0"/>
+              <a:t>Uses the Non-Title-Master master</a:t>
+            </a:r>
+          </a:p>
+          <a:p>
+            <a:pPr marL="342900" indent="-342900">
+              <a:buAutoNum type="arabicPeriod"/>
+            </a:pPr>
+            <a:r>
+              <a:rPr lang="en-US" dirty="0"/>
+              <a:t>Uses a “separator” layout</a:t>
+            </a:r>
+          </a:p>
+        </p:txBody>
+      </p:sp>
     </p:spTree>
     <p:extLst>
       <p:ext uri="{BB962C8B-B14F-4D97-AF65-F5344CB8AC3E}">
-        <p14:creationId xmlns:p14="http://schemas.microsoft.com/office/powerpoint/2010/main" val="3049210581"/>
+        <p14:creationId xmlns:p14="http://schemas.microsoft.com/office/powerpoint/2010/main" val="2251273196"/>
       </p:ext>
     </p:extLst>
   </p:cSld>
@@ -4982,7 +5103,7 @@
           <p:cNvPr id="4" name="Title 3">
             <a:extLst>
               <a:ext uri="{FF2B5EF4-FFF2-40B4-BE49-F238E27FC236}">
-                <a16:creationId xmlns:a16="http://schemas.microsoft.com/office/drawing/2014/main" id="{0D0E3244-86CC-ED51-EFBC-B4D48F99AEED}"/>
+                <a16:creationId xmlns:a16="http://schemas.microsoft.com/office/drawing/2014/main" id="{BB2BD00F-8EA4-14C5-BD5F-97F9AD513213}"/>
               </a:ext>
             </a:extLst>
           </p:cNvPr>
@@ -4990,7 +5111,7 @@
             <a:spLocks noGrp="1"/>
           </p:cNvSpPr>
           <p:nvPr>
-            <p:ph type="title"/>
+            <p:ph type="ctrTitle"/>
           </p:nvPr>
         </p:nvSpPr>
         <p:spPr/>
@@ -5000,979 +5121,7 @@
           <a:p>
             <a:r>
               <a:rPr lang="en-US" dirty="0"/>
-              <a:t>Guidance: Design of layouts for lists: Primary and Secondary Options</a:t>
-            </a:r>
-          </a:p>
-        </p:txBody>
-      </p:sp>
-      <p:sp>
-        <p:nvSpPr>
-          <p:cNvPr id="2" name="Rectangle 1">
-            <a:extLst>
-              <a:ext uri="{FF2B5EF4-FFF2-40B4-BE49-F238E27FC236}">
-                <a16:creationId xmlns:a16="http://schemas.microsoft.com/office/drawing/2014/main" id="{E3FD8DAD-0002-ECA3-09EE-39011DED416A}"/>
-              </a:ext>
-            </a:extLst>
-          </p:cNvPr>
-          <p:cNvSpPr/>
-          <p:nvPr/>
-        </p:nvSpPr>
-        <p:spPr>
-          <a:xfrm>
-            <a:off x="838200" y="3287730"/>
-            <a:ext cx="2178121" cy="598470"/>
-          </a:xfrm>
-          <a:prstGeom prst="rect">
-            <a:avLst/>
-          </a:prstGeom>
-        </p:spPr>
-        <p:style>
-          <a:lnRef idx="2">
-            <a:schemeClr val="accent1">
-              <a:shade val="15000"/>
-            </a:schemeClr>
-          </a:lnRef>
-          <a:fillRef idx="1">
-            <a:schemeClr val="accent1"/>
-          </a:fillRef>
-          <a:effectRef idx="0">
-            <a:schemeClr val="accent1"/>
-          </a:effectRef>
-          <a:fontRef idx="minor">
-            <a:schemeClr val="lt1"/>
-          </a:fontRef>
-        </p:style>
-        <p:txBody>
-          <a:bodyPr rtlCol="0" anchor="ctr"/>
-          <a:lstStyle/>
-          <a:p>
-            <a:pPr algn="ctr"/>
-            <a:r>
-              <a:rPr lang="en-US" dirty="0"/>
-              <a:t>Content layout</a:t>
-            </a:r>
-          </a:p>
-        </p:txBody>
-      </p:sp>
-      <p:sp>
-        <p:nvSpPr>
-          <p:cNvPr id="5" name="Rectangle 4">
-            <a:extLst>
-              <a:ext uri="{FF2B5EF4-FFF2-40B4-BE49-F238E27FC236}">
-                <a16:creationId xmlns:a16="http://schemas.microsoft.com/office/drawing/2014/main" id="{33C18229-8A3D-70BE-2A35-F0C7FEEA4BBD}"/>
-              </a:ext>
-            </a:extLst>
-          </p:cNvPr>
-          <p:cNvSpPr/>
-          <p:nvPr/>
-        </p:nvSpPr>
-        <p:spPr>
-          <a:xfrm>
-            <a:off x="4177301" y="2178122"/>
-            <a:ext cx="3076254" cy="598470"/>
-          </a:xfrm>
-          <a:prstGeom prst="rect">
-            <a:avLst/>
-          </a:prstGeom>
-        </p:spPr>
-        <p:style>
-          <a:lnRef idx="2">
-            <a:schemeClr val="accent1">
-              <a:shade val="15000"/>
-            </a:schemeClr>
-          </a:lnRef>
-          <a:fillRef idx="1">
-            <a:schemeClr val="accent1"/>
-          </a:fillRef>
-          <a:effectRef idx="0">
-            <a:schemeClr val="accent1"/>
-          </a:effectRef>
-          <a:fontRef idx="minor">
-            <a:schemeClr val="lt1"/>
-          </a:fontRef>
-        </p:style>
-        <p:txBody>
-          <a:bodyPr rtlCol="0" anchor="ctr"/>
-          <a:lstStyle/>
-          <a:p>
-            <a:pPr algn="ctr"/>
-            <a:r>
-              <a:rPr lang="en-US" dirty="0"/>
-              <a:t>Content with 1 list</a:t>
-            </a:r>
-          </a:p>
-        </p:txBody>
-      </p:sp>
-      <p:sp>
-        <p:nvSpPr>
-          <p:cNvPr id="6" name="Rectangle 5">
-            <a:extLst>
-              <a:ext uri="{FF2B5EF4-FFF2-40B4-BE49-F238E27FC236}">
-                <a16:creationId xmlns:a16="http://schemas.microsoft.com/office/drawing/2014/main" id="{9981450D-B959-E60E-143A-F8792FAFE4BF}"/>
-              </a:ext>
-            </a:extLst>
-          </p:cNvPr>
-          <p:cNvSpPr/>
-          <p:nvPr/>
-        </p:nvSpPr>
-        <p:spPr>
-          <a:xfrm>
-            <a:off x="4177301" y="3129765"/>
-            <a:ext cx="3076254" cy="598470"/>
-          </a:xfrm>
-          <a:prstGeom prst="rect">
-            <a:avLst/>
-          </a:prstGeom>
-        </p:spPr>
-        <p:style>
-          <a:lnRef idx="2">
-            <a:schemeClr val="accent1">
-              <a:shade val="15000"/>
-            </a:schemeClr>
-          </a:lnRef>
-          <a:fillRef idx="1">
-            <a:schemeClr val="accent1"/>
-          </a:fillRef>
-          <a:effectRef idx="0">
-            <a:schemeClr val="accent1"/>
-          </a:effectRef>
-          <a:fontRef idx="minor">
-            <a:schemeClr val="lt1"/>
-          </a:fontRef>
-        </p:style>
-        <p:txBody>
-          <a:bodyPr rtlCol="0" anchor="ctr"/>
-          <a:lstStyle/>
-          <a:p>
-            <a:pPr algn="ctr"/>
-            <a:r>
-              <a:rPr lang="en-US" dirty="0"/>
-              <a:t>Content with 2 lists</a:t>
-            </a:r>
-          </a:p>
-        </p:txBody>
-      </p:sp>
-      <p:sp>
-        <p:nvSpPr>
-          <p:cNvPr id="7" name="Rectangle 6">
-            <a:extLst>
-              <a:ext uri="{FF2B5EF4-FFF2-40B4-BE49-F238E27FC236}">
-                <a16:creationId xmlns:a16="http://schemas.microsoft.com/office/drawing/2014/main" id="{5808AFAA-5EAC-2DDF-404E-CAF6D6D0A228}"/>
-              </a:ext>
-            </a:extLst>
-          </p:cNvPr>
-          <p:cNvSpPr/>
-          <p:nvPr/>
-        </p:nvSpPr>
-        <p:spPr>
-          <a:xfrm>
-            <a:off x="4177301" y="4081408"/>
-            <a:ext cx="3076254" cy="598470"/>
-          </a:xfrm>
-          <a:prstGeom prst="rect">
-            <a:avLst/>
-          </a:prstGeom>
-        </p:spPr>
-        <p:style>
-          <a:lnRef idx="2">
-            <a:schemeClr val="accent1">
-              <a:shade val="15000"/>
-            </a:schemeClr>
-          </a:lnRef>
-          <a:fillRef idx="1">
-            <a:schemeClr val="accent1"/>
-          </a:fillRef>
-          <a:effectRef idx="0">
-            <a:schemeClr val="accent1"/>
-          </a:effectRef>
-          <a:fontRef idx="minor">
-            <a:schemeClr val="lt1"/>
-          </a:fontRef>
-        </p:style>
-        <p:txBody>
-          <a:bodyPr rtlCol="0" anchor="ctr"/>
-          <a:lstStyle/>
-          <a:p>
-            <a:pPr algn="ctr"/>
-            <a:r>
-              <a:rPr lang="en-US" dirty="0"/>
-              <a:t>Content with 3 lists</a:t>
-            </a:r>
-          </a:p>
-        </p:txBody>
-      </p:sp>
-      <p:cxnSp>
-        <p:nvCxnSpPr>
-          <p:cNvPr id="9" name="Straight Arrow Connector 8">
-            <a:extLst>
-              <a:ext uri="{FF2B5EF4-FFF2-40B4-BE49-F238E27FC236}">
-                <a16:creationId xmlns:a16="http://schemas.microsoft.com/office/drawing/2014/main" id="{C4488C34-9066-A344-56BF-341A1C546668}"/>
-              </a:ext>
-            </a:extLst>
-          </p:cNvPr>
-          <p:cNvCxnSpPr>
-            <a:stCxn id="2" idx="3"/>
-            <a:endCxn id="5" idx="1"/>
-          </p:cNvCxnSpPr>
-          <p:nvPr/>
-        </p:nvCxnSpPr>
-        <p:spPr>
-          <a:xfrm flipV="1">
-            <a:off x="3016321" y="2477357"/>
-            <a:ext cx="1160980" cy="1109608"/>
-          </a:xfrm>
-          <a:prstGeom prst="straightConnector1">
-            <a:avLst/>
-          </a:prstGeom>
-          <a:ln>
-            <a:tailEnd type="triangle"/>
-          </a:ln>
-        </p:spPr>
-        <p:style>
-          <a:lnRef idx="2">
-            <a:schemeClr val="accent1"/>
-          </a:lnRef>
-          <a:fillRef idx="0">
-            <a:schemeClr val="accent1"/>
-          </a:fillRef>
-          <a:effectRef idx="1">
-            <a:schemeClr val="accent1"/>
-          </a:effectRef>
-          <a:fontRef idx="minor">
-            <a:schemeClr val="tx1"/>
-          </a:fontRef>
-        </p:style>
-      </p:cxnSp>
-      <p:cxnSp>
-        <p:nvCxnSpPr>
-          <p:cNvPr id="10" name="Straight Arrow Connector 9">
-            <a:extLst>
-              <a:ext uri="{FF2B5EF4-FFF2-40B4-BE49-F238E27FC236}">
-                <a16:creationId xmlns:a16="http://schemas.microsoft.com/office/drawing/2014/main" id="{BA56CA6B-ACBB-7034-F921-F66C40A2938E}"/>
-              </a:ext>
-            </a:extLst>
-          </p:cNvPr>
-          <p:cNvCxnSpPr>
-            <a:cxnSpLocks/>
-            <a:stCxn id="2" idx="3"/>
-            <a:endCxn id="6" idx="1"/>
-          </p:cNvCxnSpPr>
-          <p:nvPr/>
-        </p:nvCxnSpPr>
-        <p:spPr>
-          <a:xfrm flipV="1">
-            <a:off x="3016321" y="3429000"/>
-            <a:ext cx="1160980" cy="157965"/>
-          </a:xfrm>
-          <a:prstGeom prst="straightConnector1">
-            <a:avLst/>
-          </a:prstGeom>
-          <a:ln>
-            <a:tailEnd type="triangle"/>
-          </a:ln>
-        </p:spPr>
-        <p:style>
-          <a:lnRef idx="2">
-            <a:schemeClr val="accent1"/>
-          </a:lnRef>
-          <a:fillRef idx="0">
-            <a:schemeClr val="accent1"/>
-          </a:fillRef>
-          <a:effectRef idx="1">
-            <a:schemeClr val="accent1"/>
-          </a:effectRef>
-          <a:fontRef idx="minor">
-            <a:schemeClr val="tx1"/>
-          </a:fontRef>
-        </p:style>
-      </p:cxnSp>
-      <p:cxnSp>
-        <p:nvCxnSpPr>
-          <p:cNvPr id="11" name="Straight Arrow Connector 10">
-            <a:extLst>
-              <a:ext uri="{FF2B5EF4-FFF2-40B4-BE49-F238E27FC236}">
-                <a16:creationId xmlns:a16="http://schemas.microsoft.com/office/drawing/2014/main" id="{26DA93C0-B104-55E9-ED99-3DEB304A22B7}"/>
-              </a:ext>
-            </a:extLst>
-          </p:cNvPr>
-          <p:cNvCxnSpPr>
-            <a:cxnSpLocks/>
-            <a:stCxn id="2" idx="3"/>
-            <a:endCxn id="7" idx="1"/>
-          </p:cNvCxnSpPr>
-          <p:nvPr/>
-        </p:nvCxnSpPr>
-        <p:spPr>
-          <a:xfrm>
-            <a:off x="3016321" y="3586965"/>
-            <a:ext cx="1160980" cy="793678"/>
-          </a:xfrm>
-          <a:prstGeom prst="straightConnector1">
-            <a:avLst/>
-          </a:prstGeom>
-          <a:ln>
-            <a:tailEnd type="triangle"/>
-          </a:ln>
-        </p:spPr>
-        <p:style>
-          <a:lnRef idx="2">
-            <a:schemeClr val="accent1"/>
-          </a:lnRef>
-          <a:fillRef idx="0">
-            <a:schemeClr val="accent1"/>
-          </a:fillRef>
-          <a:effectRef idx="1">
-            <a:schemeClr val="accent1"/>
-          </a:effectRef>
-          <a:fontRef idx="minor">
-            <a:schemeClr val="tx1"/>
-          </a:fontRef>
-        </p:style>
-      </p:cxnSp>
-      <p:sp>
-        <p:nvSpPr>
-          <p:cNvPr id="16" name="Rectangle 15">
-            <a:extLst>
-              <a:ext uri="{FF2B5EF4-FFF2-40B4-BE49-F238E27FC236}">
-                <a16:creationId xmlns:a16="http://schemas.microsoft.com/office/drawing/2014/main" id="{AB59A247-3607-4956-8E77-3B98E50E9EA4}"/>
-              </a:ext>
-            </a:extLst>
-          </p:cNvPr>
-          <p:cNvSpPr/>
-          <p:nvPr/>
-        </p:nvSpPr>
-        <p:spPr>
-          <a:xfrm>
-            <a:off x="8126857" y="2178122"/>
-            <a:ext cx="2373330" cy="2501756"/>
-          </a:xfrm>
-          <a:prstGeom prst="rect">
-            <a:avLst/>
-          </a:prstGeom>
-        </p:spPr>
-        <p:style>
-          <a:lnRef idx="2">
-            <a:schemeClr val="accent1">
-              <a:shade val="15000"/>
-            </a:schemeClr>
-          </a:lnRef>
-          <a:fillRef idx="1">
-            <a:schemeClr val="accent1"/>
-          </a:fillRef>
-          <a:effectRef idx="0">
-            <a:schemeClr val="accent1"/>
-          </a:effectRef>
-          <a:fontRef idx="minor">
-            <a:schemeClr val="lt1"/>
-          </a:fontRef>
-        </p:style>
-        <p:txBody>
-          <a:bodyPr rtlCol="0" anchor="ctr"/>
-          <a:lstStyle/>
-          <a:p>
-            <a:pPr algn="ctr"/>
-            <a:r>
-              <a:rPr lang="en-US" dirty="0"/>
-              <a:t>Have pages use one of these layouts</a:t>
-            </a:r>
-          </a:p>
-        </p:txBody>
-      </p:sp>
-      <p:sp>
-        <p:nvSpPr>
-          <p:cNvPr id="17" name="Rectangle 16">
-            <a:extLst>
-              <a:ext uri="{FF2B5EF4-FFF2-40B4-BE49-F238E27FC236}">
-                <a16:creationId xmlns:a16="http://schemas.microsoft.com/office/drawing/2014/main" id="{E514C8F5-57FB-FE2C-50C3-2CBEB6754C11}"/>
-              </a:ext>
-            </a:extLst>
-          </p:cNvPr>
-          <p:cNvSpPr/>
-          <p:nvPr/>
-        </p:nvSpPr>
-        <p:spPr>
-          <a:xfrm>
-            <a:off x="4331412" y="5656077"/>
-            <a:ext cx="3076253" cy="598471"/>
-          </a:xfrm>
-          <a:prstGeom prst="rect">
-            <a:avLst/>
-          </a:prstGeom>
-          <a:solidFill>
-            <a:schemeClr val="accent2">
-              <a:lumMod val="40000"/>
-              <a:lumOff val="60000"/>
-            </a:schemeClr>
-          </a:solidFill>
-        </p:spPr>
-        <p:style>
-          <a:lnRef idx="2">
-            <a:schemeClr val="accent1">
-              <a:shade val="15000"/>
-            </a:schemeClr>
-          </a:lnRef>
-          <a:fillRef idx="1">
-            <a:schemeClr val="accent1"/>
-          </a:fillRef>
-          <a:effectRef idx="0">
-            <a:schemeClr val="accent1"/>
-          </a:effectRef>
-          <a:fontRef idx="minor">
-            <a:schemeClr val="lt1"/>
-          </a:fontRef>
-        </p:style>
-        <p:txBody>
-          <a:bodyPr rtlCol="0" anchor="ctr"/>
-          <a:lstStyle/>
-          <a:p>
-            <a:pPr algn="ctr"/>
-            <a:r>
-              <a:rPr lang="en-US" dirty="0"/>
-              <a:t>Style these lists in layouts</a:t>
-            </a:r>
-          </a:p>
-        </p:txBody>
-      </p:sp>
-      <p:sp>
-        <p:nvSpPr>
-          <p:cNvPr id="18" name="Arrow: Right 17">
-            <a:extLst>
-              <a:ext uri="{FF2B5EF4-FFF2-40B4-BE49-F238E27FC236}">
-                <a16:creationId xmlns:a16="http://schemas.microsoft.com/office/drawing/2014/main" id="{3A8F7476-91DF-958F-45A1-938C566FA686}"/>
-              </a:ext>
-            </a:extLst>
-          </p:cNvPr>
-          <p:cNvSpPr/>
-          <p:nvPr/>
-        </p:nvSpPr>
-        <p:spPr>
-          <a:xfrm>
-            <a:off x="7417941" y="3443769"/>
-            <a:ext cx="544530" cy="157965"/>
-          </a:xfrm>
-          <a:prstGeom prst="rightArrow">
-            <a:avLst/>
-          </a:prstGeom>
-        </p:spPr>
-        <p:style>
-          <a:lnRef idx="2">
-            <a:schemeClr val="accent1">
-              <a:shade val="15000"/>
-            </a:schemeClr>
-          </a:lnRef>
-          <a:fillRef idx="1">
-            <a:schemeClr val="accent1"/>
-          </a:fillRef>
-          <a:effectRef idx="0">
-            <a:schemeClr val="accent1"/>
-          </a:effectRef>
-          <a:fontRef idx="minor">
-            <a:schemeClr val="lt1"/>
-          </a:fontRef>
-        </p:style>
-        <p:txBody>
-          <a:bodyPr rtlCol="0" anchor="ctr"/>
-          <a:lstStyle/>
-          <a:p>
-            <a:pPr algn="ctr"/>
-            <a:endParaRPr lang="en-US"/>
-          </a:p>
-        </p:txBody>
-      </p:sp>
-      <p:sp>
-        <p:nvSpPr>
-          <p:cNvPr id="20" name="Arrow: Right 19">
-            <a:extLst>
-              <a:ext uri="{FF2B5EF4-FFF2-40B4-BE49-F238E27FC236}">
-                <a16:creationId xmlns:a16="http://schemas.microsoft.com/office/drawing/2014/main" id="{C56A7452-0D4C-075E-53ED-81D6C02A8CF5}"/>
-              </a:ext>
-            </a:extLst>
-          </p:cNvPr>
-          <p:cNvSpPr/>
-          <p:nvPr/>
-        </p:nvSpPr>
-        <p:spPr>
-          <a:xfrm rot="16200000">
-            <a:off x="5551470" y="5169828"/>
-            <a:ext cx="544530" cy="157965"/>
-          </a:xfrm>
-          <a:prstGeom prst="rightArrow">
-            <a:avLst/>
-          </a:prstGeom>
-        </p:spPr>
-        <p:style>
-          <a:lnRef idx="2">
-            <a:schemeClr val="accent1">
-              <a:shade val="15000"/>
-            </a:schemeClr>
-          </a:lnRef>
-          <a:fillRef idx="1">
-            <a:schemeClr val="accent1"/>
-          </a:fillRef>
-          <a:effectRef idx="0">
-            <a:schemeClr val="accent1"/>
-          </a:effectRef>
-          <a:fontRef idx="minor">
-            <a:schemeClr val="lt1"/>
-          </a:fontRef>
-        </p:style>
-        <p:txBody>
-          <a:bodyPr rtlCol="0" anchor="ctr"/>
-          <a:lstStyle/>
-          <a:p>
-            <a:pPr algn="ctr"/>
-            <a:endParaRPr lang="en-US"/>
-          </a:p>
-        </p:txBody>
-      </p:sp>
-      <p:sp>
-        <p:nvSpPr>
-          <p:cNvPr id="21" name="Rectangle 20">
-            <a:extLst>
-              <a:ext uri="{FF2B5EF4-FFF2-40B4-BE49-F238E27FC236}">
-                <a16:creationId xmlns:a16="http://schemas.microsoft.com/office/drawing/2014/main" id="{A67762C6-D034-1E53-C7F0-227931945664}"/>
-              </a:ext>
-            </a:extLst>
-          </p:cNvPr>
-          <p:cNvSpPr/>
-          <p:nvPr/>
-        </p:nvSpPr>
-        <p:spPr>
-          <a:xfrm>
-            <a:off x="3123344" y="918102"/>
-            <a:ext cx="5589141" cy="598471"/>
-          </a:xfrm>
-          <a:prstGeom prst="rect">
-            <a:avLst/>
-          </a:prstGeom>
-          <a:solidFill>
-            <a:schemeClr val="accent2">
-              <a:lumMod val="40000"/>
-              <a:lumOff val="60000"/>
-            </a:schemeClr>
-          </a:solidFill>
-        </p:spPr>
-        <p:style>
-          <a:lnRef idx="2">
-            <a:schemeClr val="accent1">
-              <a:shade val="15000"/>
-            </a:schemeClr>
-          </a:lnRef>
-          <a:fillRef idx="1">
-            <a:schemeClr val="accent1"/>
-          </a:fillRef>
-          <a:effectRef idx="0">
-            <a:schemeClr val="accent1"/>
-          </a:effectRef>
-          <a:fontRef idx="minor">
-            <a:schemeClr val="lt1"/>
-          </a:fontRef>
-        </p:style>
-        <p:txBody>
-          <a:bodyPr rtlCol="0" anchor="ctr"/>
-          <a:lstStyle/>
-          <a:p>
-            <a:pPr algn="ctr"/>
-            <a:r>
-              <a:rPr lang="en-US" dirty="0"/>
-              <a:t>3 sister layout pages</a:t>
-            </a:r>
-          </a:p>
-          <a:p>
-            <a:pPr algn="ctr"/>
-            <a:r>
-              <a:rPr lang="en-US" dirty="0"/>
-              <a:t>Extending a common content layout</a:t>
-            </a:r>
-          </a:p>
-        </p:txBody>
-      </p:sp>
-      <p:sp>
-        <p:nvSpPr>
-          <p:cNvPr id="22" name="Arrow: Right 21">
-            <a:extLst>
-              <a:ext uri="{FF2B5EF4-FFF2-40B4-BE49-F238E27FC236}">
-                <a16:creationId xmlns:a16="http://schemas.microsoft.com/office/drawing/2014/main" id="{EC446D1D-7238-1613-0ED0-E8156796659B}"/>
-              </a:ext>
-            </a:extLst>
-          </p:cNvPr>
-          <p:cNvSpPr/>
-          <p:nvPr/>
-        </p:nvSpPr>
-        <p:spPr>
-          <a:xfrm rot="5400000">
-            <a:off x="5522145" y="1775847"/>
-            <a:ext cx="544530" cy="157965"/>
-          </a:xfrm>
-          <a:prstGeom prst="rightArrow">
-            <a:avLst/>
-          </a:prstGeom>
-        </p:spPr>
-        <p:style>
-          <a:lnRef idx="2">
-            <a:schemeClr val="accent1">
-              <a:shade val="15000"/>
-            </a:schemeClr>
-          </a:lnRef>
-          <a:fillRef idx="1">
-            <a:schemeClr val="accent1"/>
-          </a:fillRef>
-          <a:effectRef idx="0">
-            <a:schemeClr val="accent1"/>
-          </a:effectRef>
-          <a:fontRef idx="minor">
-            <a:schemeClr val="lt1"/>
-          </a:fontRef>
-        </p:style>
-        <p:txBody>
-          <a:bodyPr rtlCol="0" anchor="ctr"/>
-          <a:lstStyle/>
-          <a:p>
-            <a:pPr algn="ctr"/>
-            <a:endParaRPr lang="en-US"/>
-          </a:p>
-        </p:txBody>
-      </p:sp>
-      <p:sp>
-        <p:nvSpPr>
-          <p:cNvPr id="23" name="Rectangle 22">
-            <a:extLst>
-              <a:ext uri="{FF2B5EF4-FFF2-40B4-BE49-F238E27FC236}">
-                <a16:creationId xmlns:a16="http://schemas.microsoft.com/office/drawing/2014/main" id="{79C1BF21-E7A3-41D3-0637-41A5859286BE}"/>
-              </a:ext>
-            </a:extLst>
-          </p:cNvPr>
-          <p:cNvSpPr/>
-          <p:nvPr/>
-        </p:nvSpPr>
-        <p:spPr>
-          <a:xfrm>
-            <a:off x="678096" y="4976545"/>
-            <a:ext cx="2100210" cy="1276715"/>
-          </a:xfrm>
-          <a:prstGeom prst="rect">
-            <a:avLst/>
-          </a:prstGeom>
-          <a:solidFill>
-            <a:schemeClr val="accent2"/>
-          </a:solidFill>
-        </p:spPr>
-        <p:style>
-          <a:lnRef idx="2">
-            <a:schemeClr val="accent1">
-              <a:shade val="15000"/>
-            </a:schemeClr>
-          </a:lnRef>
-          <a:fillRef idx="1">
-            <a:schemeClr val="accent1"/>
-          </a:fillRef>
-          <a:effectRef idx="0">
-            <a:schemeClr val="accent1"/>
-          </a:effectRef>
-          <a:fontRef idx="minor">
-            <a:schemeClr val="lt1"/>
-          </a:fontRef>
-        </p:style>
-        <p:txBody>
-          <a:bodyPr rtlCol="0" anchor="ctr"/>
-          <a:lstStyle/>
-          <a:p>
-            <a:pPr algn="ctr"/>
-            <a:r>
-              <a:rPr lang="en-US" dirty="0"/>
-              <a:t>Style:</a:t>
-            </a:r>
-          </a:p>
-          <a:p>
-            <a:pPr marL="342900" indent="-342900" algn="ctr">
-              <a:buAutoNum type="arabicPeriod"/>
-            </a:pPr>
-            <a:r>
-              <a:rPr lang="en-US" dirty="0"/>
-              <a:t>Spacing</a:t>
-            </a:r>
-          </a:p>
-          <a:p>
-            <a:pPr marL="342900" indent="-342900" algn="ctr">
-              <a:buAutoNum type="arabicPeriod"/>
-            </a:pPr>
-            <a:r>
-              <a:rPr lang="en-US" dirty="0"/>
-              <a:t>Fonts</a:t>
-            </a:r>
-          </a:p>
-          <a:p>
-            <a:pPr marL="342900" indent="-342900" algn="ctr">
-              <a:buAutoNum type="arabicPeriod"/>
-            </a:pPr>
-            <a:r>
-              <a:rPr lang="en-US" dirty="0"/>
-              <a:t>Color</a:t>
-            </a:r>
-          </a:p>
-        </p:txBody>
-      </p:sp>
-      <p:cxnSp>
-        <p:nvCxnSpPr>
-          <p:cNvPr id="25" name="Straight Arrow Connector 24">
-            <a:extLst>
-              <a:ext uri="{FF2B5EF4-FFF2-40B4-BE49-F238E27FC236}">
-                <a16:creationId xmlns:a16="http://schemas.microsoft.com/office/drawing/2014/main" id="{F4165BCF-6E50-67E2-6D43-0DA32C926803}"/>
-              </a:ext>
-            </a:extLst>
-          </p:cNvPr>
-          <p:cNvCxnSpPr>
-            <a:stCxn id="23" idx="0"/>
-          </p:cNvCxnSpPr>
-          <p:nvPr/>
-        </p:nvCxnSpPr>
-        <p:spPr>
-          <a:xfrm flipV="1">
-            <a:off x="1728201" y="4582274"/>
-            <a:ext cx="1590352" cy="394271"/>
-          </a:xfrm>
-          <a:prstGeom prst="straightConnector1">
-            <a:avLst/>
-          </a:prstGeom>
-          <a:ln>
-            <a:tailEnd type="triangle"/>
-          </a:ln>
-        </p:spPr>
-        <p:style>
-          <a:lnRef idx="2">
-            <a:schemeClr val="accent1"/>
-          </a:lnRef>
-          <a:fillRef idx="0">
-            <a:schemeClr val="accent1"/>
-          </a:fillRef>
-          <a:effectRef idx="1">
-            <a:schemeClr val="accent1"/>
-          </a:effectRef>
-          <a:fontRef idx="minor">
-            <a:schemeClr val="tx1"/>
-          </a:fontRef>
-        </p:style>
-      </p:cxnSp>
-      <p:sp>
-        <p:nvSpPr>
-          <p:cNvPr id="26" name="Rectangle 25">
-            <a:extLst>
-              <a:ext uri="{FF2B5EF4-FFF2-40B4-BE49-F238E27FC236}">
-                <a16:creationId xmlns:a16="http://schemas.microsoft.com/office/drawing/2014/main" id="{C446B378-D735-74B9-27A5-F2987FBE06B3}"/>
-              </a:ext>
-            </a:extLst>
-          </p:cNvPr>
-          <p:cNvSpPr/>
-          <p:nvPr/>
-        </p:nvSpPr>
-        <p:spPr>
-          <a:xfrm>
-            <a:off x="9851624" y="5212621"/>
-            <a:ext cx="1875031" cy="1276715"/>
-          </a:xfrm>
-          <a:prstGeom prst="rect">
-            <a:avLst/>
-          </a:prstGeom>
-          <a:ln w="28575">
-            <a:solidFill>
-              <a:srgbClr val="FF0000"/>
-            </a:solidFill>
-          </a:ln>
-        </p:spPr>
-        <p:style>
-          <a:lnRef idx="2">
-            <a:schemeClr val="accent1">
-              <a:shade val="15000"/>
-            </a:schemeClr>
-          </a:lnRef>
-          <a:fillRef idx="1">
-            <a:schemeClr val="accent1"/>
-          </a:fillRef>
-          <a:effectRef idx="0">
-            <a:schemeClr val="accent1"/>
-          </a:effectRef>
-          <a:fontRef idx="minor">
-            <a:schemeClr val="lt1"/>
-          </a:fontRef>
-        </p:style>
-        <p:txBody>
-          <a:bodyPr rtlCol="0" anchor="ctr"/>
-          <a:lstStyle/>
-          <a:p>
-            <a:pPr algn="ctr"/>
-            <a:r>
-              <a:rPr lang="en-US" dirty="0"/>
-              <a:t>A page with many “simple” text box lists to copy if needed</a:t>
-            </a:r>
-          </a:p>
-        </p:txBody>
-      </p:sp>
-      <p:sp>
-        <p:nvSpPr>
-          <p:cNvPr id="27" name="Oval 26">
-            <a:extLst>
-              <a:ext uri="{FF2B5EF4-FFF2-40B4-BE49-F238E27FC236}">
-                <a16:creationId xmlns:a16="http://schemas.microsoft.com/office/drawing/2014/main" id="{8C0E29F9-181C-34D4-2BB2-2A810C494312}"/>
-              </a:ext>
-            </a:extLst>
-          </p:cNvPr>
-          <p:cNvSpPr/>
-          <p:nvPr/>
-        </p:nvSpPr>
-        <p:spPr>
-          <a:xfrm>
-            <a:off x="3521722" y="4679878"/>
-            <a:ext cx="437857" cy="437857"/>
-          </a:xfrm>
-          <a:prstGeom prst="ellipse">
-            <a:avLst/>
-          </a:prstGeom>
-        </p:spPr>
-        <p:style>
-          <a:lnRef idx="2">
-            <a:schemeClr val="accent1">
-              <a:shade val="15000"/>
-            </a:schemeClr>
-          </a:lnRef>
-          <a:fillRef idx="1">
-            <a:schemeClr val="accent1"/>
-          </a:fillRef>
-          <a:effectRef idx="0">
-            <a:schemeClr val="accent1"/>
-          </a:effectRef>
-          <a:fontRef idx="minor">
-            <a:schemeClr val="lt1"/>
-          </a:fontRef>
-        </p:style>
-        <p:txBody>
-          <a:bodyPr rtlCol="0" anchor="ctr"/>
-          <a:lstStyle/>
-          <a:p>
-            <a:pPr algn="ctr"/>
-            <a:r>
-              <a:rPr lang="en-US" dirty="0"/>
-              <a:t>1</a:t>
-            </a:r>
-          </a:p>
-        </p:txBody>
-      </p:sp>
-      <p:sp>
-        <p:nvSpPr>
-          <p:cNvPr id="28" name="Oval 27">
-            <a:extLst>
-              <a:ext uri="{FF2B5EF4-FFF2-40B4-BE49-F238E27FC236}">
-                <a16:creationId xmlns:a16="http://schemas.microsoft.com/office/drawing/2014/main" id="{CDE95F12-2811-FBBD-9B88-367040C995AD}"/>
-              </a:ext>
-            </a:extLst>
-          </p:cNvPr>
-          <p:cNvSpPr/>
-          <p:nvPr/>
-        </p:nvSpPr>
-        <p:spPr>
-          <a:xfrm>
-            <a:off x="9313522" y="5677830"/>
-            <a:ext cx="437857" cy="437857"/>
-          </a:xfrm>
-          <a:prstGeom prst="ellipse">
-            <a:avLst/>
-          </a:prstGeom>
-        </p:spPr>
-        <p:style>
-          <a:lnRef idx="2">
-            <a:schemeClr val="accent1">
-              <a:shade val="15000"/>
-            </a:schemeClr>
-          </a:lnRef>
-          <a:fillRef idx="1">
-            <a:schemeClr val="accent1"/>
-          </a:fillRef>
-          <a:effectRef idx="0">
-            <a:schemeClr val="accent1"/>
-          </a:effectRef>
-          <a:fontRef idx="minor">
-            <a:schemeClr val="lt1"/>
-          </a:fontRef>
-        </p:style>
-        <p:txBody>
-          <a:bodyPr rtlCol="0" anchor="ctr"/>
-          <a:lstStyle/>
-          <a:p>
-            <a:pPr algn="ctr"/>
-            <a:r>
-              <a:rPr lang="en-US" dirty="0"/>
-              <a:t>2</a:t>
-            </a:r>
-          </a:p>
-        </p:txBody>
-      </p:sp>
-      <p:sp>
-        <p:nvSpPr>
-          <p:cNvPr id="29" name="TextBox 28">
-            <a:extLst>
-              <a:ext uri="{FF2B5EF4-FFF2-40B4-BE49-F238E27FC236}">
-                <a16:creationId xmlns:a16="http://schemas.microsoft.com/office/drawing/2014/main" id="{9D115F54-FFF3-F1FB-9474-0D1E98D17DB3}"/>
-              </a:ext>
-            </a:extLst>
-          </p:cNvPr>
-          <p:cNvSpPr txBox="1"/>
-          <p:nvPr/>
-        </p:nvSpPr>
-        <p:spPr>
-          <a:xfrm>
-            <a:off x="9977480" y="6507664"/>
-            <a:ext cx="1623318" cy="307777"/>
-          </a:xfrm>
-          <a:prstGeom prst="rect">
-            <a:avLst/>
-          </a:prstGeom>
-          <a:noFill/>
-        </p:spPr>
-        <p:txBody>
-          <a:bodyPr wrap="square" rtlCol="0">
-            <a:spAutoFit/>
-          </a:bodyPr>
-          <a:lstStyle/>
-          <a:p>
-            <a:pPr algn="ctr"/>
-            <a:r>
-              <a:rPr lang="en-US" sz="1400" dirty="0"/>
-              <a:t>Cannot inherit</a:t>
-            </a:r>
-          </a:p>
-        </p:txBody>
-      </p:sp>
-      <p:sp>
-        <p:nvSpPr>
-          <p:cNvPr id="30" name="TextBox 29">
-            <a:extLst>
-              <a:ext uri="{FF2B5EF4-FFF2-40B4-BE49-F238E27FC236}">
-                <a16:creationId xmlns:a16="http://schemas.microsoft.com/office/drawing/2014/main" id="{1425159A-EDD6-74AB-A389-1ED3560A79F5}"/>
-              </a:ext>
-            </a:extLst>
-          </p:cNvPr>
-          <p:cNvSpPr txBox="1"/>
-          <p:nvPr/>
-        </p:nvSpPr>
-        <p:spPr>
-          <a:xfrm>
-            <a:off x="8720791" y="1739693"/>
-            <a:ext cx="1623318" cy="307777"/>
-          </a:xfrm>
-          <a:prstGeom prst="rect">
-            <a:avLst/>
-          </a:prstGeom>
-          <a:noFill/>
-        </p:spPr>
-        <p:txBody>
-          <a:bodyPr wrap="square" rtlCol="0">
-            <a:spAutoFit/>
-          </a:bodyPr>
-          <a:lstStyle/>
-          <a:p>
-            <a:pPr algn="ctr"/>
-            <a:r>
-              <a:rPr lang="en-US" sz="1400" dirty="0"/>
-              <a:t>Can  inherit</a:t>
+              <a:t>Recommendation</a:t>
             </a:r>
           </a:p>
         </p:txBody>
@@ -5982,7 +5131,7 @@
           <p:cNvPr id="3" name="Slide Number Placeholder 2">
             <a:extLst>
               <a:ext uri="{FF2B5EF4-FFF2-40B4-BE49-F238E27FC236}">
-                <a16:creationId xmlns:a16="http://schemas.microsoft.com/office/drawing/2014/main" id="{3582FC77-6A46-E2DE-9D6A-A717E3259DFB}"/>
+                <a16:creationId xmlns:a16="http://schemas.microsoft.com/office/drawing/2014/main" id="{CEF38F97-C294-632E-FD05-A5A19DE454DC}"/>
               </a:ext>
             </a:extLst>
           </p:cNvPr>
@@ -6009,7 +5158,7 @@
     </p:spTree>
     <p:extLst>
       <p:ext uri="{BB962C8B-B14F-4D97-AF65-F5344CB8AC3E}">
-        <p14:creationId xmlns:p14="http://schemas.microsoft.com/office/powerpoint/2010/main" val="40197265"/>
+        <p14:creationId xmlns:p14="http://schemas.microsoft.com/office/powerpoint/2010/main" val="3049210581"/>
       </p:ext>
     </p:extLst>
   </p:cSld>
@@ -6041,7 +5190,7 @@
           <p:cNvPr id="4" name="Title 3">
             <a:extLst>
               <a:ext uri="{FF2B5EF4-FFF2-40B4-BE49-F238E27FC236}">
-                <a16:creationId xmlns:a16="http://schemas.microsoft.com/office/drawing/2014/main" id="{BB2BD00F-8EA4-14C5-BD5F-97F9AD513213}"/>
+                <a16:creationId xmlns:a16="http://schemas.microsoft.com/office/drawing/2014/main" id="{0D0E3244-86CC-ED51-EFBC-B4D48F99AEED}"/>
               </a:ext>
             </a:extLst>
           </p:cNvPr>
@@ -6049,7 +5198,7 @@
             <a:spLocks noGrp="1"/>
           </p:cNvSpPr>
           <p:nvPr>
-            <p:ph type="ctrTitle"/>
+            <p:ph type="title"/>
           </p:nvPr>
         </p:nvSpPr>
         <p:spPr/>
@@ -6059,7 +5208,979 @@
           <a:p>
             <a:r>
               <a:rPr lang="en-US" dirty="0"/>
-              <a:t>Testing of List Behavior</a:t>
+              <a:t>Guidance: Design of layouts for lists: Primary and Secondary Options</a:t>
+            </a:r>
+          </a:p>
+        </p:txBody>
+      </p:sp>
+      <p:sp>
+        <p:nvSpPr>
+          <p:cNvPr id="2" name="Rectangle 1">
+            <a:extLst>
+              <a:ext uri="{FF2B5EF4-FFF2-40B4-BE49-F238E27FC236}">
+                <a16:creationId xmlns:a16="http://schemas.microsoft.com/office/drawing/2014/main" id="{E3FD8DAD-0002-ECA3-09EE-39011DED416A}"/>
+              </a:ext>
+            </a:extLst>
+          </p:cNvPr>
+          <p:cNvSpPr/>
+          <p:nvPr/>
+        </p:nvSpPr>
+        <p:spPr>
+          <a:xfrm>
+            <a:off x="838200" y="3287730"/>
+            <a:ext cx="2178121" cy="598470"/>
+          </a:xfrm>
+          <a:prstGeom prst="rect">
+            <a:avLst/>
+          </a:prstGeom>
+        </p:spPr>
+        <p:style>
+          <a:lnRef idx="2">
+            <a:schemeClr val="accent1">
+              <a:shade val="15000"/>
+            </a:schemeClr>
+          </a:lnRef>
+          <a:fillRef idx="1">
+            <a:schemeClr val="accent1"/>
+          </a:fillRef>
+          <a:effectRef idx="0">
+            <a:schemeClr val="accent1"/>
+          </a:effectRef>
+          <a:fontRef idx="minor">
+            <a:schemeClr val="lt1"/>
+          </a:fontRef>
+        </p:style>
+        <p:txBody>
+          <a:bodyPr rtlCol="0" anchor="ctr"/>
+          <a:lstStyle/>
+          <a:p>
+            <a:pPr algn="ctr"/>
+            <a:r>
+              <a:rPr lang="en-US" dirty="0"/>
+              <a:t>Content layout</a:t>
+            </a:r>
+          </a:p>
+        </p:txBody>
+      </p:sp>
+      <p:sp>
+        <p:nvSpPr>
+          <p:cNvPr id="5" name="Rectangle 4">
+            <a:extLst>
+              <a:ext uri="{FF2B5EF4-FFF2-40B4-BE49-F238E27FC236}">
+                <a16:creationId xmlns:a16="http://schemas.microsoft.com/office/drawing/2014/main" id="{33C18229-8A3D-70BE-2A35-F0C7FEEA4BBD}"/>
+              </a:ext>
+            </a:extLst>
+          </p:cNvPr>
+          <p:cNvSpPr/>
+          <p:nvPr/>
+        </p:nvSpPr>
+        <p:spPr>
+          <a:xfrm>
+            <a:off x="4177301" y="2178122"/>
+            <a:ext cx="3076254" cy="598470"/>
+          </a:xfrm>
+          <a:prstGeom prst="rect">
+            <a:avLst/>
+          </a:prstGeom>
+        </p:spPr>
+        <p:style>
+          <a:lnRef idx="2">
+            <a:schemeClr val="accent1">
+              <a:shade val="15000"/>
+            </a:schemeClr>
+          </a:lnRef>
+          <a:fillRef idx="1">
+            <a:schemeClr val="accent1"/>
+          </a:fillRef>
+          <a:effectRef idx="0">
+            <a:schemeClr val="accent1"/>
+          </a:effectRef>
+          <a:fontRef idx="minor">
+            <a:schemeClr val="lt1"/>
+          </a:fontRef>
+        </p:style>
+        <p:txBody>
+          <a:bodyPr rtlCol="0" anchor="ctr"/>
+          <a:lstStyle/>
+          <a:p>
+            <a:pPr algn="ctr"/>
+            <a:r>
+              <a:rPr lang="en-US" dirty="0"/>
+              <a:t>Content with 1 list</a:t>
+            </a:r>
+          </a:p>
+        </p:txBody>
+      </p:sp>
+      <p:sp>
+        <p:nvSpPr>
+          <p:cNvPr id="6" name="Rectangle 5">
+            <a:extLst>
+              <a:ext uri="{FF2B5EF4-FFF2-40B4-BE49-F238E27FC236}">
+                <a16:creationId xmlns:a16="http://schemas.microsoft.com/office/drawing/2014/main" id="{9981450D-B959-E60E-143A-F8792FAFE4BF}"/>
+              </a:ext>
+            </a:extLst>
+          </p:cNvPr>
+          <p:cNvSpPr/>
+          <p:nvPr/>
+        </p:nvSpPr>
+        <p:spPr>
+          <a:xfrm>
+            <a:off x="4177301" y="3129765"/>
+            <a:ext cx="3076254" cy="598470"/>
+          </a:xfrm>
+          <a:prstGeom prst="rect">
+            <a:avLst/>
+          </a:prstGeom>
+        </p:spPr>
+        <p:style>
+          <a:lnRef idx="2">
+            <a:schemeClr val="accent1">
+              <a:shade val="15000"/>
+            </a:schemeClr>
+          </a:lnRef>
+          <a:fillRef idx="1">
+            <a:schemeClr val="accent1"/>
+          </a:fillRef>
+          <a:effectRef idx="0">
+            <a:schemeClr val="accent1"/>
+          </a:effectRef>
+          <a:fontRef idx="minor">
+            <a:schemeClr val="lt1"/>
+          </a:fontRef>
+        </p:style>
+        <p:txBody>
+          <a:bodyPr rtlCol="0" anchor="ctr"/>
+          <a:lstStyle/>
+          <a:p>
+            <a:pPr algn="ctr"/>
+            <a:r>
+              <a:rPr lang="en-US" dirty="0"/>
+              <a:t>Content with 2 lists</a:t>
+            </a:r>
+          </a:p>
+        </p:txBody>
+      </p:sp>
+      <p:sp>
+        <p:nvSpPr>
+          <p:cNvPr id="7" name="Rectangle 6">
+            <a:extLst>
+              <a:ext uri="{FF2B5EF4-FFF2-40B4-BE49-F238E27FC236}">
+                <a16:creationId xmlns:a16="http://schemas.microsoft.com/office/drawing/2014/main" id="{5808AFAA-5EAC-2DDF-404E-CAF6D6D0A228}"/>
+              </a:ext>
+            </a:extLst>
+          </p:cNvPr>
+          <p:cNvSpPr/>
+          <p:nvPr/>
+        </p:nvSpPr>
+        <p:spPr>
+          <a:xfrm>
+            <a:off x="4177301" y="4081408"/>
+            <a:ext cx="3076254" cy="598470"/>
+          </a:xfrm>
+          <a:prstGeom prst="rect">
+            <a:avLst/>
+          </a:prstGeom>
+        </p:spPr>
+        <p:style>
+          <a:lnRef idx="2">
+            <a:schemeClr val="accent1">
+              <a:shade val="15000"/>
+            </a:schemeClr>
+          </a:lnRef>
+          <a:fillRef idx="1">
+            <a:schemeClr val="accent1"/>
+          </a:fillRef>
+          <a:effectRef idx="0">
+            <a:schemeClr val="accent1"/>
+          </a:effectRef>
+          <a:fontRef idx="minor">
+            <a:schemeClr val="lt1"/>
+          </a:fontRef>
+        </p:style>
+        <p:txBody>
+          <a:bodyPr rtlCol="0" anchor="ctr"/>
+          <a:lstStyle/>
+          <a:p>
+            <a:pPr algn="ctr"/>
+            <a:r>
+              <a:rPr lang="en-US" dirty="0"/>
+              <a:t>Content with 3 lists</a:t>
+            </a:r>
+          </a:p>
+        </p:txBody>
+      </p:sp>
+      <p:cxnSp>
+        <p:nvCxnSpPr>
+          <p:cNvPr id="9" name="Straight Arrow Connector 8">
+            <a:extLst>
+              <a:ext uri="{FF2B5EF4-FFF2-40B4-BE49-F238E27FC236}">
+                <a16:creationId xmlns:a16="http://schemas.microsoft.com/office/drawing/2014/main" id="{C4488C34-9066-A344-56BF-341A1C546668}"/>
+              </a:ext>
+            </a:extLst>
+          </p:cNvPr>
+          <p:cNvCxnSpPr>
+            <a:stCxn id="2" idx="3"/>
+            <a:endCxn id="5" idx="1"/>
+          </p:cNvCxnSpPr>
+          <p:nvPr/>
+        </p:nvCxnSpPr>
+        <p:spPr>
+          <a:xfrm flipV="1">
+            <a:off x="3016321" y="2477357"/>
+            <a:ext cx="1160980" cy="1109608"/>
+          </a:xfrm>
+          <a:prstGeom prst="straightConnector1">
+            <a:avLst/>
+          </a:prstGeom>
+          <a:ln>
+            <a:tailEnd type="triangle"/>
+          </a:ln>
+        </p:spPr>
+        <p:style>
+          <a:lnRef idx="2">
+            <a:schemeClr val="accent1"/>
+          </a:lnRef>
+          <a:fillRef idx="0">
+            <a:schemeClr val="accent1"/>
+          </a:fillRef>
+          <a:effectRef idx="1">
+            <a:schemeClr val="accent1"/>
+          </a:effectRef>
+          <a:fontRef idx="minor">
+            <a:schemeClr val="tx1"/>
+          </a:fontRef>
+        </p:style>
+      </p:cxnSp>
+      <p:cxnSp>
+        <p:nvCxnSpPr>
+          <p:cNvPr id="10" name="Straight Arrow Connector 9">
+            <a:extLst>
+              <a:ext uri="{FF2B5EF4-FFF2-40B4-BE49-F238E27FC236}">
+                <a16:creationId xmlns:a16="http://schemas.microsoft.com/office/drawing/2014/main" id="{BA56CA6B-ACBB-7034-F921-F66C40A2938E}"/>
+              </a:ext>
+            </a:extLst>
+          </p:cNvPr>
+          <p:cNvCxnSpPr>
+            <a:cxnSpLocks/>
+            <a:stCxn id="2" idx="3"/>
+            <a:endCxn id="6" idx="1"/>
+          </p:cNvCxnSpPr>
+          <p:nvPr/>
+        </p:nvCxnSpPr>
+        <p:spPr>
+          <a:xfrm flipV="1">
+            <a:off x="3016321" y="3429000"/>
+            <a:ext cx="1160980" cy="157965"/>
+          </a:xfrm>
+          <a:prstGeom prst="straightConnector1">
+            <a:avLst/>
+          </a:prstGeom>
+          <a:ln>
+            <a:tailEnd type="triangle"/>
+          </a:ln>
+        </p:spPr>
+        <p:style>
+          <a:lnRef idx="2">
+            <a:schemeClr val="accent1"/>
+          </a:lnRef>
+          <a:fillRef idx="0">
+            <a:schemeClr val="accent1"/>
+          </a:fillRef>
+          <a:effectRef idx="1">
+            <a:schemeClr val="accent1"/>
+          </a:effectRef>
+          <a:fontRef idx="minor">
+            <a:schemeClr val="tx1"/>
+          </a:fontRef>
+        </p:style>
+      </p:cxnSp>
+      <p:cxnSp>
+        <p:nvCxnSpPr>
+          <p:cNvPr id="11" name="Straight Arrow Connector 10">
+            <a:extLst>
+              <a:ext uri="{FF2B5EF4-FFF2-40B4-BE49-F238E27FC236}">
+                <a16:creationId xmlns:a16="http://schemas.microsoft.com/office/drawing/2014/main" id="{26DA93C0-B104-55E9-ED99-3DEB304A22B7}"/>
+              </a:ext>
+            </a:extLst>
+          </p:cNvPr>
+          <p:cNvCxnSpPr>
+            <a:cxnSpLocks/>
+            <a:stCxn id="2" idx="3"/>
+            <a:endCxn id="7" idx="1"/>
+          </p:cNvCxnSpPr>
+          <p:nvPr/>
+        </p:nvCxnSpPr>
+        <p:spPr>
+          <a:xfrm>
+            <a:off x="3016321" y="3586965"/>
+            <a:ext cx="1160980" cy="793678"/>
+          </a:xfrm>
+          <a:prstGeom prst="straightConnector1">
+            <a:avLst/>
+          </a:prstGeom>
+          <a:ln>
+            <a:tailEnd type="triangle"/>
+          </a:ln>
+        </p:spPr>
+        <p:style>
+          <a:lnRef idx="2">
+            <a:schemeClr val="accent1"/>
+          </a:lnRef>
+          <a:fillRef idx="0">
+            <a:schemeClr val="accent1"/>
+          </a:fillRef>
+          <a:effectRef idx="1">
+            <a:schemeClr val="accent1"/>
+          </a:effectRef>
+          <a:fontRef idx="minor">
+            <a:schemeClr val="tx1"/>
+          </a:fontRef>
+        </p:style>
+      </p:cxnSp>
+      <p:sp>
+        <p:nvSpPr>
+          <p:cNvPr id="16" name="Rectangle 15">
+            <a:extLst>
+              <a:ext uri="{FF2B5EF4-FFF2-40B4-BE49-F238E27FC236}">
+                <a16:creationId xmlns:a16="http://schemas.microsoft.com/office/drawing/2014/main" id="{AB59A247-3607-4956-8E77-3B98E50E9EA4}"/>
+              </a:ext>
+            </a:extLst>
+          </p:cNvPr>
+          <p:cNvSpPr/>
+          <p:nvPr/>
+        </p:nvSpPr>
+        <p:spPr>
+          <a:xfrm>
+            <a:off x="8126857" y="2178122"/>
+            <a:ext cx="2373330" cy="2501756"/>
+          </a:xfrm>
+          <a:prstGeom prst="rect">
+            <a:avLst/>
+          </a:prstGeom>
+        </p:spPr>
+        <p:style>
+          <a:lnRef idx="2">
+            <a:schemeClr val="accent1">
+              <a:shade val="15000"/>
+            </a:schemeClr>
+          </a:lnRef>
+          <a:fillRef idx="1">
+            <a:schemeClr val="accent1"/>
+          </a:fillRef>
+          <a:effectRef idx="0">
+            <a:schemeClr val="accent1"/>
+          </a:effectRef>
+          <a:fontRef idx="minor">
+            <a:schemeClr val="lt1"/>
+          </a:fontRef>
+        </p:style>
+        <p:txBody>
+          <a:bodyPr rtlCol="0" anchor="ctr"/>
+          <a:lstStyle/>
+          <a:p>
+            <a:pPr algn="ctr"/>
+            <a:r>
+              <a:rPr lang="en-US" dirty="0"/>
+              <a:t>Have pages use one of these layouts</a:t>
+            </a:r>
+          </a:p>
+        </p:txBody>
+      </p:sp>
+      <p:sp>
+        <p:nvSpPr>
+          <p:cNvPr id="17" name="Rectangle 16">
+            <a:extLst>
+              <a:ext uri="{FF2B5EF4-FFF2-40B4-BE49-F238E27FC236}">
+                <a16:creationId xmlns:a16="http://schemas.microsoft.com/office/drawing/2014/main" id="{E514C8F5-57FB-FE2C-50C3-2CBEB6754C11}"/>
+              </a:ext>
+            </a:extLst>
+          </p:cNvPr>
+          <p:cNvSpPr/>
+          <p:nvPr/>
+        </p:nvSpPr>
+        <p:spPr>
+          <a:xfrm>
+            <a:off x="4331412" y="5656077"/>
+            <a:ext cx="3076253" cy="598471"/>
+          </a:xfrm>
+          <a:prstGeom prst="rect">
+            <a:avLst/>
+          </a:prstGeom>
+          <a:solidFill>
+            <a:schemeClr val="accent2">
+              <a:lumMod val="40000"/>
+              <a:lumOff val="60000"/>
+            </a:schemeClr>
+          </a:solidFill>
+        </p:spPr>
+        <p:style>
+          <a:lnRef idx="2">
+            <a:schemeClr val="accent1">
+              <a:shade val="15000"/>
+            </a:schemeClr>
+          </a:lnRef>
+          <a:fillRef idx="1">
+            <a:schemeClr val="accent1"/>
+          </a:fillRef>
+          <a:effectRef idx="0">
+            <a:schemeClr val="accent1"/>
+          </a:effectRef>
+          <a:fontRef idx="minor">
+            <a:schemeClr val="lt1"/>
+          </a:fontRef>
+        </p:style>
+        <p:txBody>
+          <a:bodyPr rtlCol="0" anchor="ctr"/>
+          <a:lstStyle/>
+          <a:p>
+            <a:pPr algn="ctr"/>
+            <a:r>
+              <a:rPr lang="en-US" dirty="0"/>
+              <a:t>Style these lists in layouts</a:t>
+            </a:r>
+          </a:p>
+        </p:txBody>
+      </p:sp>
+      <p:sp>
+        <p:nvSpPr>
+          <p:cNvPr id="18" name="Arrow: Right 17">
+            <a:extLst>
+              <a:ext uri="{FF2B5EF4-FFF2-40B4-BE49-F238E27FC236}">
+                <a16:creationId xmlns:a16="http://schemas.microsoft.com/office/drawing/2014/main" id="{3A8F7476-91DF-958F-45A1-938C566FA686}"/>
+              </a:ext>
+            </a:extLst>
+          </p:cNvPr>
+          <p:cNvSpPr/>
+          <p:nvPr/>
+        </p:nvSpPr>
+        <p:spPr>
+          <a:xfrm>
+            <a:off x="7417941" y="3443769"/>
+            <a:ext cx="544530" cy="157965"/>
+          </a:xfrm>
+          <a:prstGeom prst="rightArrow">
+            <a:avLst/>
+          </a:prstGeom>
+        </p:spPr>
+        <p:style>
+          <a:lnRef idx="2">
+            <a:schemeClr val="accent1">
+              <a:shade val="15000"/>
+            </a:schemeClr>
+          </a:lnRef>
+          <a:fillRef idx="1">
+            <a:schemeClr val="accent1"/>
+          </a:fillRef>
+          <a:effectRef idx="0">
+            <a:schemeClr val="accent1"/>
+          </a:effectRef>
+          <a:fontRef idx="minor">
+            <a:schemeClr val="lt1"/>
+          </a:fontRef>
+        </p:style>
+        <p:txBody>
+          <a:bodyPr rtlCol="0" anchor="ctr"/>
+          <a:lstStyle/>
+          <a:p>
+            <a:pPr algn="ctr"/>
+            <a:endParaRPr lang="en-US"/>
+          </a:p>
+        </p:txBody>
+      </p:sp>
+      <p:sp>
+        <p:nvSpPr>
+          <p:cNvPr id="20" name="Arrow: Right 19">
+            <a:extLst>
+              <a:ext uri="{FF2B5EF4-FFF2-40B4-BE49-F238E27FC236}">
+                <a16:creationId xmlns:a16="http://schemas.microsoft.com/office/drawing/2014/main" id="{C56A7452-0D4C-075E-53ED-81D6C02A8CF5}"/>
+              </a:ext>
+            </a:extLst>
+          </p:cNvPr>
+          <p:cNvSpPr/>
+          <p:nvPr/>
+        </p:nvSpPr>
+        <p:spPr>
+          <a:xfrm rot="16200000">
+            <a:off x="5551470" y="5169828"/>
+            <a:ext cx="544530" cy="157965"/>
+          </a:xfrm>
+          <a:prstGeom prst="rightArrow">
+            <a:avLst/>
+          </a:prstGeom>
+        </p:spPr>
+        <p:style>
+          <a:lnRef idx="2">
+            <a:schemeClr val="accent1">
+              <a:shade val="15000"/>
+            </a:schemeClr>
+          </a:lnRef>
+          <a:fillRef idx="1">
+            <a:schemeClr val="accent1"/>
+          </a:fillRef>
+          <a:effectRef idx="0">
+            <a:schemeClr val="accent1"/>
+          </a:effectRef>
+          <a:fontRef idx="minor">
+            <a:schemeClr val="lt1"/>
+          </a:fontRef>
+        </p:style>
+        <p:txBody>
+          <a:bodyPr rtlCol="0" anchor="ctr"/>
+          <a:lstStyle/>
+          <a:p>
+            <a:pPr algn="ctr"/>
+            <a:endParaRPr lang="en-US"/>
+          </a:p>
+        </p:txBody>
+      </p:sp>
+      <p:sp>
+        <p:nvSpPr>
+          <p:cNvPr id="21" name="Rectangle 20">
+            <a:extLst>
+              <a:ext uri="{FF2B5EF4-FFF2-40B4-BE49-F238E27FC236}">
+                <a16:creationId xmlns:a16="http://schemas.microsoft.com/office/drawing/2014/main" id="{A67762C6-D034-1E53-C7F0-227931945664}"/>
+              </a:ext>
+            </a:extLst>
+          </p:cNvPr>
+          <p:cNvSpPr/>
+          <p:nvPr/>
+        </p:nvSpPr>
+        <p:spPr>
+          <a:xfrm>
+            <a:off x="3123344" y="918102"/>
+            <a:ext cx="5589141" cy="598471"/>
+          </a:xfrm>
+          <a:prstGeom prst="rect">
+            <a:avLst/>
+          </a:prstGeom>
+          <a:solidFill>
+            <a:schemeClr val="accent2">
+              <a:lumMod val="40000"/>
+              <a:lumOff val="60000"/>
+            </a:schemeClr>
+          </a:solidFill>
+        </p:spPr>
+        <p:style>
+          <a:lnRef idx="2">
+            <a:schemeClr val="accent1">
+              <a:shade val="15000"/>
+            </a:schemeClr>
+          </a:lnRef>
+          <a:fillRef idx="1">
+            <a:schemeClr val="accent1"/>
+          </a:fillRef>
+          <a:effectRef idx="0">
+            <a:schemeClr val="accent1"/>
+          </a:effectRef>
+          <a:fontRef idx="minor">
+            <a:schemeClr val="lt1"/>
+          </a:fontRef>
+        </p:style>
+        <p:txBody>
+          <a:bodyPr rtlCol="0" anchor="ctr"/>
+          <a:lstStyle/>
+          <a:p>
+            <a:pPr algn="ctr"/>
+            <a:r>
+              <a:rPr lang="en-US" dirty="0"/>
+              <a:t>3 sister layout pages</a:t>
+            </a:r>
+          </a:p>
+          <a:p>
+            <a:pPr algn="ctr"/>
+            <a:r>
+              <a:rPr lang="en-US" dirty="0"/>
+              <a:t>Extending a common content layout</a:t>
+            </a:r>
+          </a:p>
+        </p:txBody>
+      </p:sp>
+      <p:sp>
+        <p:nvSpPr>
+          <p:cNvPr id="22" name="Arrow: Right 21">
+            <a:extLst>
+              <a:ext uri="{FF2B5EF4-FFF2-40B4-BE49-F238E27FC236}">
+                <a16:creationId xmlns:a16="http://schemas.microsoft.com/office/drawing/2014/main" id="{EC446D1D-7238-1613-0ED0-E8156796659B}"/>
+              </a:ext>
+            </a:extLst>
+          </p:cNvPr>
+          <p:cNvSpPr/>
+          <p:nvPr/>
+        </p:nvSpPr>
+        <p:spPr>
+          <a:xfrm rot="5400000">
+            <a:off x="5522145" y="1775847"/>
+            <a:ext cx="544530" cy="157965"/>
+          </a:xfrm>
+          <a:prstGeom prst="rightArrow">
+            <a:avLst/>
+          </a:prstGeom>
+        </p:spPr>
+        <p:style>
+          <a:lnRef idx="2">
+            <a:schemeClr val="accent1">
+              <a:shade val="15000"/>
+            </a:schemeClr>
+          </a:lnRef>
+          <a:fillRef idx="1">
+            <a:schemeClr val="accent1"/>
+          </a:fillRef>
+          <a:effectRef idx="0">
+            <a:schemeClr val="accent1"/>
+          </a:effectRef>
+          <a:fontRef idx="minor">
+            <a:schemeClr val="lt1"/>
+          </a:fontRef>
+        </p:style>
+        <p:txBody>
+          <a:bodyPr rtlCol="0" anchor="ctr"/>
+          <a:lstStyle/>
+          <a:p>
+            <a:pPr algn="ctr"/>
+            <a:endParaRPr lang="en-US"/>
+          </a:p>
+        </p:txBody>
+      </p:sp>
+      <p:sp>
+        <p:nvSpPr>
+          <p:cNvPr id="23" name="Rectangle 22">
+            <a:extLst>
+              <a:ext uri="{FF2B5EF4-FFF2-40B4-BE49-F238E27FC236}">
+                <a16:creationId xmlns:a16="http://schemas.microsoft.com/office/drawing/2014/main" id="{79C1BF21-E7A3-41D3-0637-41A5859286BE}"/>
+              </a:ext>
+            </a:extLst>
+          </p:cNvPr>
+          <p:cNvSpPr/>
+          <p:nvPr/>
+        </p:nvSpPr>
+        <p:spPr>
+          <a:xfrm>
+            <a:off x="678096" y="4976545"/>
+            <a:ext cx="2100210" cy="1276715"/>
+          </a:xfrm>
+          <a:prstGeom prst="rect">
+            <a:avLst/>
+          </a:prstGeom>
+          <a:solidFill>
+            <a:schemeClr val="accent2"/>
+          </a:solidFill>
+        </p:spPr>
+        <p:style>
+          <a:lnRef idx="2">
+            <a:schemeClr val="accent1">
+              <a:shade val="15000"/>
+            </a:schemeClr>
+          </a:lnRef>
+          <a:fillRef idx="1">
+            <a:schemeClr val="accent1"/>
+          </a:fillRef>
+          <a:effectRef idx="0">
+            <a:schemeClr val="accent1"/>
+          </a:effectRef>
+          <a:fontRef idx="minor">
+            <a:schemeClr val="lt1"/>
+          </a:fontRef>
+        </p:style>
+        <p:txBody>
+          <a:bodyPr rtlCol="0" anchor="ctr"/>
+          <a:lstStyle/>
+          <a:p>
+            <a:pPr algn="ctr"/>
+            <a:r>
+              <a:rPr lang="en-US" dirty="0"/>
+              <a:t>Style:</a:t>
+            </a:r>
+          </a:p>
+          <a:p>
+            <a:pPr marL="342900" indent="-342900" algn="ctr">
+              <a:buAutoNum type="arabicPeriod"/>
+            </a:pPr>
+            <a:r>
+              <a:rPr lang="en-US" dirty="0"/>
+              <a:t>Spacing</a:t>
+            </a:r>
+          </a:p>
+          <a:p>
+            <a:pPr marL="342900" indent="-342900" algn="ctr">
+              <a:buAutoNum type="arabicPeriod"/>
+            </a:pPr>
+            <a:r>
+              <a:rPr lang="en-US" dirty="0"/>
+              <a:t>Fonts</a:t>
+            </a:r>
+          </a:p>
+          <a:p>
+            <a:pPr marL="342900" indent="-342900" algn="ctr">
+              <a:buAutoNum type="arabicPeriod"/>
+            </a:pPr>
+            <a:r>
+              <a:rPr lang="en-US" dirty="0"/>
+              <a:t>Color</a:t>
+            </a:r>
+          </a:p>
+        </p:txBody>
+      </p:sp>
+      <p:cxnSp>
+        <p:nvCxnSpPr>
+          <p:cNvPr id="25" name="Straight Arrow Connector 24">
+            <a:extLst>
+              <a:ext uri="{FF2B5EF4-FFF2-40B4-BE49-F238E27FC236}">
+                <a16:creationId xmlns:a16="http://schemas.microsoft.com/office/drawing/2014/main" id="{F4165BCF-6E50-67E2-6D43-0DA32C926803}"/>
+              </a:ext>
+            </a:extLst>
+          </p:cNvPr>
+          <p:cNvCxnSpPr>
+            <a:stCxn id="23" idx="0"/>
+          </p:cNvCxnSpPr>
+          <p:nvPr/>
+        </p:nvCxnSpPr>
+        <p:spPr>
+          <a:xfrm flipV="1">
+            <a:off x="1728201" y="4582274"/>
+            <a:ext cx="1590352" cy="394271"/>
+          </a:xfrm>
+          <a:prstGeom prst="straightConnector1">
+            <a:avLst/>
+          </a:prstGeom>
+          <a:ln>
+            <a:tailEnd type="triangle"/>
+          </a:ln>
+        </p:spPr>
+        <p:style>
+          <a:lnRef idx="2">
+            <a:schemeClr val="accent1"/>
+          </a:lnRef>
+          <a:fillRef idx="0">
+            <a:schemeClr val="accent1"/>
+          </a:fillRef>
+          <a:effectRef idx="1">
+            <a:schemeClr val="accent1"/>
+          </a:effectRef>
+          <a:fontRef idx="minor">
+            <a:schemeClr val="tx1"/>
+          </a:fontRef>
+        </p:style>
+      </p:cxnSp>
+      <p:sp>
+        <p:nvSpPr>
+          <p:cNvPr id="26" name="Rectangle 25">
+            <a:extLst>
+              <a:ext uri="{FF2B5EF4-FFF2-40B4-BE49-F238E27FC236}">
+                <a16:creationId xmlns:a16="http://schemas.microsoft.com/office/drawing/2014/main" id="{C446B378-D735-74B9-27A5-F2987FBE06B3}"/>
+              </a:ext>
+            </a:extLst>
+          </p:cNvPr>
+          <p:cNvSpPr/>
+          <p:nvPr/>
+        </p:nvSpPr>
+        <p:spPr>
+          <a:xfrm>
+            <a:off x="9851624" y="5212621"/>
+            <a:ext cx="1875031" cy="1276715"/>
+          </a:xfrm>
+          <a:prstGeom prst="rect">
+            <a:avLst/>
+          </a:prstGeom>
+          <a:ln w="28575">
+            <a:solidFill>
+              <a:srgbClr val="FF0000"/>
+            </a:solidFill>
+          </a:ln>
+        </p:spPr>
+        <p:style>
+          <a:lnRef idx="2">
+            <a:schemeClr val="accent1">
+              <a:shade val="15000"/>
+            </a:schemeClr>
+          </a:lnRef>
+          <a:fillRef idx="1">
+            <a:schemeClr val="accent1"/>
+          </a:fillRef>
+          <a:effectRef idx="0">
+            <a:schemeClr val="accent1"/>
+          </a:effectRef>
+          <a:fontRef idx="minor">
+            <a:schemeClr val="lt1"/>
+          </a:fontRef>
+        </p:style>
+        <p:txBody>
+          <a:bodyPr rtlCol="0" anchor="ctr"/>
+          <a:lstStyle/>
+          <a:p>
+            <a:pPr algn="ctr"/>
+            <a:r>
+              <a:rPr lang="en-US" dirty="0"/>
+              <a:t>A page with many “simple” text box lists to copy if needed</a:t>
+            </a:r>
+          </a:p>
+        </p:txBody>
+      </p:sp>
+      <p:sp>
+        <p:nvSpPr>
+          <p:cNvPr id="27" name="Oval 26">
+            <a:extLst>
+              <a:ext uri="{FF2B5EF4-FFF2-40B4-BE49-F238E27FC236}">
+                <a16:creationId xmlns:a16="http://schemas.microsoft.com/office/drawing/2014/main" id="{8C0E29F9-181C-34D4-2BB2-2A810C494312}"/>
+              </a:ext>
+            </a:extLst>
+          </p:cNvPr>
+          <p:cNvSpPr/>
+          <p:nvPr/>
+        </p:nvSpPr>
+        <p:spPr>
+          <a:xfrm>
+            <a:off x="3521722" y="4679878"/>
+            <a:ext cx="437857" cy="437857"/>
+          </a:xfrm>
+          <a:prstGeom prst="ellipse">
+            <a:avLst/>
+          </a:prstGeom>
+        </p:spPr>
+        <p:style>
+          <a:lnRef idx="2">
+            <a:schemeClr val="accent1">
+              <a:shade val="15000"/>
+            </a:schemeClr>
+          </a:lnRef>
+          <a:fillRef idx="1">
+            <a:schemeClr val="accent1"/>
+          </a:fillRef>
+          <a:effectRef idx="0">
+            <a:schemeClr val="accent1"/>
+          </a:effectRef>
+          <a:fontRef idx="minor">
+            <a:schemeClr val="lt1"/>
+          </a:fontRef>
+        </p:style>
+        <p:txBody>
+          <a:bodyPr rtlCol="0" anchor="ctr"/>
+          <a:lstStyle/>
+          <a:p>
+            <a:pPr algn="ctr"/>
+            <a:r>
+              <a:rPr lang="en-US" dirty="0"/>
+              <a:t>1</a:t>
+            </a:r>
+          </a:p>
+        </p:txBody>
+      </p:sp>
+      <p:sp>
+        <p:nvSpPr>
+          <p:cNvPr id="28" name="Oval 27">
+            <a:extLst>
+              <a:ext uri="{FF2B5EF4-FFF2-40B4-BE49-F238E27FC236}">
+                <a16:creationId xmlns:a16="http://schemas.microsoft.com/office/drawing/2014/main" id="{CDE95F12-2811-FBBD-9B88-367040C995AD}"/>
+              </a:ext>
+            </a:extLst>
+          </p:cNvPr>
+          <p:cNvSpPr/>
+          <p:nvPr/>
+        </p:nvSpPr>
+        <p:spPr>
+          <a:xfrm>
+            <a:off x="9313522" y="5677830"/>
+            <a:ext cx="437857" cy="437857"/>
+          </a:xfrm>
+          <a:prstGeom prst="ellipse">
+            <a:avLst/>
+          </a:prstGeom>
+        </p:spPr>
+        <p:style>
+          <a:lnRef idx="2">
+            <a:schemeClr val="accent1">
+              <a:shade val="15000"/>
+            </a:schemeClr>
+          </a:lnRef>
+          <a:fillRef idx="1">
+            <a:schemeClr val="accent1"/>
+          </a:fillRef>
+          <a:effectRef idx="0">
+            <a:schemeClr val="accent1"/>
+          </a:effectRef>
+          <a:fontRef idx="minor">
+            <a:schemeClr val="lt1"/>
+          </a:fontRef>
+        </p:style>
+        <p:txBody>
+          <a:bodyPr rtlCol="0" anchor="ctr"/>
+          <a:lstStyle/>
+          <a:p>
+            <a:pPr algn="ctr"/>
+            <a:r>
+              <a:rPr lang="en-US" dirty="0"/>
+              <a:t>2</a:t>
+            </a:r>
+          </a:p>
+        </p:txBody>
+      </p:sp>
+      <p:sp>
+        <p:nvSpPr>
+          <p:cNvPr id="29" name="TextBox 28">
+            <a:extLst>
+              <a:ext uri="{FF2B5EF4-FFF2-40B4-BE49-F238E27FC236}">
+                <a16:creationId xmlns:a16="http://schemas.microsoft.com/office/drawing/2014/main" id="{9D115F54-FFF3-F1FB-9474-0D1E98D17DB3}"/>
+              </a:ext>
+            </a:extLst>
+          </p:cNvPr>
+          <p:cNvSpPr txBox="1"/>
+          <p:nvPr/>
+        </p:nvSpPr>
+        <p:spPr>
+          <a:xfrm>
+            <a:off x="9977480" y="6507664"/>
+            <a:ext cx="1623318" cy="307777"/>
+          </a:xfrm>
+          <a:prstGeom prst="rect">
+            <a:avLst/>
+          </a:prstGeom>
+          <a:noFill/>
+        </p:spPr>
+        <p:txBody>
+          <a:bodyPr wrap="square" rtlCol="0">
+            <a:spAutoFit/>
+          </a:bodyPr>
+          <a:lstStyle/>
+          <a:p>
+            <a:pPr algn="ctr"/>
+            <a:r>
+              <a:rPr lang="en-US" sz="1400" dirty="0"/>
+              <a:t>Cannot inherit</a:t>
+            </a:r>
+          </a:p>
+        </p:txBody>
+      </p:sp>
+      <p:sp>
+        <p:nvSpPr>
+          <p:cNvPr id="30" name="TextBox 29">
+            <a:extLst>
+              <a:ext uri="{FF2B5EF4-FFF2-40B4-BE49-F238E27FC236}">
+                <a16:creationId xmlns:a16="http://schemas.microsoft.com/office/drawing/2014/main" id="{1425159A-EDD6-74AB-A389-1ED3560A79F5}"/>
+              </a:ext>
+            </a:extLst>
+          </p:cNvPr>
+          <p:cNvSpPr txBox="1"/>
+          <p:nvPr/>
+        </p:nvSpPr>
+        <p:spPr>
+          <a:xfrm>
+            <a:off x="8720791" y="1739693"/>
+            <a:ext cx="1623318" cy="307777"/>
+          </a:xfrm>
+          <a:prstGeom prst="rect">
+            <a:avLst/>
+          </a:prstGeom>
+          <a:noFill/>
+        </p:spPr>
+        <p:txBody>
+          <a:bodyPr wrap="square" rtlCol="0">
+            <a:spAutoFit/>
+          </a:bodyPr>
+          <a:lstStyle/>
+          <a:p>
+            <a:pPr algn="ctr"/>
+            <a:r>
+              <a:rPr lang="en-US" sz="1400" dirty="0"/>
+              <a:t>Can  inherit</a:t>
             </a:r>
           </a:p>
         </p:txBody>
@@ -6069,7 +6190,7 @@
           <p:cNvPr id="3" name="Slide Number Placeholder 2">
             <a:extLst>
               <a:ext uri="{FF2B5EF4-FFF2-40B4-BE49-F238E27FC236}">
-                <a16:creationId xmlns:a16="http://schemas.microsoft.com/office/drawing/2014/main" id="{CEF38F97-C294-632E-FD05-A5A19DE454DC}"/>
+                <a16:creationId xmlns:a16="http://schemas.microsoft.com/office/drawing/2014/main" id="{3582FC77-6A46-E2DE-9D6A-A717E3259DFB}"/>
               </a:ext>
             </a:extLst>
           </p:cNvPr>
@@ -6096,7 +6217,7 @@
     </p:spTree>
     <p:extLst>
       <p:ext uri="{BB962C8B-B14F-4D97-AF65-F5344CB8AC3E}">
-        <p14:creationId xmlns:p14="http://schemas.microsoft.com/office/powerpoint/2010/main" val="2129008339"/>
+        <p14:creationId xmlns:p14="http://schemas.microsoft.com/office/powerpoint/2010/main" val="40197265"/>
       </p:ext>
     </p:extLst>
   </p:cSld>
@@ -7197,10 +7318,10 @@
       </p:grpSpPr>
       <p:sp>
         <p:nvSpPr>
-          <p:cNvPr id="2" name="Title 1">
-            <a:extLst>
-              <a:ext uri="{FF2B5EF4-FFF2-40B4-BE49-F238E27FC236}">
-                <a16:creationId xmlns:a16="http://schemas.microsoft.com/office/drawing/2014/main" id="{19BBCCE5-5245-8FBD-AF76-88D1B2E00AB6}"/>
+          <p:cNvPr id="4" name="Title 3">
+            <a:extLst>
+              <a:ext uri="{FF2B5EF4-FFF2-40B4-BE49-F238E27FC236}">
+                <a16:creationId xmlns:a16="http://schemas.microsoft.com/office/drawing/2014/main" id="{BB2BD00F-8EA4-14C5-BD5F-97F9AD513213}"/>
               </a:ext>
             </a:extLst>
           </p:cNvPr>
@@ -7208,7 +7329,7 @@
             <a:spLocks noGrp="1"/>
           </p:cNvSpPr>
           <p:nvPr>
-            <p:ph type="title"/>
+            <p:ph type="ctrTitle"/>
           </p:nvPr>
         </p:nvSpPr>
         <p:spPr/>
@@ -7216,91 +7337,9 @@
           <a:bodyPr/>
           <a:lstStyle/>
           <a:p>
-            <a:pPr algn="ctr"/>
-            <a:r>
-              <a:rPr lang="en-US" dirty="0"/>
-              <a:t>A Simple List layout: black-list-layout</a:t>
-            </a:r>
-          </a:p>
-        </p:txBody>
-      </p:sp>
-      <p:sp>
-        <p:nvSpPr>
-          <p:cNvPr id="7" name="Content Placeholder 6">
-            <a:extLst>
-              <a:ext uri="{FF2B5EF4-FFF2-40B4-BE49-F238E27FC236}">
-                <a16:creationId xmlns:a16="http://schemas.microsoft.com/office/drawing/2014/main" id="{42A0049C-AD5E-973D-12AA-663DC835CF4C}"/>
-              </a:ext>
-            </a:extLst>
-          </p:cNvPr>
-          <p:cNvSpPr>
-            <a:spLocks noGrp="1"/>
-          </p:cNvSpPr>
-          <p:nvPr>
-            <p:ph idx="1"/>
-          </p:nvPr>
-        </p:nvSpPr>
-        <p:spPr>
-          <a:xfrm>
-            <a:off x="838200" y="1026635"/>
-            <a:ext cx="10515600" cy="2928916"/>
-          </a:xfrm>
-        </p:spPr>
-        <p:txBody>
-          <a:bodyPr/>
-          <a:lstStyle/>
-          <a:p>
-            <a:r>
-              <a:rPr lang="en-US" sz="1800" dirty="0"/>
-              <a:t>Heading 1 [Black color]</a:t>
-            </a:r>
-          </a:p>
-          <a:p>
-            <a:pPr lvl="1"/>
-            <a:r>
-              <a:rPr lang="en-US" sz="1600" dirty="0"/>
-              <a:t>L2</a:t>
-            </a:r>
-          </a:p>
-          <a:p>
-            <a:pPr lvl="1"/>
-            <a:r>
-              <a:rPr lang="en-US" sz="1600" dirty="0"/>
-              <a:t>L2</a:t>
-            </a:r>
-          </a:p>
-          <a:p>
-            <a:pPr lvl="2"/>
-            <a:r>
-              <a:rPr lang="en-US" sz="1400" dirty="0"/>
-              <a:t>L3</a:t>
-            </a:r>
-          </a:p>
-          <a:p>
-            <a:pPr lvl="2"/>
-            <a:r>
-              <a:rPr lang="en-US" sz="1400" dirty="0"/>
-              <a:t>L3</a:t>
-            </a:r>
-          </a:p>
-          <a:p>
-            <a:pPr lvl="1"/>
-            <a:r>
-              <a:rPr lang="en-US" sz="1600" dirty="0"/>
-              <a:t>L2</a:t>
-            </a:r>
-          </a:p>
-          <a:p>
-            <a:r>
-              <a:rPr lang="en-US" sz="1800" dirty="0"/>
-              <a:t>Heading 1</a:t>
-            </a:r>
-          </a:p>
-          <a:p>
-            <a:pPr lvl="1"/>
-            <a:r>
-              <a:rPr lang="en-US" sz="1600" dirty="0"/>
-              <a:t>Etc.</a:t>
+            <a:r>
+              <a:rPr lang="en-US" dirty="0"/>
+              <a:t>Testing of List Behavior</a:t>
             </a:r>
           </a:p>
         </p:txBody>
@@ -7310,7 +7349,7 @@
           <p:cNvPr id="3" name="Slide Number Placeholder 2">
             <a:extLst>
               <a:ext uri="{FF2B5EF4-FFF2-40B4-BE49-F238E27FC236}">
-                <a16:creationId xmlns:a16="http://schemas.microsoft.com/office/drawing/2014/main" id="{CA447B35-C114-1246-1A16-CFD2AE877806}"/>
+                <a16:creationId xmlns:a16="http://schemas.microsoft.com/office/drawing/2014/main" id="{CEF38F97-C294-632E-FD05-A5A19DE454DC}"/>
               </a:ext>
             </a:extLst>
           </p:cNvPr>
@@ -7334,334 +7373,10 @@
           </a:p>
         </p:txBody>
       </p:sp>
-      <p:sp>
-        <p:nvSpPr>
-          <p:cNvPr id="6" name="TextBox 5">
-            <a:extLst>
-              <a:ext uri="{FF2B5EF4-FFF2-40B4-BE49-F238E27FC236}">
-                <a16:creationId xmlns:a16="http://schemas.microsoft.com/office/drawing/2014/main" id="{8A74DE0E-E0F1-40E9-9EBA-8FCE9F676E03}"/>
-              </a:ext>
-            </a:extLst>
-          </p:cNvPr>
-          <p:cNvSpPr txBox="1"/>
-          <p:nvPr/>
-        </p:nvSpPr>
-        <p:spPr>
-          <a:xfrm>
-            <a:off x="4008584" y="4962418"/>
-            <a:ext cx="7345216" cy="1200329"/>
-          </a:xfrm>
-          <a:prstGeom prst="rect">
-            <a:avLst/>
-          </a:prstGeom>
-          <a:noFill/>
-          <a:ln w="28575">
-            <a:solidFill>
-              <a:schemeClr val="accent2"/>
-            </a:solidFill>
-          </a:ln>
-        </p:spPr>
-        <p:txBody>
-          <a:bodyPr wrap="none" rtlCol="0">
-            <a:spAutoFit/>
-          </a:bodyPr>
-          <a:lstStyle/>
-          <a:p>
-            <a:pPr marL="342900" indent="-342900">
-              <a:buAutoNum type="arabicPeriod"/>
-            </a:pPr>
-            <a:r>
-              <a:rPr lang="en-US" dirty="0"/>
-              <a:t>A simple example of using a layout list</a:t>
-            </a:r>
-          </a:p>
-          <a:p>
-            <a:pPr marL="342900" indent="-342900">
-              <a:buAutoNum type="arabicPeriod"/>
-            </a:pPr>
-            <a:r>
-              <a:rPr lang="en-US" dirty="0"/>
-              <a:t>The space, font, </a:t>
-            </a:r>
-            <a:r>
-              <a:rPr lang="en-US" dirty="0" err="1"/>
-              <a:t>etc</a:t>
-            </a:r>
-            <a:r>
-              <a:rPr lang="en-US" dirty="0"/>
-              <a:t> are configured on the layout page (master pages)</a:t>
-            </a:r>
-          </a:p>
-          <a:p>
-            <a:pPr marL="342900" indent="-342900">
-              <a:buAutoNum type="arabicPeriod"/>
-            </a:pPr>
-            <a:r>
-              <a:rPr lang="en-US" dirty="0"/>
-              <a:t>Changing that definition will change this list above.</a:t>
-            </a:r>
-          </a:p>
-          <a:p>
-            <a:pPr marL="342900" indent="-342900">
-              <a:buAutoNum type="arabicPeriod"/>
-            </a:pPr>
-            <a:r>
-              <a:rPr lang="en-US" dirty="0"/>
-              <a:t>Note: Those lists are different from this list here (inside this text box)</a:t>
-            </a:r>
-          </a:p>
-        </p:txBody>
-      </p:sp>
-      <p:sp>
-        <p:nvSpPr>
-          <p:cNvPr id="9" name="Rectangle 8">
-            <a:extLst>
-              <a:ext uri="{FF2B5EF4-FFF2-40B4-BE49-F238E27FC236}">
-                <a16:creationId xmlns:a16="http://schemas.microsoft.com/office/drawing/2014/main" id="{2008F7A9-61C1-3CFF-3DC7-11A4F4248A8A}"/>
-              </a:ext>
-            </a:extLst>
-          </p:cNvPr>
-          <p:cNvSpPr/>
-          <p:nvPr/>
-        </p:nvSpPr>
-        <p:spPr>
-          <a:xfrm>
-            <a:off x="2321959" y="4042252"/>
-            <a:ext cx="1921267" cy="318499"/>
-          </a:xfrm>
-          <a:prstGeom prst="rect">
-            <a:avLst/>
-          </a:prstGeom>
-        </p:spPr>
-        <p:style>
-          <a:lnRef idx="2">
-            <a:schemeClr val="accent1">
-              <a:shade val="15000"/>
-            </a:schemeClr>
-          </a:lnRef>
-          <a:fillRef idx="1">
-            <a:schemeClr val="accent1"/>
-          </a:fillRef>
-          <a:effectRef idx="0">
-            <a:schemeClr val="accent1"/>
-          </a:effectRef>
-          <a:fontRef idx="minor">
-            <a:schemeClr val="lt1"/>
-          </a:fontRef>
-        </p:style>
-        <p:txBody>
-          <a:bodyPr rtlCol="0" anchor="ctr"/>
-          <a:lstStyle/>
-          <a:p>
-            <a:pPr algn="ctr"/>
-            <a:r>
-              <a:rPr lang="en-US" dirty="0"/>
-              <a:t>Layout list</a:t>
-            </a:r>
-          </a:p>
-        </p:txBody>
-      </p:sp>
-      <p:sp>
-        <p:nvSpPr>
-          <p:cNvPr id="10" name="Rectangle 9">
-            <a:extLst>
-              <a:ext uri="{FF2B5EF4-FFF2-40B4-BE49-F238E27FC236}">
-                <a16:creationId xmlns:a16="http://schemas.microsoft.com/office/drawing/2014/main" id="{4F68B47C-42C8-BDD4-79A1-51CAC04C420A}"/>
-              </a:ext>
-            </a:extLst>
-          </p:cNvPr>
-          <p:cNvSpPr/>
-          <p:nvPr/>
-        </p:nvSpPr>
-        <p:spPr>
-          <a:xfrm>
-            <a:off x="4008584" y="6266018"/>
-            <a:ext cx="1921267" cy="318499"/>
-          </a:xfrm>
-          <a:prstGeom prst="rect">
-            <a:avLst/>
-          </a:prstGeom>
-        </p:spPr>
-        <p:style>
-          <a:lnRef idx="2">
-            <a:schemeClr val="accent1">
-              <a:shade val="15000"/>
-            </a:schemeClr>
-          </a:lnRef>
-          <a:fillRef idx="1">
-            <a:schemeClr val="accent1"/>
-          </a:fillRef>
-          <a:effectRef idx="0">
-            <a:schemeClr val="accent1"/>
-          </a:effectRef>
-          <a:fontRef idx="minor">
-            <a:schemeClr val="lt1"/>
-          </a:fontRef>
-        </p:style>
-        <p:txBody>
-          <a:bodyPr rtlCol="0" anchor="ctr"/>
-          <a:lstStyle/>
-          <a:p>
-            <a:pPr algn="ctr"/>
-            <a:r>
-              <a:rPr lang="en-US" dirty="0"/>
-              <a:t>Just a text box list</a:t>
-            </a:r>
-          </a:p>
-        </p:txBody>
-      </p:sp>
-      <p:sp>
-        <p:nvSpPr>
-          <p:cNvPr id="11" name="Oval 10">
-            <a:extLst>
-              <a:ext uri="{FF2B5EF4-FFF2-40B4-BE49-F238E27FC236}">
-                <a16:creationId xmlns:a16="http://schemas.microsoft.com/office/drawing/2014/main" id="{ECD32560-B899-A73A-1720-3D39EE1DDAB1}"/>
-              </a:ext>
-            </a:extLst>
-          </p:cNvPr>
-          <p:cNvSpPr/>
-          <p:nvPr/>
-        </p:nvSpPr>
-        <p:spPr>
-          <a:xfrm>
-            <a:off x="513709" y="4962418"/>
-            <a:ext cx="1921267" cy="914400"/>
-          </a:xfrm>
-          <a:prstGeom prst="ellipse">
-            <a:avLst/>
-          </a:prstGeom>
-        </p:spPr>
-        <p:style>
-          <a:lnRef idx="2">
-            <a:schemeClr val="accent1">
-              <a:shade val="15000"/>
-            </a:schemeClr>
-          </a:lnRef>
-          <a:fillRef idx="1">
-            <a:schemeClr val="accent1"/>
-          </a:fillRef>
-          <a:effectRef idx="0">
-            <a:schemeClr val="accent1"/>
-          </a:effectRef>
-          <a:fontRef idx="minor">
-            <a:schemeClr val="lt1"/>
-          </a:fontRef>
-        </p:style>
-        <p:txBody>
-          <a:bodyPr rtlCol="0" anchor="ctr"/>
-          <a:lstStyle/>
-          <a:p>
-            <a:pPr algn="ctr"/>
-            <a:r>
-              <a:rPr lang="en-US" dirty="0"/>
-              <a:t>Two</a:t>
-            </a:r>
-          </a:p>
-          <a:p>
-            <a:pPr algn="ctr"/>
-            <a:r>
-              <a:rPr lang="en-US" dirty="0"/>
-              <a:t>Different</a:t>
-            </a:r>
-          </a:p>
-          <a:p>
-            <a:pPr algn="ctr"/>
-            <a:r>
-              <a:rPr lang="en-US" dirty="0"/>
-              <a:t> Things</a:t>
-            </a:r>
-          </a:p>
-        </p:txBody>
-      </p:sp>
-      <p:cxnSp>
-        <p:nvCxnSpPr>
-          <p:cNvPr id="13" name="Straight Arrow Connector 12">
-            <a:extLst>
-              <a:ext uri="{FF2B5EF4-FFF2-40B4-BE49-F238E27FC236}">
-                <a16:creationId xmlns:a16="http://schemas.microsoft.com/office/drawing/2014/main" id="{D4393FDE-A4E6-3575-7738-8BAF771730E5}"/>
-              </a:ext>
-            </a:extLst>
-          </p:cNvPr>
-          <p:cNvCxnSpPr>
-            <a:stCxn id="11" idx="6"/>
-            <a:endCxn id="9" idx="2"/>
-          </p:cNvCxnSpPr>
-          <p:nvPr/>
-        </p:nvCxnSpPr>
-        <p:spPr>
-          <a:xfrm flipV="1">
-            <a:off x="2434976" y="4360751"/>
-            <a:ext cx="847617" cy="1058867"/>
-          </a:xfrm>
-          <a:prstGeom prst="straightConnector1">
-            <a:avLst/>
-          </a:prstGeom>
-          <a:ln>
-            <a:tailEnd type="triangle"/>
-          </a:ln>
-        </p:spPr>
-        <p:style>
-          <a:lnRef idx="2">
-            <a:schemeClr val="accent1"/>
-          </a:lnRef>
-          <a:fillRef idx="0">
-            <a:schemeClr val="accent1"/>
-          </a:fillRef>
-          <a:effectRef idx="1">
-            <a:schemeClr val="accent1"/>
-          </a:effectRef>
-          <a:fontRef idx="minor">
-            <a:schemeClr val="tx1"/>
-          </a:fontRef>
-        </p:style>
-      </p:cxnSp>
-      <p:cxnSp>
-        <p:nvCxnSpPr>
-          <p:cNvPr id="14" name="Straight Arrow Connector 13">
-            <a:extLst>
-              <a:ext uri="{FF2B5EF4-FFF2-40B4-BE49-F238E27FC236}">
-                <a16:creationId xmlns:a16="http://schemas.microsoft.com/office/drawing/2014/main" id="{EA1A4872-458D-2507-FC71-2A2D9745B6F7}"/>
-              </a:ext>
-            </a:extLst>
-          </p:cNvPr>
-          <p:cNvCxnSpPr>
-            <a:cxnSpLocks/>
-            <a:stCxn id="11" idx="6"/>
-            <a:endCxn id="10" idx="1"/>
-          </p:cNvCxnSpPr>
-          <p:nvPr/>
-        </p:nvCxnSpPr>
-        <p:spPr>
-          <a:xfrm>
-            <a:off x="2434976" y="5419618"/>
-            <a:ext cx="1573608" cy="1005650"/>
-          </a:xfrm>
-          <a:prstGeom prst="straightConnector1">
-            <a:avLst/>
-          </a:prstGeom>
-          <a:ln>
-            <a:tailEnd type="triangle"/>
-          </a:ln>
-        </p:spPr>
-        <p:style>
-          <a:lnRef idx="2">
-            <a:schemeClr val="accent1"/>
-          </a:lnRef>
-          <a:fillRef idx="0">
-            <a:schemeClr val="accent1"/>
-          </a:fillRef>
-          <a:effectRef idx="1">
-            <a:schemeClr val="accent1"/>
-          </a:effectRef>
-          <a:fontRef idx="minor">
-            <a:schemeClr val="tx1"/>
-          </a:fontRef>
-        </p:style>
-      </p:cxnSp>
     </p:spTree>
     <p:extLst>
       <p:ext uri="{BB962C8B-B14F-4D97-AF65-F5344CB8AC3E}">
-        <p14:creationId xmlns:p14="http://schemas.microsoft.com/office/powerpoint/2010/main" val="2951360396"/>
+        <p14:creationId xmlns:p14="http://schemas.microsoft.com/office/powerpoint/2010/main" val="2129008339"/>
       </p:ext>
     </p:extLst>
   </p:cSld>
@@ -7712,7 +7427,7 @@
             <a:pPr algn="ctr"/>
             <a:r>
               <a:rPr lang="en-US" dirty="0"/>
-              <a:t>Layout lists: Using 2 layout lists on a page</a:t>
+              <a:t>A Simple List layout: black-list-layout</a:t>
             </a:r>
           </a:p>
         </p:txBody>
@@ -7733,61 +7448,66 @@
             <p:ph idx="1"/>
           </p:nvPr>
         </p:nvSpPr>
-        <p:spPr/>
+        <p:spPr>
+          <a:xfrm>
+            <a:off x="838200" y="1026635"/>
+            <a:ext cx="10515600" cy="2928916"/>
+          </a:xfrm>
+        </p:spPr>
         <p:txBody>
           <a:bodyPr/>
           <a:lstStyle/>
           <a:p>
             <a:r>
-              <a:rPr lang="en-US" sz="2000" dirty="0"/>
-              <a:t>Heading 1 [Colorful one]</a:t>
+              <a:rPr lang="en-US" sz="1800" dirty="0"/>
+              <a:t>Heading 1 [Black color]</a:t>
             </a:r>
           </a:p>
           <a:p>
             <a:pPr lvl="1"/>
             <a:r>
+              <a:rPr lang="en-US" sz="1600" dirty="0"/>
+              <a:t>L2</a:t>
+            </a:r>
+          </a:p>
+          <a:p>
+            <a:pPr lvl="1"/>
+            <a:r>
+              <a:rPr lang="en-US" sz="1600" dirty="0"/>
+              <a:t>L2</a:t>
+            </a:r>
+          </a:p>
+          <a:p>
+            <a:pPr lvl="2"/>
+            <a:r>
+              <a:rPr lang="en-US" sz="1400" dirty="0"/>
+              <a:t>L3</a:t>
+            </a:r>
+          </a:p>
+          <a:p>
+            <a:pPr lvl="2"/>
+            <a:r>
+              <a:rPr lang="en-US" sz="1400" dirty="0"/>
+              <a:t>L3</a:t>
+            </a:r>
+          </a:p>
+          <a:p>
+            <a:pPr lvl="1"/>
+            <a:r>
+              <a:rPr lang="en-US" sz="1600" dirty="0"/>
+              <a:t>L2</a:t>
+            </a:r>
+          </a:p>
+          <a:p>
+            <a:r>
               <a:rPr lang="en-US" sz="1800" dirty="0"/>
-              <a:t>L2</a:t>
+              <a:t>Heading 1</a:t>
             </a:r>
           </a:p>
           <a:p>
             <a:pPr lvl="1"/>
             <a:r>
-              <a:rPr lang="en-US" sz="1800" dirty="0"/>
-              <a:t>L2</a:t>
-            </a:r>
-          </a:p>
-          <a:p>
-            <a:pPr lvl="2"/>
-            <a:r>
               <a:rPr lang="en-US" sz="1600" dirty="0"/>
-              <a:t>L3</a:t>
-            </a:r>
-          </a:p>
-          <a:p>
-            <a:pPr lvl="2"/>
-            <a:r>
-              <a:rPr lang="en-US" sz="1600" dirty="0"/>
-              <a:t>L3</a:t>
-            </a:r>
-          </a:p>
-          <a:p>
-            <a:pPr lvl="1"/>
-            <a:r>
-              <a:rPr lang="en-US" sz="1800" dirty="0"/>
-              <a:t>L2</a:t>
-            </a:r>
-          </a:p>
-          <a:p>
-            <a:r>
-              <a:rPr lang="en-US" sz="2000" dirty="0"/>
-              <a:t>Heading 1</a:t>
-            </a:r>
-          </a:p>
-          <a:p>
-            <a:pPr lvl="1"/>
-            <a:r>
-              <a:rPr lang="en-US" sz="1800" dirty="0"/>
               <a:t>Etc.</a:t>
             </a:r>
           </a:p>
@@ -7795,10 +7515,10 @@
       </p:sp>
       <p:sp>
         <p:nvSpPr>
-          <p:cNvPr id="8" name="Slide Number Placeholder 7">
-            <a:extLst>
-              <a:ext uri="{FF2B5EF4-FFF2-40B4-BE49-F238E27FC236}">
-                <a16:creationId xmlns:a16="http://schemas.microsoft.com/office/drawing/2014/main" id="{1FAB160F-8C75-F154-BC92-F72D6EE09F8E}"/>
+          <p:cNvPr id="3" name="Slide Number Placeholder 2">
+            <a:extLst>
+              <a:ext uri="{FF2B5EF4-FFF2-40B4-BE49-F238E27FC236}">
+                <a16:creationId xmlns:a16="http://schemas.microsoft.com/office/drawing/2014/main" id="{CA447B35-C114-1246-1A16-CFD2AE877806}"/>
               </a:ext>
             </a:extLst>
           </p:cNvPr>
@@ -7817,6 +7537,494 @@
             <a:fld id="{80473052-BA07-4FC5-9696-A0F7625044DE}" type="slidenum">
               <a:rPr lang="en-US" smtClean="0"/>
               <a:t>21</a:t>
+            </a:fld>
+            <a:endParaRPr lang="en-US"/>
+          </a:p>
+        </p:txBody>
+      </p:sp>
+      <p:sp>
+        <p:nvSpPr>
+          <p:cNvPr id="6" name="TextBox 5">
+            <a:extLst>
+              <a:ext uri="{FF2B5EF4-FFF2-40B4-BE49-F238E27FC236}">
+                <a16:creationId xmlns:a16="http://schemas.microsoft.com/office/drawing/2014/main" id="{8A74DE0E-E0F1-40E9-9EBA-8FCE9F676E03}"/>
+              </a:ext>
+            </a:extLst>
+          </p:cNvPr>
+          <p:cNvSpPr txBox="1"/>
+          <p:nvPr/>
+        </p:nvSpPr>
+        <p:spPr>
+          <a:xfrm>
+            <a:off x="4008584" y="4962418"/>
+            <a:ext cx="7345216" cy="1200329"/>
+          </a:xfrm>
+          <a:prstGeom prst="rect">
+            <a:avLst/>
+          </a:prstGeom>
+          <a:noFill/>
+          <a:ln w="28575">
+            <a:solidFill>
+              <a:schemeClr val="accent2"/>
+            </a:solidFill>
+          </a:ln>
+        </p:spPr>
+        <p:txBody>
+          <a:bodyPr wrap="none" rtlCol="0">
+            <a:spAutoFit/>
+          </a:bodyPr>
+          <a:lstStyle/>
+          <a:p>
+            <a:pPr marL="342900" indent="-342900">
+              <a:buAutoNum type="arabicPeriod"/>
+            </a:pPr>
+            <a:r>
+              <a:rPr lang="en-US" dirty="0"/>
+              <a:t>A simple example of using a layout list</a:t>
+            </a:r>
+          </a:p>
+          <a:p>
+            <a:pPr marL="342900" indent="-342900">
+              <a:buAutoNum type="arabicPeriod"/>
+            </a:pPr>
+            <a:r>
+              <a:rPr lang="en-US" dirty="0"/>
+              <a:t>The space, font, </a:t>
+            </a:r>
+            <a:r>
+              <a:rPr lang="en-US" dirty="0" err="1"/>
+              <a:t>etc</a:t>
+            </a:r>
+            <a:r>
+              <a:rPr lang="en-US" dirty="0"/>
+              <a:t> are configured on the layout page (master pages)</a:t>
+            </a:r>
+          </a:p>
+          <a:p>
+            <a:pPr marL="342900" indent="-342900">
+              <a:buAutoNum type="arabicPeriod"/>
+            </a:pPr>
+            <a:r>
+              <a:rPr lang="en-US" dirty="0"/>
+              <a:t>Changing that definition will change this list above.</a:t>
+            </a:r>
+          </a:p>
+          <a:p>
+            <a:pPr marL="342900" indent="-342900">
+              <a:buAutoNum type="arabicPeriod"/>
+            </a:pPr>
+            <a:r>
+              <a:rPr lang="en-US" dirty="0"/>
+              <a:t>Note: Those lists are different from this list here (inside this text box)</a:t>
+            </a:r>
+          </a:p>
+        </p:txBody>
+      </p:sp>
+      <p:sp>
+        <p:nvSpPr>
+          <p:cNvPr id="9" name="Rectangle 8">
+            <a:extLst>
+              <a:ext uri="{FF2B5EF4-FFF2-40B4-BE49-F238E27FC236}">
+                <a16:creationId xmlns:a16="http://schemas.microsoft.com/office/drawing/2014/main" id="{2008F7A9-61C1-3CFF-3DC7-11A4F4248A8A}"/>
+              </a:ext>
+            </a:extLst>
+          </p:cNvPr>
+          <p:cNvSpPr/>
+          <p:nvPr/>
+        </p:nvSpPr>
+        <p:spPr>
+          <a:xfrm>
+            <a:off x="2321959" y="4042252"/>
+            <a:ext cx="1921267" cy="318499"/>
+          </a:xfrm>
+          <a:prstGeom prst="rect">
+            <a:avLst/>
+          </a:prstGeom>
+        </p:spPr>
+        <p:style>
+          <a:lnRef idx="2">
+            <a:schemeClr val="accent1">
+              <a:shade val="15000"/>
+            </a:schemeClr>
+          </a:lnRef>
+          <a:fillRef idx="1">
+            <a:schemeClr val="accent1"/>
+          </a:fillRef>
+          <a:effectRef idx="0">
+            <a:schemeClr val="accent1"/>
+          </a:effectRef>
+          <a:fontRef idx="minor">
+            <a:schemeClr val="lt1"/>
+          </a:fontRef>
+        </p:style>
+        <p:txBody>
+          <a:bodyPr rtlCol="0" anchor="ctr"/>
+          <a:lstStyle/>
+          <a:p>
+            <a:pPr algn="ctr"/>
+            <a:r>
+              <a:rPr lang="en-US" dirty="0"/>
+              <a:t>Layout list</a:t>
+            </a:r>
+          </a:p>
+        </p:txBody>
+      </p:sp>
+      <p:sp>
+        <p:nvSpPr>
+          <p:cNvPr id="10" name="Rectangle 9">
+            <a:extLst>
+              <a:ext uri="{FF2B5EF4-FFF2-40B4-BE49-F238E27FC236}">
+                <a16:creationId xmlns:a16="http://schemas.microsoft.com/office/drawing/2014/main" id="{4F68B47C-42C8-BDD4-79A1-51CAC04C420A}"/>
+              </a:ext>
+            </a:extLst>
+          </p:cNvPr>
+          <p:cNvSpPr/>
+          <p:nvPr/>
+        </p:nvSpPr>
+        <p:spPr>
+          <a:xfrm>
+            <a:off x="4008584" y="6266018"/>
+            <a:ext cx="1921267" cy="318499"/>
+          </a:xfrm>
+          <a:prstGeom prst="rect">
+            <a:avLst/>
+          </a:prstGeom>
+        </p:spPr>
+        <p:style>
+          <a:lnRef idx="2">
+            <a:schemeClr val="accent1">
+              <a:shade val="15000"/>
+            </a:schemeClr>
+          </a:lnRef>
+          <a:fillRef idx="1">
+            <a:schemeClr val="accent1"/>
+          </a:fillRef>
+          <a:effectRef idx="0">
+            <a:schemeClr val="accent1"/>
+          </a:effectRef>
+          <a:fontRef idx="minor">
+            <a:schemeClr val="lt1"/>
+          </a:fontRef>
+        </p:style>
+        <p:txBody>
+          <a:bodyPr rtlCol="0" anchor="ctr"/>
+          <a:lstStyle/>
+          <a:p>
+            <a:pPr algn="ctr"/>
+            <a:r>
+              <a:rPr lang="en-US" dirty="0"/>
+              <a:t>Just a text box list</a:t>
+            </a:r>
+          </a:p>
+        </p:txBody>
+      </p:sp>
+      <p:sp>
+        <p:nvSpPr>
+          <p:cNvPr id="11" name="Oval 10">
+            <a:extLst>
+              <a:ext uri="{FF2B5EF4-FFF2-40B4-BE49-F238E27FC236}">
+                <a16:creationId xmlns:a16="http://schemas.microsoft.com/office/drawing/2014/main" id="{ECD32560-B899-A73A-1720-3D39EE1DDAB1}"/>
+              </a:ext>
+            </a:extLst>
+          </p:cNvPr>
+          <p:cNvSpPr/>
+          <p:nvPr/>
+        </p:nvSpPr>
+        <p:spPr>
+          <a:xfrm>
+            <a:off x="513709" y="4962418"/>
+            <a:ext cx="1921267" cy="914400"/>
+          </a:xfrm>
+          <a:prstGeom prst="ellipse">
+            <a:avLst/>
+          </a:prstGeom>
+        </p:spPr>
+        <p:style>
+          <a:lnRef idx="2">
+            <a:schemeClr val="accent1">
+              <a:shade val="15000"/>
+            </a:schemeClr>
+          </a:lnRef>
+          <a:fillRef idx="1">
+            <a:schemeClr val="accent1"/>
+          </a:fillRef>
+          <a:effectRef idx="0">
+            <a:schemeClr val="accent1"/>
+          </a:effectRef>
+          <a:fontRef idx="minor">
+            <a:schemeClr val="lt1"/>
+          </a:fontRef>
+        </p:style>
+        <p:txBody>
+          <a:bodyPr rtlCol="0" anchor="ctr"/>
+          <a:lstStyle/>
+          <a:p>
+            <a:pPr algn="ctr"/>
+            <a:r>
+              <a:rPr lang="en-US" dirty="0"/>
+              <a:t>Two</a:t>
+            </a:r>
+          </a:p>
+          <a:p>
+            <a:pPr algn="ctr"/>
+            <a:r>
+              <a:rPr lang="en-US" dirty="0"/>
+              <a:t>Different</a:t>
+            </a:r>
+          </a:p>
+          <a:p>
+            <a:pPr algn="ctr"/>
+            <a:r>
+              <a:rPr lang="en-US" dirty="0"/>
+              <a:t> Things</a:t>
+            </a:r>
+          </a:p>
+        </p:txBody>
+      </p:sp>
+      <p:cxnSp>
+        <p:nvCxnSpPr>
+          <p:cNvPr id="13" name="Straight Arrow Connector 12">
+            <a:extLst>
+              <a:ext uri="{FF2B5EF4-FFF2-40B4-BE49-F238E27FC236}">
+                <a16:creationId xmlns:a16="http://schemas.microsoft.com/office/drawing/2014/main" id="{D4393FDE-A4E6-3575-7738-8BAF771730E5}"/>
+              </a:ext>
+            </a:extLst>
+          </p:cNvPr>
+          <p:cNvCxnSpPr>
+            <a:stCxn id="11" idx="6"/>
+            <a:endCxn id="9" idx="2"/>
+          </p:cNvCxnSpPr>
+          <p:nvPr/>
+        </p:nvCxnSpPr>
+        <p:spPr>
+          <a:xfrm flipV="1">
+            <a:off x="2434976" y="4360751"/>
+            <a:ext cx="847617" cy="1058867"/>
+          </a:xfrm>
+          <a:prstGeom prst="straightConnector1">
+            <a:avLst/>
+          </a:prstGeom>
+          <a:ln>
+            <a:tailEnd type="triangle"/>
+          </a:ln>
+        </p:spPr>
+        <p:style>
+          <a:lnRef idx="2">
+            <a:schemeClr val="accent1"/>
+          </a:lnRef>
+          <a:fillRef idx="0">
+            <a:schemeClr val="accent1"/>
+          </a:fillRef>
+          <a:effectRef idx="1">
+            <a:schemeClr val="accent1"/>
+          </a:effectRef>
+          <a:fontRef idx="minor">
+            <a:schemeClr val="tx1"/>
+          </a:fontRef>
+        </p:style>
+      </p:cxnSp>
+      <p:cxnSp>
+        <p:nvCxnSpPr>
+          <p:cNvPr id="14" name="Straight Arrow Connector 13">
+            <a:extLst>
+              <a:ext uri="{FF2B5EF4-FFF2-40B4-BE49-F238E27FC236}">
+                <a16:creationId xmlns:a16="http://schemas.microsoft.com/office/drawing/2014/main" id="{EA1A4872-458D-2507-FC71-2A2D9745B6F7}"/>
+              </a:ext>
+            </a:extLst>
+          </p:cNvPr>
+          <p:cNvCxnSpPr>
+            <a:cxnSpLocks/>
+            <a:stCxn id="11" idx="6"/>
+            <a:endCxn id="10" idx="1"/>
+          </p:cNvCxnSpPr>
+          <p:nvPr/>
+        </p:nvCxnSpPr>
+        <p:spPr>
+          <a:xfrm>
+            <a:off x="2434976" y="5419618"/>
+            <a:ext cx="1573608" cy="1005650"/>
+          </a:xfrm>
+          <a:prstGeom prst="straightConnector1">
+            <a:avLst/>
+          </a:prstGeom>
+          <a:ln>
+            <a:tailEnd type="triangle"/>
+          </a:ln>
+        </p:spPr>
+        <p:style>
+          <a:lnRef idx="2">
+            <a:schemeClr val="accent1"/>
+          </a:lnRef>
+          <a:fillRef idx="0">
+            <a:schemeClr val="accent1"/>
+          </a:fillRef>
+          <a:effectRef idx="1">
+            <a:schemeClr val="accent1"/>
+          </a:effectRef>
+          <a:fontRef idx="minor">
+            <a:schemeClr val="tx1"/>
+          </a:fontRef>
+        </p:style>
+      </p:cxnSp>
+    </p:spTree>
+    <p:extLst>
+      <p:ext uri="{BB962C8B-B14F-4D97-AF65-F5344CB8AC3E}">
+        <p14:creationId xmlns:p14="http://schemas.microsoft.com/office/powerpoint/2010/main" val="2951360396"/>
+      </p:ext>
+    </p:extLst>
+  </p:cSld>
+  <p:clrMapOvr>
+    <a:masterClrMapping/>
+  </p:clrMapOvr>
+</p:sld>
+</file>
+
+<file path=ppt/slides/slide22.xml><?xml version="1.0" encoding="utf-8"?>
+<p:sld xmlns:a="http://schemas.openxmlformats.org/drawingml/2006/main" xmlns:r="http://schemas.openxmlformats.org/officeDocument/2006/relationships" xmlns:p="http://schemas.openxmlformats.org/presentationml/2006/main">
+  <p:cSld>
+    <p:spTree>
+      <p:nvGrpSpPr>
+        <p:cNvPr id="1" name=""/>
+        <p:cNvGrpSpPr/>
+        <p:nvPr/>
+      </p:nvGrpSpPr>
+      <p:grpSpPr>
+        <a:xfrm>
+          <a:off x="0" y="0"/>
+          <a:ext cx="0" cy="0"/>
+          <a:chOff x="0" y="0"/>
+          <a:chExt cx="0" cy="0"/>
+        </a:xfrm>
+      </p:grpSpPr>
+      <p:sp>
+        <p:nvSpPr>
+          <p:cNvPr id="2" name="Title 1">
+            <a:extLst>
+              <a:ext uri="{FF2B5EF4-FFF2-40B4-BE49-F238E27FC236}">
+                <a16:creationId xmlns:a16="http://schemas.microsoft.com/office/drawing/2014/main" id="{19BBCCE5-5245-8FBD-AF76-88D1B2E00AB6}"/>
+              </a:ext>
+            </a:extLst>
+          </p:cNvPr>
+          <p:cNvSpPr>
+            <a:spLocks noGrp="1"/>
+          </p:cNvSpPr>
+          <p:nvPr>
+            <p:ph type="title"/>
+          </p:nvPr>
+        </p:nvSpPr>
+        <p:spPr/>
+        <p:txBody>
+          <a:bodyPr/>
+          <a:lstStyle/>
+          <a:p>
+            <a:pPr algn="ctr"/>
+            <a:r>
+              <a:rPr lang="en-US" dirty="0"/>
+              <a:t>Layout lists: Using 2 layout lists on a page</a:t>
+            </a:r>
+          </a:p>
+        </p:txBody>
+      </p:sp>
+      <p:sp>
+        <p:nvSpPr>
+          <p:cNvPr id="7" name="Content Placeholder 6">
+            <a:extLst>
+              <a:ext uri="{FF2B5EF4-FFF2-40B4-BE49-F238E27FC236}">
+                <a16:creationId xmlns:a16="http://schemas.microsoft.com/office/drawing/2014/main" id="{42A0049C-AD5E-973D-12AA-663DC835CF4C}"/>
+              </a:ext>
+            </a:extLst>
+          </p:cNvPr>
+          <p:cNvSpPr>
+            <a:spLocks noGrp="1"/>
+          </p:cNvSpPr>
+          <p:nvPr>
+            <p:ph idx="1"/>
+          </p:nvPr>
+        </p:nvSpPr>
+        <p:spPr/>
+        <p:txBody>
+          <a:bodyPr/>
+          <a:lstStyle/>
+          <a:p>
+            <a:r>
+              <a:rPr lang="en-US" sz="2000" dirty="0"/>
+              <a:t>Heading 1 [Colorful one]</a:t>
+            </a:r>
+          </a:p>
+          <a:p>
+            <a:pPr lvl="1"/>
+            <a:r>
+              <a:rPr lang="en-US" sz="1800" dirty="0"/>
+              <a:t>L2</a:t>
+            </a:r>
+          </a:p>
+          <a:p>
+            <a:pPr lvl="1"/>
+            <a:r>
+              <a:rPr lang="en-US" sz="1800" dirty="0"/>
+              <a:t>L2</a:t>
+            </a:r>
+          </a:p>
+          <a:p>
+            <a:pPr lvl="2"/>
+            <a:r>
+              <a:rPr lang="en-US" sz="1600" dirty="0"/>
+              <a:t>L3</a:t>
+            </a:r>
+          </a:p>
+          <a:p>
+            <a:pPr lvl="2"/>
+            <a:r>
+              <a:rPr lang="en-US" sz="1600" dirty="0"/>
+              <a:t>L3</a:t>
+            </a:r>
+          </a:p>
+          <a:p>
+            <a:pPr lvl="1"/>
+            <a:r>
+              <a:rPr lang="en-US" sz="1800" dirty="0"/>
+              <a:t>L2</a:t>
+            </a:r>
+          </a:p>
+          <a:p>
+            <a:r>
+              <a:rPr lang="en-US" sz="2000" dirty="0"/>
+              <a:t>Heading 1</a:t>
+            </a:r>
+          </a:p>
+          <a:p>
+            <a:pPr lvl="1"/>
+            <a:r>
+              <a:rPr lang="en-US" sz="1800" dirty="0"/>
+              <a:t>Etc.</a:t>
+            </a:r>
+          </a:p>
+        </p:txBody>
+      </p:sp>
+      <p:sp>
+        <p:nvSpPr>
+          <p:cNvPr id="8" name="Slide Number Placeholder 7">
+            <a:extLst>
+              <a:ext uri="{FF2B5EF4-FFF2-40B4-BE49-F238E27FC236}">
+                <a16:creationId xmlns:a16="http://schemas.microsoft.com/office/drawing/2014/main" id="{1FAB160F-8C75-F154-BC92-F72D6EE09F8E}"/>
+              </a:ext>
+            </a:extLst>
+          </p:cNvPr>
+          <p:cNvSpPr>
+            <a:spLocks noGrp="1"/>
+          </p:cNvSpPr>
+          <p:nvPr>
+            <p:ph type="sldNum" sz="quarter" idx="12"/>
+          </p:nvPr>
+        </p:nvSpPr>
+        <p:spPr/>
+        <p:txBody>
+          <a:bodyPr/>
+          <a:lstStyle/>
+          <a:p>
+            <a:fld id="{80473052-BA07-4FC5-9696-A0F7625044DE}" type="slidenum">
+              <a:rPr lang="en-US" smtClean="0"/>
+              <a:t>22</a:t>
             </a:fld>
             <a:endParaRPr lang="en-US"/>
           </a:p>
@@ -8109,7 +8317,7 @@
 </p:sld>
 </file>
 
-<file path=ppt/slides/slide22.xml><?xml version="1.0" encoding="utf-8"?>
+<file path=ppt/slides/slide23.xml><?xml version="1.0" encoding="utf-8"?>
 <p:sld xmlns:a="http://schemas.openxmlformats.org/drawingml/2006/main" xmlns:r="http://schemas.openxmlformats.org/officeDocument/2006/relationships" xmlns:p="http://schemas.openxmlformats.org/presentationml/2006/main">
   <p:cSld>
     <p:spTree>
@@ -8747,7 +8955,7 @@
           <a:p>
             <a:fld id="{80473052-BA07-4FC5-9696-A0F7625044DE}" type="slidenum">
               <a:rPr lang="en-US" smtClean="0"/>
-              <a:t>22</a:t>
+              <a:t>23</a:t>
             </a:fld>
             <a:endParaRPr lang="en-US"/>
           </a:p>
@@ -8766,7 +8974,7 @@
 </p:sld>
 </file>
 
-<file path=ppt/slides/slide23.xml><?xml version="1.0" encoding="utf-8"?>
+<file path=ppt/slides/slide24.xml><?xml version="1.0" encoding="utf-8"?>
 <p:sld xmlns:a="http://schemas.openxmlformats.org/drawingml/2006/main" xmlns:r="http://schemas.openxmlformats.org/officeDocument/2006/relationships" xmlns:p="http://schemas.openxmlformats.org/presentationml/2006/main">
   <p:cSld>
     <p:spTree>
@@ -9280,7 +9488,7 @@
           <a:p>
             <a:fld id="{80473052-BA07-4FC5-9696-A0F7625044DE}" type="slidenum">
               <a:rPr lang="en-US" smtClean="0"/>
-              <a:t>23</a:t>
+              <a:t>24</a:t>
             </a:fld>
             <a:endParaRPr lang="en-US"/>
           </a:p>
@@ -9290,218 +9498,6 @@
     <p:extLst>
       <p:ext uri="{BB962C8B-B14F-4D97-AF65-F5344CB8AC3E}">
         <p14:creationId xmlns:p14="http://schemas.microsoft.com/office/powerpoint/2010/main" val="2187506506"/>
-      </p:ext>
-    </p:extLst>
-  </p:cSld>
-  <p:clrMapOvr>
-    <a:masterClrMapping/>
-  </p:clrMapOvr>
-</p:sld>
-</file>
-
-<file path=ppt/slides/slide24.xml><?xml version="1.0" encoding="utf-8"?>
-<p:sld xmlns:a="http://schemas.openxmlformats.org/drawingml/2006/main" xmlns:r="http://schemas.openxmlformats.org/officeDocument/2006/relationships" xmlns:p="http://schemas.openxmlformats.org/presentationml/2006/main">
-  <p:cSld>
-    <p:spTree>
-      <p:nvGrpSpPr>
-        <p:cNvPr id="1" name=""/>
-        <p:cNvGrpSpPr/>
-        <p:nvPr/>
-      </p:nvGrpSpPr>
-      <p:grpSpPr>
-        <a:xfrm>
-          <a:off x="0" y="0"/>
-          <a:ext cx="0" cy="0"/>
-          <a:chOff x="0" y="0"/>
-          <a:chExt cx="0" cy="0"/>
-        </a:xfrm>
-      </p:grpSpPr>
-      <p:sp>
-        <p:nvSpPr>
-          <p:cNvPr id="4" name="Title 3">
-            <a:extLst>
-              <a:ext uri="{FF2B5EF4-FFF2-40B4-BE49-F238E27FC236}">
-                <a16:creationId xmlns:a16="http://schemas.microsoft.com/office/drawing/2014/main" id="{0D0E3244-86CC-ED51-EFBC-B4D48F99AEED}"/>
-              </a:ext>
-            </a:extLst>
-          </p:cNvPr>
-          <p:cNvSpPr>
-            <a:spLocks noGrp="1"/>
-          </p:cNvSpPr>
-          <p:nvPr>
-            <p:ph type="title"/>
-          </p:nvPr>
-        </p:nvSpPr>
-        <p:spPr/>
-        <p:txBody>
-          <a:bodyPr/>
-          <a:lstStyle/>
-          <a:p>
-            <a:r>
-              <a:rPr lang="en-US" dirty="0"/>
-              <a:t>Testing: works</a:t>
-            </a:r>
-          </a:p>
-        </p:txBody>
-      </p:sp>
-      <p:sp>
-        <p:nvSpPr>
-          <p:cNvPr id="8" name="Content Placeholder 7">
-            <a:extLst>
-              <a:ext uri="{FF2B5EF4-FFF2-40B4-BE49-F238E27FC236}">
-                <a16:creationId xmlns:a16="http://schemas.microsoft.com/office/drawing/2014/main" id="{ED3DD3A7-845E-D9B0-28AE-E851ECB350F0}"/>
-              </a:ext>
-            </a:extLst>
-          </p:cNvPr>
-          <p:cNvSpPr>
-            <a:spLocks noGrp="1"/>
-          </p:cNvSpPr>
-          <p:nvPr>
-            <p:ph idx="1"/>
-          </p:nvPr>
-        </p:nvSpPr>
-        <p:spPr/>
-        <p:txBody>
-          <a:bodyPr/>
-          <a:lstStyle/>
-          <a:p>
-            <a:r>
-              <a:rPr lang="en-US" dirty="0"/>
-              <a:t>Level 1</a:t>
-            </a:r>
-          </a:p>
-          <a:p>
-            <a:pPr lvl="1"/>
-            <a:r>
-              <a:rPr lang="en-US" dirty="0"/>
-              <a:t>Level 2</a:t>
-            </a:r>
-          </a:p>
-          <a:p>
-            <a:pPr lvl="2"/>
-            <a:r>
-              <a:rPr lang="en-US" dirty="0"/>
-              <a:t>Level 3</a:t>
-            </a:r>
-          </a:p>
-          <a:p>
-            <a:pPr lvl="1"/>
-            <a:r>
-              <a:rPr lang="en-US" dirty="0"/>
-              <a:t>Level 2, item 2</a:t>
-            </a:r>
-          </a:p>
-          <a:p>
-            <a:pPr lvl="2"/>
-            <a:r>
-              <a:rPr lang="en-US" dirty="0"/>
-              <a:t>Level2 item 1</a:t>
-            </a:r>
-          </a:p>
-          <a:p>
-            <a:pPr lvl="2"/>
-            <a:r>
-              <a:rPr lang="en-US" dirty="0"/>
-              <a:t>Level 2 item 2</a:t>
-            </a:r>
-          </a:p>
-          <a:p>
-            <a:pPr lvl="1"/>
-            <a:r>
-              <a:rPr lang="en-US" dirty="0"/>
-              <a:t>Level 2, item 3</a:t>
-            </a:r>
-          </a:p>
-          <a:p>
-            <a:pPr lvl="2"/>
-            <a:r>
-              <a:rPr lang="en-US" dirty="0"/>
-              <a:t>One</a:t>
-            </a:r>
-          </a:p>
-          <a:p>
-            <a:pPr lvl="2"/>
-            <a:r>
-              <a:rPr lang="en-US" dirty="0"/>
-              <a:t>two</a:t>
-            </a:r>
-          </a:p>
-          <a:p>
-            <a:r>
-              <a:rPr lang="en-US" dirty="0"/>
-              <a:t>Level 1 item 2</a:t>
-            </a:r>
-          </a:p>
-          <a:p>
-            <a:pPr lvl="1"/>
-            <a:r>
-              <a:rPr lang="en-US" dirty="0"/>
-              <a:t>Another</a:t>
-            </a:r>
-          </a:p>
-          <a:p>
-            <a:pPr lvl="1"/>
-            <a:r>
-              <a:rPr lang="en-US" dirty="0"/>
-              <a:t>Another</a:t>
-            </a:r>
-          </a:p>
-          <a:p>
-            <a:pPr lvl="2"/>
-            <a:r>
-              <a:rPr lang="en-US" dirty="0"/>
-              <a:t>One</a:t>
-            </a:r>
-          </a:p>
-          <a:p>
-            <a:pPr lvl="2"/>
-            <a:r>
-              <a:rPr lang="en-US" dirty="0"/>
-              <a:t>Two</a:t>
-            </a:r>
-          </a:p>
-          <a:p>
-            <a:pPr lvl="1"/>
-            <a:r>
-              <a:rPr lang="en-US" dirty="0"/>
-              <a:t>another</a:t>
-            </a:r>
-          </a:p>
-        </p:txBody>
-      </p:sp>
-      <p:sp>
-        <p:nvSpPr>
-          <p:cNvPr id="2" name="Slide Number Placeholder 1">
-            <a:extLst>
-              <a:ext uri="{FF2B5EF4-FFF2-40B4-BE49-F238E27FC236}">
-                <a16:creationId xmlns:a16="http://schemas.microsoft.com/office/drawing/2014/main" id="{FAF85DC8-5A57-FE03-5A3A-8CC218E0C641}"/>
-              </a:ext>
-            </a:extLst>
-          </p:cNvPr>
-          <p:cNvSpPr>
-            <a:spLocks noGrp="1"/>
-          </p:cNvSpPr>
-          <p:nvPr>
-            <p:ph type="sldNum" sz="quarter" idx="12"/>
-          </p:nvPr>
-        </p:nvSpPr>
-        <p:spPr/>
-        <p:txBody>
-          <a:bodyPr/>
-          <a:lstStyle/>
-          <a:p>
-            <a:fld id="{80473052-BA07-4FC5-9696-A0F7625044DE}" type="slidenum">
-              <a:rPr lang="en-US" smtClean="0"/>
-              <a:t>24</a:t>
-            </a:fld>
-            <a:endParaRPr lang="en-US"/>
-          </a:p>
-        </p:txBody>
-      </p:sp>
-    </p:spTree>
-    <p:extLst>
-      <p:ext uri="{BB962C8B-B14F-4D97-AF65-F5344CB8AC3E}">
-        <p14:creationId xmlns:p14="http://schemas.microsoft.com/office/powerpoint/2010/main" val="2391855767"/>
       </p:ext>
     </p:extLst>
   </p:cSld>
@@ -9533,7 +9529,7 @@
           <p:cNvPr id="4" name="Title 3">
             <a:extLst>
               <a:ext uri="{FF2B5EF4-FFF2-40B4-BE49-F238E27FC236}">
-                <a16:creationId xmlns:a16="http://schemas.microsoft.com/office/drawing/2014/main" id="{BB2BD00F-8EA4-14C5-BD5F-97F9AD513213}"/>
+                <a16:creationId xmlns:a16="http://schemas.microsoft.com/office/drawing/2014/main" id="{0D0E3244-86CC-ED51-EFBC-B4D48F99AEED}"/>
               </a:ext>
             </a:extLst>
           </p:cNvPr>
@@ -9541,7 +9537,7 @@
             <a:spLocks noGrp="1"/>
           </p:cNvSpPr>
           <p:nvPr>
-            <p:ph type="ctrTitle"/>
+            <p:ph type="title"/>
           </p:nvPr>
         </p:nvSpPr>
         <p:spPr/>
@@ -9551,17 +9547,142 @@
           <a:p>
             <a:r>
               <a:rPr lang="en-US" dirty="0"/>
-              <a:t>Appendix</a:t>
-            </a:r>
-          </a:p>
-        </p:txBody>
-      </p:sp>
-      <p:sp>
-        <p:nvSpPr>
-          <p:cNvPr id="3" name="Slide Number Placeholder 2">
-            <a:extLst>
-              <a:ext uri="{FF2B5EF4-FFF2-40B4-BE49-F238E27FC236}">
-                <a16:creationId xmlns:a16="http://schemas.microsoft.com/office/drawing/2014/main" id="{CEF38F97-C294-632E-FD05-A5A19DE454DC}"/>
+              <a:t>Testing: works</a:t>
+            </a:r>
+          </a:p>
+        </p:txBody>
+      </p:sp>
+      <p:sp>
+        <p:nvSpPr>
+          <p:cNvPr id="8" name="Content Placeholder 7">
+            <a:extLst>
+              <a:ext uri="{FF2B5EF4-FFF2-40B4-BE49-F238E27FC236}">
+                <a16:creationId xmlns:a16="http://schemas.microsoft.com/office/drawing/2014/main" id="{ED3DD3A7-845E-D9B0-28AE-E851ECB350F0}"/>
+              </a:ext>
+            </a:extLst>
+          </p:cNvPr>
+          <p:cNvSpPr>
+            <a:spLocks noGrp="1"/>
+          </p:cNvSpPr>
+          <p:nvPr>
+            <p:ph idx="1"/>
+          </p:nvPr>
+        </p:nvSpPr>
+        <p:spPr/>
+        <p:txBody>
+          <a:bodyPr/>
+          <a:lstStyle/>
+          <a:p>
+            <a:r>
+              <a:rPr lang="en-US" dirty="0"/>
+              <a:t>Level 1</a:t>
+            </a:r>
+          </a:p>
+          <a:p>
+            <a:pPr lvl="1"/>
+            <a:r>
+              <a:rPr lang="en-US" dirty="0"/>
+              <a:t>Level 2</a:t>
+            </a:r>
+          </a:p>
+          <a:p>
+            <a:pPr lvl="2"/>
+            <a:r>
+              <a:rPr lang="en-US" dirty="0"/>
+              <a:t>Level 3</a:t>
+            </a:r>
+          </a:p>
+          <a:p>
+            <a:pPr lvl="1"/>
+            <a:r>
+              <a:rPr lang="en-US" dirty="0"/>
+              <a:t>Level 2, item 2</a:t>
+            </a:r>
+          </a:p>
+          <a:p>
+            <a:pPr lvl="2"/>
+            <a:r>
+              <a:rPr lang="en-US" dirty="0"/>
+              <a:t>Level2 item 1</a:t>
+            </a:r>
+          </a:p>
+          <a:p>
+            <a:pPr lvl="2"/>
+            <a:r>
+              <a:rPr lang="en-US" dirty="0"/>
+              <a:t>Level 2 item 2</a:t>
+            </a:r>
+          </a:p>
+          <a:p>
+            <a:pPr lvl="1"/>
+            <a:r>
+              <a:rPr lang="en-US" dirty="0"/>
+              <a:t>Level 2, item 3</a:t>
+            </a:r>
+          </a:p>
+          <a:p>
+            <a:pPr lvl="2"/>
+            <a:r>
+              <a:rPr lang="en-US" dirty="0"/>
+              <a:t>One</a:t>
+            </a:r>
+          </a:p>
+          <a:p>
+            <a:pPr lvl="2"/>
+            <a:r>
+              <a:rPr lang="en-US" dirty="0"/>
+              <a:t>two</a:t>
+            </a:r>
+          </a:p>
+          <a:p>
+            <a:r>
+              <a:rPr lang="en-US" dirty="0"/>
+              <a:t>Level 1 item 2</a:t>
+            </a:r>
+          </a:p>
+          <a:p>
+            <a:pPr lvl="1"/>
+            <a:r>
+              <a:rPr lang="en-US" dirty="0"/>
+              <a:t>Another</a:t>
+            </a:r>
+          </a:p>
+          <a:p>
+            <a:pPr lvl="1"/>
+            <a:r>
+              <a:rPr lang="en-US" dirty="0"/>
+              <a:t>Another</a:t>
+            </a:r>
+          </a:p>
+          <a:p>
+            <a:pPr lvl="2"/>
+            <a:r>
+              <a:rPr lang="en-US" dirty="0"/>
+              <a:t>One</a:t>
+            </a:r>
+          </a:p>
+          <a:p>
+            <a:pPr lvl="2"/>
+            <a:r>
+              <a:rPr lang="en-US" dirty="0"/>
+              <a:t>Two</a:t>
+            </a:r>
+          </a:p>
+          <a:p>
+            <a:pPr lvl="1"/>
+            <a:r>
+              <a:rPr lang="en-US" dirty="0"/>
+              <a:t>another</a:t>
+            </a:r>
+          </a:p>
+        </p:txBody>
+      </p:sp>
+      <p:sp>
+        <p:nvSpPr>
+          <p:cNvPr id="2" name="Slide Number Placeholder 1">
+            <a:extLst>
+              <a:ext uri="{FF2B5EF4-FFF2-40B4-BE49-F238E27FC236}">
+                <a16:creationId xmlns:a16="http://schemas.microsoft.com/office/drawing/2014/main" id="{FAF85DC8-5A57-FE03-5A3A-8CC218E0C641}"/>
               </a:ext>
             </a:extLst>
           </p:cNvPr>
@@ -9588,7 +9709,7 @@
     </p:spTree>
     <p:extLst>
       <p:ext uri="{BB962C8B-B14F-4D97-AF65-F5344CB8AC3E}">
-        <p14:creationId xmlns:p14="http://schemas.microsoft.com/office/powerpoint/2010/main" val="1168578030"/>
+        <p14:creationId xmlns:p14="http://schemas.microsoft.com/office/powerpoint/2010/main" val="2391855767"/>
       </p:ext>
     </p:extLst>
   </p:cSld>
@@ -9620,6 +9741,93 @@
           <p:cNvPr id="4" name="Title 3">
             <a:extLst>
               <a:ext uri="{FF2B5EF4-FFF2-40B4-BE49-F238E27FC236}">
+                <a16:creationId xmlns:a16="http://schemas.microsoft.com/office/drawing/2014/main" id="{BB2BD00F-8EA4-14C5-BD5F-97F9AD513213}"/>
+              </a:ext>
+            </a:extLst>
+          </p:cNvPr>
+          <p:cNvSpPr>
+            <a:spLocks noGrp="1"/>
+          </p:cNvSpPr>
+          <p:nvPr>
+            <p:ph type="ctrTitle"/>
+          </p:nvPr>
+        </p:nvSpPr>
+        <p:spPr/>
+        <p:txBody>
+          <a:bodyPr/>
+          <a:lstStyle/>
+          <a:p>
+            <a:r>
+              <a:rPr lang="en-US" dirty="0"/>
+              <a:t>Appendix</a:t>
+            </a:r>
+          </a:p>
+        </p:txBody>
+      </p:sp>
+      <p:sp>
+        <p:nvSpPr>
+          <p:cNvPr id="3" name="Slide Number Placeholder 2">
+            <a:extLst>
+              <a:ext uri="{FF2B5EF4-FFF2-40B4-BE49-F238E27FC236}">
+                <a16:creationId xmlns:a16="http://schemas.microsoft.com/office/drawing/2014/main" id="{CEF38F97-C294-632E-FD05-A5A19DE454DC}"/>
+              </a:ext>
+            </a:extLst>
+          </p:cNvPr>
+          <p:cNvSpPr>
+            <a:spLocks noGrp="1"/>
+          </p:cNvSpPr>
+          <p:nvPr>
+            <p:ph type="sldNum" sz="quarter" idx="12"/>
+          </p:nvPr>
+        </p:nvSpPr>
+        <p:spPr/>
+        <p:txBody>
+          <a:bodyPr/>
+          <a:lstStyle/>
+          <a:p>
+            <a:fld id="{80473052-BA07-4FC5-9696-A0F7625044DE}" type="slidenum">
+              <a:rPr lang="en-US" smtClean="0"/>
+              <a:t>26</a:t>
+            </a:fld>
+            <a:endParaRPr lang="en-US"/>
+          </a:p>
+        </p:txBody>
+      </p:sp>
+    </p:spTree>
+    <p:extLst>
+      <p:ext uri="{BB962C8B-B14F-4D97-AF65-F5344CB8AC3E}">
+        <p14:creationId xmlns:p14="http://schemas.microsoft.com/office/powerpoint/2010/main" val="1168578030"/>
+      </p:ext>
+    </p:extLst>
+  </p:cSld>
+  <p:clrMapOvr>
+    <a:masterClrMapping/>
+  </p:clrMapOvr>
+</p:sld>
+</file>
+
+<file path=ppt/slides/slide27.xml><?xml version="1.0" encoding="utf-8"?>
+<p:sld xmlns:a="http://schemas.openxmlformats.org/drawingml/2006/main" xmlns:r="http://schemas.openxmlformats.org/officeDocument/2006/relationships" xmlns:p="http://schemas.openxmlformats.org/presentationml/2006/main">
+  <p:cSld>
+    <p:spTree>
+      <p:nvGrpSpPr>
+        <p:cNvPr id="1" name=""/>
+        <p:cNvGrpSpPr/>
+        <p:nvPr/>
+      </p:nvGrpSpPr>
+      <p:grpSpPr>
+        <a:xfrm>
+          <a:off x="0" y="0"/>
+          <a:ext cx="0" cy="0"/>
+          <a:chOff x="0" y="0"/>
+          <a:chExt cx="0" cy="0"/>
+        </a:xfrm>
+      </p:grpSpPr>
+      <p:sp>
+        <p:nvSpPr>
+          <p:cNvPr id="4" name="Title 3">
+            <a:extLst>
+              <a:ext uri="{FF2B5EF4-FFF2-40B4-BE49-F238E27FC236}">
                 <a16:creationId xmlns:a16="http://schemas.microsoft.com/office/drawing/2014/main" id="{0D0E3244-86CC-ED51-EFBC-B4D48F99AEED}"/>
               </a:ext>
             </a:extLst>
@@ -9696,7 +9904,7 @@
           <a:p>
             <a:fld id="{80473052-BA07-4FC5-9696-A0F7625044DE}" type="slidenum">
               <a:rPr lang="en-US" smtClean="0"/>
-              <a:t>26</a:t>
+              <a:t>27</a:t>
             </a:fld>
             <a:endParaRPr lang="en-US"/>
           </a:p>

</xml_diff>